<commit_message>
Updates slides 1.2 and adds gitignore directive.
</commit_message>
<xml_diff>
--- a/ULI101-1.2.pptx
+++ b/ULI101-1.2.pptx
@@ -6126,10 +6126,28 @@
               </a:rPr>
             </a:br>
             <a:r>
+              <a:rPr lang="en-US" dirty="0" smtClean="0">
+                <a:latin typeface="Gill Sans MT" panose="020B0502020104020203" pitchFamily="34" charset="0"/>
+              </a:rPr>
+              <a:t>Is a </a:t>
+            </a:r>
+            <a:r>
+              <a:rPr lang="en-US" b="1" dirty="0" smtClean="0">
+                <a:latin typeface="Gill Sans MT" panose="020B0502020104020203" pitchFamily="34" charset="0"/>
+              </a:rPr>
+              <a:t>Review Tutorial module </a:t>
+            </a:r>
+            <a:r>
+              <a:rPr lang="en-US" dirty="0" smtClean="0">
+                <a:latin typeface="Gill Sans MT" panose="020B0502020104020203" pitchFamily="34" charset="0"/>
+              </a:rPr>
+              <a:t>that </a:t>
+            </a:r>
+            <a:r>
               <a:rPr lang="en-US" dirty="0">
                 <a:latin typeface="Gill Sans MT" panose="020B0502020104020203" pitchFamily="34" charset="0"/>
               </a:rPr>
-              <a:t>There are 2 Review Tutorials that students perform to answer questions to </a:t>
+              <a:t>students perform to answer questions to </a:t>
             </a:r>
             <a:r>
               <a:rPr lang="en-US" dirty="0" smtClean="0">
@@ -6158,7 +6176,54 @@
               <a:rPr lang="en-US" dirty="0" smtClean="0">
                 <a:latin typeface="Gill Sans MT" panose="020B0502020104020203" pitchFamily="34" charset="0"/>
               </a:rPr>
+              <a:t>. The review tutorial is </a:t>
+            </a:r>
+            <a:r>
+              <a:rPr lang="en-US" b="1" dirty="0" smtClean="0">
+                <a:latin typeface="Gill Sans MT" panose="020B0502020104020203" pitchFamily="34" charset="0"/>
+              </a:rPr>
+              <a:t>worth a total of 8%</a:t>
+            </a:r>
+            <a:br>
+              <a:rPr lang="en-US" b="1" dirty="0" smtClean="0">
+                <a:latin typeface="Gill Sans MT" panose="020B0502020104020203" pitchFamily="34" charset="0"/>
+              </a:rPr>
+            </a:br>
+            <a:r>
+              <a:rPr lang="en-US" dirty="0" smtClean="0">
+                <a:latin typeface="Gill Sans MT" panose="020B0502020104020203" pitchFamily="34" charset="0"/>
+              </a:rPr>
+              <a:t>which is broken down into </a:t>
+            </a:r>
+            <a:r>
+              <a:rPr lang="en-US" b="1" dirty="0" smtClean="0">
+                <a:latin typeface="Gill Sans MT" panose="020B0502020104020203" pitchFamily="34" charset="0"/>
+              </a:rPr>
+              <a:t>2 general sections </a:t>
+            </a:r>
+            <a:r>
+              <a:rPr lang="en-US" dirty="0" smtClean="0">
+                <a:latin typeface="Gill Sans MT" panose="020B0502020104020203" pitchFamily="34" charset="0"/>
+              </a:rPr>
+              <a:t>worth </a:t>
+            </a:r>
+            <a:r>
+              <a:rPr lang="en-US" b="1" dirty="0" smtClean="0">
+                <a:latin typeface="Gill Sans MT" panose="020B0502020104020203" pitchFamily="34" charset="0"/>
+              </a:rPr>
+              <a:t>4%</a:t>
+            </a:r>
+            <a:r>
+              <a:rPr lang="en-US" dirty="0" smtClean="0">
+                <a:latin typeface="Gill Sans MT" panose="020B0502020104020203" pitchFamily="34" charset="0"/>
+              </a:rPr>
               <a:t>.</a:t>
+            </a:r>
+            <a:r>
+              <a:rPr lang="en-US" dirty="0" smtClean="0">
+                <a:latin typeface="Gill Sans MT" panose="020B0502020104020203" pitchFamily="34" charset="0"/>
+              </a:rPr>
+              <a:t/>
             </a:r>
             <a:br>
               <a:rPr lang="en-US" dirty="0" smtClean="0">
@@ -6171,10 +6236,39 @@
           </a:p>
           <a:p>
             <a:r>
+              <a:rPr lang="en-US" dirty="0" smtClean="0">
+                <a:latin typeface="Gill Sans MT" panose="020B0502020104020203" pitchFamily="34" charset="0"/>
+              </a:rPr>
+              <a:t>As </a:t>
+            </a:r>
+            <a:r>
               <a:rPr lang="en-US" dirty="0">
                 <a:latin typeface="Gill Sans MT" panose="020B0502020104020203" pitchFamily="34" charset="0"/>
               </a:rPr>
-              <a:t>The review tutorial contains sections to complete. As students correctly answer questions, marks are awarded</a:t>
+              <a:t>students correctly answer </a:t>
+            </a:r>
+            <a:r>
+              <a:rPr lang="en-US" dirty="0" smtClean="0">
+                <a:latin typeface="Gill Sans MT" panose="020B0502020104020203" pitchFamily="34" charset="0"/>
+              </a:rPr>
+              <a:t>questions within a section, they can proceed to the</a:t>
+            </a:r>
+            <a:br>
+              <a:rPr lang="en-US" dirty="0" smtClean="0">
+                <a:latin typeface="Gill Sans MT" panose="020B0502020104020203" pitchFamily="34" charset="0"/>
+              </a:rPr>
+            </a:br>
+            <a:r>
+              <a:rPr lang="en-US" dirty="0" smtClean="0">
+                <a:latin typeface="Gill Sans MT" panose="020B0502020104020203" pitchFamily="34" charset="0"/>
+              </a:rPr>
+              <a:t>next section. If </a:t>
+            </a:r>
+            <a:r>
+              <a:rPr lang="en-US" dirty="0">
+                <a:latin typeface="Gill Sans MT" panose="020B0502020104020203" pitchFamily="34" charset="0"/>
+              </a:rPr>
+              <a:t>the student cannot answer a question, they cannot proceed to the next question</a:t>
             </a:r>
             <a:r>
               <a:rPr lang="en-US" dirty="0" smtClean="0">
@@ -6193,38 +6287,33 @@
           </a:p>
           <a:p>
             <a:r>
-              <a:rPr lang="en-US" dirty="0">
-                <a:latin typeface="Gill Sans MT" panose="020B0502020104020203" pitchFamily="34" charset="0"/>
-              </a:rPr>
-              <a:t>If the student cannot answer a question, they cannot proceed to the next question</a:t>
-            </a:r>
-            <a:r>
               <a:rPr lang="en-US" dirty="0" smtClean="0">
                 <a:latin typeface="Gill Sans MT" panose="020B0502020104020203" pitchFamily="34" charset="0"/>
               </a:rPr>
-              <a:t>.</a:t>
+              <a:t>Students will need to successfully complete ALL sections in order to receive</a:t>
             </a:r>
             <a:br>
               <a:rPr lang="en-US" dirty="0" smtClean="0">
                 <a:latin typeface="Gill Sans MT" panose="020B0502020104020203" pitchFamily="34" charset="0"/>
               </a:rPr>
             </a:br>
-            <a:endParaRPr lang="en-US" dirty="0">
-              <a:latin typeface="Gill Sans MT" panose="020B0502020104020203" pitchFamily="34" charset="0"/>
-            </a:endParaRPr>
-          </a:p>
-          <a:p>
-            <a:r>
-              <a:rPr lang="en-US" dirty="0">
-                <a:latin typeface="Gill Sans MT" panose="020B0502020104020203" pitchFamily="34" charset="0"/>
-              </a:rPr>
-              <a:t>Appropriate time will be provided for students to complete these review tutorials</a:t>
-            </a:r>
             <a:r>
               <a:rPr lang="en-US" dirty="0" smtClean="0">
                 <a:latin typeface="Gill Sans MT" panose="020B0502020104020203" pitchFamily="34" charset="0"/>
               </a:rPr>
-              <a:t>.</a:t>
+              <a:t>the 8% grade. This review tutorial module is </a:t>
+            </a:r>
+            <a:r>
+              <a:rPr lang="en-US" b="1" dirty="0" smtClean="0">
+                <a:latin typeface="Gill Sans MT" panose="020B0502020104020203" pitchFamily="34" charset="0"/>
+              </a:rPr>
+              <a:t>due at the end of the semester</a:t>
+            </a:r>
+            <a:r>
+              <a:rPr lang="en-US" dirty="0" smtClean="0">
+                <a:latin typeface="Gill Sans MT" panose="020B0502020104020203" pitchFamily="34" charset="0"/>
+              </a:rPr>
+              <a:t/>
             </a:r>
             <a:br>
               <a:rPr lang="en-US" dirty="0" smtClean="0">
@@ -6235,18 +6324,7 @@
               <a:rPr lang="en-US" dirty="0" smtClean="0">
                 <a:latin typeface="Gill Sans MT" panose="020B0502020104020203" pitchFamily="34" charset="0"/>
               </a:rPr>
-              <a:t/>
-            </a:r>
-            <a:br>
-              <a:rPr lang="en-US" dirty="0" smtClean="0">
-                <a:latin typeface="Gill Sans MT" panose="020B0502020104020203" pitchFamily="34" charset="0"/>
-              </a:rPr>
-            </a:br>
-            <a:r>
-              <a:rPr lang="en-US" dirty="0" smtClean="0">
-                <a:latin typeface="Gill Sans MT" panose="020B0502020104020203" pitchFamily="34" charset="0"/>
-              </a:rPr>
-              <a:t/>
+              <a:t>(refer to the Weekly Schedule for the due date).</a:t>
             </a:r>
             <a:br>
               <a:rPr lang="en-US" dirty="0" smtClean="0">
@@ -6526,55 +6604,6 @@
                                           <p:spTgt spid="214">
                                             <p:txEl>
                                               <p:pRg st="2" end="2"/>
-                                            </p:txEl>
-                                          </p:spTgt>
-                                        </p:tgtEl>
-                                        <p:attrNameLst>
-                                          <p:attrName>style.visibility</p:attrName>
-                                        </p:attrNameLst>
-                                      </p:cBhvr>
-                                      <p:to>
-                                        <p:strVal val="visible"/>
-                                      </p:to>
-                                    </p:set>
-                                  </p:childTnLst>
-                                </p:cTn>
-                              </p:par>
-                            </p:childTnLst>
-                          </p:cTn>
-                        </p:par>
-                      </p:childTnLst>
-                    </p:cTn>
-                  </p:par>
-                  <p:par>
-                    <p:cTn id="17" fill="hold">
-                      <p:stCondLst>
-                        <p:cond delay="indefinite"/>
-                      </p:stCondLst>
-                      <p:childTnLst>
-                        <p:par>
-                          <p:cTn id="18" fill="hold">
-                            <p:stCondLst>
-                              <p:cond delay="0"/>
-                            </p:stCondLst>
-                            <p:childTnLst>
-                              <p:par>
-                                <p:cTn id="19" presetID="1" presetClass="entr" presetSubtype="0" fill="hold" nodeType="clickEffect">
-                                  <p:stCondLst>
-                                    <p:cond delay="0"/>
-                                  </p:stCondLst>
-                                  <p:childTnLst>
-                                    <p:set>
-                                      <p:cBhvr>
-                                        <p:cTn id="20" dur="1" fill="hold">
-                                          <p:stCondLst>
-                                            <p:cond delay="0"/>
-                                          </p:stCondLst>
-                                        </p:cTn>
-                                        <p:tgtEl>
-                                          <p:spTgt spid="214">
-                                            <p:txEl>
-                                              <p:pRg st="3" end="3"/>
                                             </p:txEl>
                                           </p:spTgt>
                                         </p:tgtEl>

</xml_diff>

<commit_message>
Visual tweaks and path update to vi-tutorial.
</commit_message>
<xml_diff>
--- a/ULI101-1.2.pptx
+++ b/ULI101-1.2.pptx
@@ -17,7 +17,7 @@
     <p:sldId id="293" r:id="rId11"/>
     <p:sldId id="294" r:id="rId12"/>
     <p:sldId id="295" r:id="rId13"/>
-    <p:sldId id="307" r:id="rId14"/>
+    <p:sldId id="308" r:id="rId14"/>
     <p:sldId id="302" r:id="rId15"/>
     <p:sldId id="303" r:id="rId16"/>
   </p:sldIdLst>
@@ -124,6 +124,225 @@
     </p:ext>
   </p:extLst>
 </p:presentation>
+</file>
+
+<file path=ppt/revisionInfo.xml><?xml version="1.0" encoding="utf-8"?>
+<p1510:revInfo xmlns:a="http://schemas.openxmlformats.org/drawingml/2006/main" xmlns:r="http://schemas.openxmlformats.org/officeDocument/2006/relationships" xmlns:p1510="http://schemas.microsoft.com/office/powerpoint/2015/10/main">
+  <p1510:revLst>
+    <p1510:client id="{2E54DEDF-9CD1-0447-9868-6C7006017591}" v="94" dt="2022-09-10T18:20:38.672"/>
+  </p1510:revLst>
+</p1510:revInfo>
+</file>
+
+<file path=ppt/changesInfos/changesInfo1.xml><?xml version="1.0" encoding="utf-8"?>
+<pc:chgInfo xmlns:a="http://schemas.openxmlformats.org/drawingml/2006/main" xmlns:r="http://schemas.openxmlformats.org/officeDocument/2006/relationships" xmlns:ac="http://schemas.microsoft.com/office/drawing/2013/main/command" xmlns:pc="http://schemas.microsoft.com/office/powerpoint/2013/main/command">
+  <pc:docChgLst>
+    <pc:chgData name="Chris Johnson" userId="ff589efc-7bdb-4c2a-ab65-6fce12576f74" providerId="ADAL" clId="{2E54DEDF-9CD1-0447-9868-6C7006017591}"/>
+    <pc:docChg chg="undo custSel addSld delSld modSld">
+      <pc:chgData name="Chris Johnson" userId="ff589efc-7bdb-4c2a-ab65-6fce12576f74" providerId="ADAL" clId="{2E54DEDF-9CD1-0447-9868-6C7006017591}" dt="2022-09-10T18:21:13.264" v="234" actId="20577"/>
+      <pc:docMkLst>
+        <pc:docMk/>
+      </pc:docMkLst>
+      <pc:sldChg chg="modSp mod">
+        <pc:chgData name="Chris Johnson" userId="ff589efc-7bdb-4c2a-ab65-6fce12576f74" providerId="ADAL" clId="{2E54DEDF-9CD1-0447-9868-6C7006017591}" dt="2022-09-10T18:12:13.455" v="82" actId="27636"/>
+        <pc:sldMkLst>
+          <pc:docMk/>
+          <pc:sldMk cId="0" sldId="287"/>
+        </pc:sldMkLst>
+        <pc:spChg chg="mod">
+          <ac:chgData name="Chris Johnson" userId="ff589efc-7bdb-4c2a-ab65-6fce12576f74" providerId="ADAL" clId="{2E54DEDF-9CD1-0447-9868-6C7006017591}" dt="2022-09-10T18:12:13.455" v="82" actId="27636"/>
+          <ac:spMkLst>
+            <pc:docMk/>
+            <pc:sldMk cId="0" sldId="287"/>
+            <ac:spMk id="187" creationId="{00000000-0000-0000-0000-000000000000}"/>
+          </ac:spMkLst>
+        </pc:spChg>
+      </pc:sldChg>
+      <pc:sldChg chg="modSp mod">
+        <pc:chgData name="Chris Johnson" userId="ff589efc-7bdb-4c2a-ab65-6fce12576f74" providerId="ADAL" clId="{2E54DEDF-9CD1-0447-9868-6C7006017591}" dt="2022-09-10T18:12:38.582" v="84" actId="20577"/>
+        <pc:sldMkLst>
+          <pc:docMk/>
+          <pc:sldMk cId="0" sldId="291"/>
+        </pc:sldMkLst>
+        <pc:spChg chg="mod">
+          <ac:chgData name="Chris Johnson" userId="ff589efc-7bdb-4c2a-ab65-6fce12576f74" providerId="ADAL" clId="{2E54DEDF-9CD1-0447-9868-6C7006017591}" dt="2022-09-10T18:12:38.582" v="84" actId="20577"/>
+          <ac:spMkLst>
+            <pc:docMk/>
+            <pc:sldMk cId="0" sldId="291"/>
+            <ac:spMk id="199" creationId="{00000000-0000-0000-0000-000000000000}"/>
+          </ac:spMkLst>
+        </pc:spChg>
+      </pc:sldChg>
+      <pc:sldChg chg="modSp mod">
+        <pc:chgData name="Chris Johnson" userId="ff589efc-7bdb-4c2a-ab65-6fce12576f74" providerId="ADAL" clId="{2E54DEDF-9CD1-0447-9868-6C7006017591}" dt="2022-09-10T18:13:04.627" v="93" actId="1035"/>
+        <pc:sldMkLst>
+          <pc:docMk/>
+          <pc:sldMk cId="0" sldId="293"/>
+        </pc:sldMkLst>
+        <pc:spChg chg="mod">
+          <ac:chgData name="Chris Johnson" userId="ff589efc-7bdb-4c2a-ab65-6fce12576f74" providerId="ADAL" clId="{2E54DEDF-9CD1-0447-9868-6C7006017591}" dt="2022-09-10T18:13:04.627" v="93" actId="1035"/>
+          <ac:spMkLst>
+            <pc:docMk/>
+            <pc:sldMk cId="0" sldId="293"/>
+            <ac:spMk id="206" creationId="{00000000-0000-0000-0000-000000000000}"/>
+          </ac:spMkLst>
+        </pc:spChg>
+      </pc:sldChg>
+      <pc:sldChg chg="modSp mod">
+        <pc:chgData name="Chris Johnson" userId="ff589efc-7bdb-4c2a-ab65-6fce12576f74" providerId="ADAL" clId="{2E54DEDF-9CD1-0447-9868-6C7006017591}" dt="2022-09-10T18:13:12.113" v="94" actId="20577"/>
+        <pc:sldMkLst>
+          <pc:docMk/>
+          <pc:sldMk cId="0" sldId="294"/>
+        </pc:sldMkLst>
+        <pc:spChg chg="mod">
+          <ac:chgData name="Chris Johnson" userId="ff589efc-7bdb-4c2a-ab65-6fce12576f74" providerId="ADAL" clId="{2E54DEDF-9CD1-0447-9868-6C7006017591}" dt="2022-09-10T18:13:12.113" v="94" actId="20577"/>
+          <ac:spMkLst>
+            <pc:docMk/>
+            <pc:sldMk cId="0" sldId="294"/>
+            <ac:spMk id="211" creationId="{00000000-0000-0000-0000-000000000000}"/>
+          </ac:spMkLst>
+        </pc:spChg>
+      </pc:sldChg>
+      <pc:sldChg chg="modSp mod modAnim">
+        <pc:chgData name="Chris Johnson" userId="ff589efc-7bdb-4c2a-ab65-6fce12576f74" providerId="ADAL" clId="{2E54DEDF-9CD1-0447-9868-6C7006017591}" dt="2022-09-10T18:14:20.177" v="118" actId="1076"/>
+        <pc:sldMkLst>
+          <pc:docMk/>
+          <pc:sldMk cId="0" sldId="295"/>
+        </pc:sldMkLst>
+        <pc:spChg chg="mod">
+          <ac:chgData name="Chris Johnson" userId="ff589efc-7bdb-4c2a-ab65-6fce12576f74" providerId="ADAL" clId="{2E54DEDF-9CD1-0447-9868-6C7006017591}" dt="2022-09-10T18:14:08.031" v="117" actId="27636"/>
+          <ac:spMkLst>
+            <pc:docMk/>
+            <pc:sldMk cId="0" sldId="295"/>
+            <ac:spMk id="214" creationId="{00000000-0000-0000-0000-000000000000}"/>
+          </ac:spMkLst>
+        </pc:spChg>
+        <pc:picChg chg="mod">
+          <ac:chgData name="Chris Johnson" userId="ff589efc-7bdb-4c2a-ab65-6fce12576f74" providerId="ADAL" clId="{2E54DEDF-9CD1-0447-9868-6C7006017591}" dt="2022-09-10T18:14:20.177" v="118" actId="1076"/>
+          <ac:picMkLst>
+            <pc:docMk/>
+            <pc:sldMk cId="0" sldId="295"/>
+            <ac:picMk id="2" creationId="{00000000-0000-0000-0000-000000000000}"/>
+          </ac:picMkLst>
+        </pc:picChg>
+      </pc:sldChg>
+      <pc:sldChg chg="addSp modSp mod">
+        <pc:chgData name="Chris Johnson" userId="ff589efc-7bdb-4c2a-ab65-6fce12576f74" providerId="ADAL" clId="{2E54DEDF-9CD1-0447-9868-6C7006017591}" dt="2022-09-10T18:20:47.962" v="221" actId="1076"/>
+        <pc:sldMkLst>
+          <pc:docMk/>
+          <pc:sldMk cId="0" sldId="302"/>
+        </pc:sldMkLst>
+        <pc:spChg chg="mod">
+          <ac:chgData name="Chris Johnson" userId="ff589efc-7bdb-4c2a-ab65-6fce12576f74" providerId="ADAL" clId="{2E54DEDF-9CD1-0447-9868-6C7006017591}" dt="2022-09-10T18:20:36.185" v="215" actId="14100"/>
+          <ac:spMkLst>
+            <pc:docMk/>
+            <pc:sldMk cId="0" sldId="302"/>
+            <ac:spMk id="235" creationId="{00000000-0000-0000-0000-000000000000}"/>
+          </ac:spMkLst>
+        </pc:spChg>
+        <pc:picChg chg="add mod">
+          <ac:chgData name="Chris Johnson" userId="ff589efc-7bdb-4c2a-ab65-6fce12576f74" providerId="ADAL" clId="{2E54DEDF-9CD1-0447-9868-6C7006017591}" dt="2022-09-10T18:20:47.962" v="221" actId="1076"/>
+          <ac:picMkLst>
+            <pc:docMk/>
+            <pc:sldMk cId="0" sldId="302"/>
+            <ac:picMk id="4" creationId="{F64B1970-74F4-1562-47F1-348DF6045873}"/>
+          </ac:picMkLst>
+        </pc:picChg>
+      </pc:sldChg>
+      <pc:sldChg chg="modSp mod">
+        <pc:chgData name="Chris Johnson" userId="ff589efc-7bdb-4c2a-ab65-6fce12576f74" providerId="ADAL" clId="{2E54DEDF-9CD1-0447-9868-6C7006017591}" dt="2022-09-10T18:21:13.264" v="234" actId="20577"/>
+        <pc:sldMkLst>
+          <pc:docMk/>
+          <pc:sldMk cId="0" sldId="303"/>
+        </pc:sldMkLst>
+        <pc:spChg chg="mod">
+          <ac:chgData name="Chris Johnson" userId="ff589efc-7bdb-4c2a-ab65-6fce12576f74" providerId="ADAL" clId="{2E54DEDF-9CD1-0447-9868-6C7006017591}" dt="2022-09-10T18:21:13.264" v="234" actId="20577"/>
+          <ac:spMkLst>
+            <pc:docMk/>
+            <pc:sldMk cId="0" sldId="303"/>
+            <ac:spMk id="237" creationId="{00000000-0000-0000-0000-000000000000}"/>
+          </ac:spMkLst>
+        </pc:spChg>
+      </pc:sldChg>
+      <pc:sldChg chg="modSp mod">
+        <pc:chgData name="Chris Johnson" userId="ff589efc-7bdb-4c2a-ab65-6fce12576f74" providerId="ADAL" clId="{2E54DEDF-9CD1-0447-9868-6C7006017591}" dt="2022-09-10T18:11:38.793" v="75" actId="1035"/>
+        <pc:sldMkLst>
+          <pc:docMk/>
+          <pc:sldMk cId="3270192098" sldId="305"/>
+        </pc:sldMkLst>
+        <pc:spChg chg="mod">
+          <ac:chgData name="Chris Johnson" userId="ff589efc-7bdb-4c2a-ab65-6fce12576f74" providerId="ADAL" clId="{2E54DEDF-9CD1-0447-9868-6C7006017591}" dt="2022-09-10T18:11:38.793" v="75" actId="1035"/>
+          <ac:spMkLst>
+            <pc:docMk/>
+            <pc:sldMk cId="3270192098" sldId="305"/>
+            <ac:spMk id="84" creationId="{00000000-0000-0000-0000-000000000000}"/>
+          </ac:spMkLst>
+        </pc:spChg>
+      </pc:sldChg>
+      <pc:sldChg chg="modSp mod">
+        <pc:chgData name="Chris Johnson" userId="ff589efc-7bdb-4c2a-ab65-6fce12576f74" providerId="ADAL" clId="{2E54DEDF-9CD1-0447-9868-6C7006017591}" dt="2022-09-10T18:12:49.949" v="85" actId="20577"/>
+        <pc:sldMkLst>
+          <pc:docMk/>
+          <pc:sldMk cId="2220538156" sldId="306"/>
+        </pc:sldMkLst>
+        <pc:spChg chg="mod">
+          <ac:chgData name="Chris Johnson" userId="ff589efc-7bdb-4c2a-ab65-6fce12576f74" providerId="ADAL" clId="{2E54DEDF-9CD1-0447-9868-6C7006017591}" dt="2022-09-10T18:12:49.949" v="85" actId="20577"/>
+          <ac:spMkLst>
+            <pc:docMk/>
+            <pc:sldMk cId="2220538156" sldId="306"/>
+            <ac:spMk id="211" creationId="{00000000-0000-0000-0000-000000000000}"/>
+          </ac:spMkLst>
+        </pc:spChg>
+      </pc:sldChg>
+      <pc:sldChg chg="modSp del mod modAnim">
+        <pc:chgData name="Chris Johnson" userId="ff589efc-7bdb-4c2a-ab65-6fce12576f74" providerId="ADAL" clId="{2E54DEDF-9CD1-0447-9868-6C7006017591}" dt="2022-09-10T18:18:01.697" v="214" actId="2696"/>
+        <pc:sldMkLst>
+          <pc:docMk/>
+          <pc:sldMk cId="1066817219" sldId="307"/>
+        </pc:sldMkLst>
+        <pc:spChg chg="mod">
+          <ac:chgData name="Chris Johnson" userId="ff589efc-7bdb-4c2a-ab65-6fce12576f74" providerId="ADAL" clId="{2E54DEDF-9CD1-0447-9868-6C7006017591}" dt="2022-09-10T18:14:54.134" v="151" actId="20577"/>
+          <ac:spMkLst>
+            <pc:docMk/>
+            <pc:sldMk cId="1066817219" sldId="307"/>
+            <ac:spMk id="214" creationId="{00000000-0000-0000-0000-000000000000}"/>
+          </ac:spMkLst>
+        </pc:spChg>
+      </pc:sldChg>
+      <pc:sldChg chg="addSp delSp modSp add mod delAnim modAnim">
+        <pc:chgData name="Chris Johnson" userId="ff589efc-7bdb-4c2a-ab65-6fce12576f74" providerId="ADAL" clId="{2E54DEDF-9CD1-0447-9868-6C7006017591}" dt="2022-09-10T18:17:54.922" v="213" actId="1035"/>
+        <pc:sldMkLst>
+          <pc:docMk/>
+          <pc:sldMk cId="553931379" sldId="308"/>
+        </pc:sldMkLst>
+        <pc:spChg chg="mod">
+          <ac:chgData name="Chris Johnson" userId="ff589efc-7bdb-4c2a-ab65-6fce12576f74" providerId="ADAL" clId="{2E54DEDF-9CD1-0447-9868-6C7006017591}" dt="2022-09-10T18:17:54.922" v="213" actId="1035"/>
+          <ac:spMkLst>
+            <pc:docMk/>
+            <pc:sldMk cId="553931379" sldId="308"/>
+            <ac:spMk id="214" creationId="{00000000-0000-0000-0000-000000000000}"/>
+          </ac:spMkLst>
+        </pc:spChg>
+        <pc:picChg chg="del">
+          <ac:chgData name="Chris Johnson" userId="ff589efc-7bdb-4c2a-ab65-6fce12576f74" providerId="ADAL" clId="{2E54DEDF-9CD1-0447-9868-6C7006017591}" dt="2022-09-10T18:16:07.760" v="185" actId="478"/>
+          <ac:picMkLst>
+            <pc:docMk/>
+            <pc:sldMk cId="553931379" sldId="308"/>
+            <ac:picMk id="2" creationId="{00000000-0000-0000-0000-000000000000}"/>
+          </ac:picMkLst>
+        </pc:picChg>
+        <pc:picChg chg="add mod">
+          <ac:chgData name="Chris Johnson" userId="ff589efc-7bdb-4c2a-ab65-6fce12576f74" providerId="ADAL" clId="{2E54DEDF-9CD1-0447-9868-6C7006017591}" dt="2022-09-10T18:16:46.489" v="204" actId="1076"/>
+          <ac:picMkLst>
+            <pc:docMk/>
+            <pc:sldMk cId="553931379" sldId="308"/>
+            <ac:picMk id="3" creationId="{D09D5675-6131-A5A8-893C-BF6E8F3A21A2}"/>
+          </ac:picMkLst>
+        </pc:picChg>
+      </pc:sldChg>
+    </pc:docChg>
+  </pc:docChgLst>
+</pc:chgInfo>
 </file>
 
 <file path=ppt/slideLayouts/slideLayout1.xml><?xml version="1.0" encoding="utf-8"?>
@@ -4334,7 +4553,7 @@
         </p:nvSpPr>
         <p:spPr>
           <a:xfrm>
-            <a:off x="1964879" y="1514816"/>
+            <a:off x="1964879" y="989301"/>
             <a:ext cx="9344251" cy="3524435"/>
           </a:xfrm>
           <a:prstGeom prst="rect">
@@ -4359,7 +4578,7 @@
         </p:style>
         <p:txBody>
           <a:bodyPr lIns="90000" tIns="45000" rIns="90000" bIns="0" anchor="b">
-            <a:normAutofit fontScale="92500" lnSpcReduction="20000"/>
+            <a:normAutofit/>
           </a:bodyPr>
           <a:lstStyle/>
           <a:p>
@@ -4375,36 +4594,18 @@
                 </a:solidFill>
                 <a:latin typeface="Gill Sans MT"/>
               </a:rPr>
-              <a:t> </a:t>
-            </a:r>
-            <a:r>
-              <a:rPr lang="en-US" sz="2400" b="0" strike="noStrike" cap="all" spc="-1" dirty="0" smtClean="0">
-                <a:solidFill>
-                  <a:srgbClr val="000000"/>
-                </a:solidFill>
-                <a:latin typeface="Gill Sans MT"/>
-              </a:rPr>
-              <a:t>   </a:t>
+              <a:t>    </a:t>
             </a:r>
             <a:br>
-              <a:rPr lang="en-US" sz="2400" b="0" strike="noStrike" cap="all" spc="-1" dirty="0" smtClean="0">
+              <a:rPr lang="en-US" sz="2400" b="0" strike="noStrike" cap="all" spc="-1" dirty="0">
                 <a:solidFill>
                   <a:srgbClr val="000000"/>
                 </a:solidFill>
                 <a:latin typeface="Gill Sans MT"/>
               </a:rPr>
             </a:br>
-            <a:r>
-              <a:rPr lang="en-US" sz="2400" b="0" strike="noStrike" cap="all" spc="-1" dirty="0" smtClean="0">
-                <a:solidFill>
-                  <a:srgbClr val="000000"/>
-                </a:solidFill>
-                <a:latin typeface="Gill Sans MT"/>
-              </a:rPr>
-              <a:t/>
-            </a:r>
             <a:br>
-              <a:rPr lang="en-US" sz="2400" b="0" strike="noStrike" cap="all" spc="-1" dirty="0" smtClean="0">
+              <a:rPr lang="en-US" sz="2400" b="0" strike="noStrike" cap="all" spc="-1" dirty="0">
                 <a:solidFill>
                   <a:srgbClr val="000000"/>
                 </a:solidFill>
@@ -4412,26 +4613,13 @@
               </a:rPr>
             </a:br>
             <a:r>
-              <a:rPr lang="en-US" sz="2400" b="0" strike="noStrike" cap="all" spc="-1" dirty="0" smtClean="0">
-                <a:solidFill>
-                  <a:srgbClr val="000000"/>
-                </a:solidFill>
-                <a:latin typeface="Gill Sans MT"/>
-              </a:rPr>
-              <a:t>    ULI101</a:t>
-            </a:r>
-            <a:r>
               <a:rPr lang="en-US" sz="2400" b="0" strike="noStrike" cap="all" spc="-1" dirty="0">
                 <a:solidFill>
                   <a:srgbClr val="000000"/>
                 </a:solidFill>
                 <a:latin typeface="Gill Sans MT"/>
               </a:rPr>
-              <a:t>:  Introduction to Unix / Linux and the Internet</a:t>
-            </a:r>
-            <a:r>
-              <a:rPr lang="en-US" dirty="0"/>
-              <a:t/>
+              <a:t>    ULI101:  Introduction to Unix / Linux and the Internet</a:t>
             </a:r>
             <a:br>
               <a:rPr lang="en-US" dirty="0"/>
@@ -4446,7 +4634,7 @@
               <a:t> </a:t>
             </a:r>
             <a:r>
-              <a:rPr lang="en-US" dirty="0" smtClean="0"/>
+              <a:rPr lang="en-US" dirty="0"/>
               <a:t> </a:t>
             </a:r>
             <a:endParaRPr lang="en-US" sz="2200" cap="all" spc="-1" dirty="0">
@@ -4463,49 +4651,31 @@
               </a:spcAft>
             </a:pPr>
             <a:r>
-              <a:rPr lang="en-US" sz="2400" b="0" strike="noStrike" cap="all" spc="-1" dirty="0" smtClean="0">
+              <a:rPr lang="en-US" sz="2400" b="0" strike="noStrike" cap="all" spc="-1" dirty="0">
                 <a:solidFill>
                   <a:srgbClr val="0070C0"/>
                 </a:solidFill>
                 <a:latin typeface="Gill Sans MT"/>
               </a:rPr>
-              <a:t>     Week1</a:t>
+              <a:t>     Week1:</a:t>
             </a:r>
             <a:r>
               <a:rPr lang="en-US" sz="2400" b="0" strike="noStrike" cap="all" spc="-1" dirty="0">
                 <a:solidFill>
+                  <a:srgbClr val="000000"/>
+                </a:solidFill>
+                <a:latin typeface="Gill Sans MT"/>
+              </a:rPr>
+              <a:t>  </a:t>
+            </a:r>
+            <a:r>
+              <a:rPr lang="en-US" sz="2400" b="0" strike="noStrike" cap="all" spc="-1" dirty="0">
+                <a:solidFill>
                   <a:srgbClr val="0070C0"/>
                 </a:solidFill>
                 <a:latin typeface="Gill Sans MT"/>
               </a:rPr>
-              <a:t>:</a:t>
-            </a:r>
-            <a:r>
-              <a:rPr lang="en-US" sz="2400" b="0" strike="noStrike" cap="all" spc="-1" dirty="0">
-                <a:solidFill>
-                  <a:srgbClr val="000000"/>
-                </a:solidFill>
-                <a:latin typeface="Gill Sans MT"/>
-              </a:rPr>
-              <a:t>  </a:t>
-            </a:r>
-            <a:r>
-              <a:rPr lang="en-US" sz="2400" b="0" strike="noStrike" cap="all" spc="-1" dirty="0">
-                <a:solidFill>
-                  <a:srgbClr val="0070C0"/>
-                </a:solidFill>
-                <a:latin typeface="Gill Sans MT"/>
-              </a:rPr>
-              <a:t>lesson </a:t>
-            </a:r>
-            <a:r>
-              <a:rPr lang="en-US" sz="2400" b="0" strike="noStrike" cap="all" spc="-1" dirty="0" smtClean="0">
-                <a:solidFill>
-                  <a:srgbClr val="0070C0"/>
-                </a:solidFill>
-                <a:latin typeface="Gill Sans MT"/>
-              </a:rPr>
-              <a:t>2</a:t>
+              <a:t>lesson 2</a:t>
             </a:r>
           </a:p>
           <a:p>
@@ -4514,38 +4684,42 @@
                 <a:spcPts val="1199"/>
               </a:spcAft>
             </a:pPr>
-            <a:endParaRPr lang="en-US" sz="2200" b="0" strike="noStrike" cap="all" spc="-1" dirty="0" smtClean="0">
-              <a:solidFill>
-                <a:srgbClr val="0070C0"/>
-              </a:solidFill>
-              <a:latin typeface="Gill Sans MT"/>
-            </a:endParaRPr>
-          </a:p>
-          <a:p>
-            <a:pPr>
-              <a:spcAft>
-                <a:spcPts val="1199"/>
-              </a:spcAft>
-            </a:pPr>
-            <a:r>
-              <a:rPr lang="en-US" sz="2200" dirty="0" smtClean="0"/>
+            <a:br>
+              <a:rPr lang="en-US" sz="2200" dirty="0"/>
+            </a:br>
+            <a:r>
+              <a:rPr lang="en-US" sz="2200" dirty="0"/>
               <a:t>     </a:t>
             </a:r>
+            <a:r>
+              <a:rPr lang="en-US" sz="2400" b="0" strike="noStrike" cap="all" spc="-1" dirty="0">
+                <a:solidFill>
+                  <a:srgbClr val="0070C0"/>
+                </a:solidFill>
+                <a:latin typeface="Gill Sans MT"/>
+              </a:rPr>
+              <a:t>Issuing Linux Command / Linux Command Help</a:t>
+            </a:r>
             <a:br>
-              <a:rPr lang="en-US" sz="2200" dirty="0" smtClean="0"/>
+              <a:rPr lang="en-US" sz="2400" b="0" strike="noStrike" cap="all" spc="-1" dirty="0">
+                <a:solidFill>
+                  <a:srgbClr val="0070C0"/>
+                </a:solidFill>
+                <a:latin typeface="Gill Sans MT"/>
+              </a:rPr>
             </a:br>
             <a:r>
-              <a:rPr lang="en-US" sz="2200" dirty="0" smtClean="0"/>
-              <a:t>     </a:t>
-            </a:r>
-            <a:r>
-              <a:rPr lang="en-US" sz="2400" b="0" strike="noStrike" cap="all" spc="-1" dirty="0" smtClean="0">
+              <a:rPr lang="en-US" sz="2400" b="0" strike="noStrike" cap="all" spc="-1" dirty="0">
                 <a:solidFill>
                   <a:srgbClr val="0070C0"/>
                 </a:solidFill>
                 <a:latin typeface="Gill Sans MT"/>
               </a:rPr>
-              <a:t>Issuing </a:t>
+              <a:t>    Command LINE EDITING / </a:t>
+            </a:r>
+            <a:r>
+              <a:rPr lang="en-CA" sz="2400" dirty="0"/>
+              <a:t> </a:t>
             </a:r>
             <a:r>
               <a:rPr lang="en-US" sz="2400" b="0" strike="noStrike" cap="all" spc="-1" dirty="0">
@@ -4554,117 +4728,17 @@
                 </a:solidFill>
                 <a:latin typeface="Gill Sans MT"/>
               </a:rPr>
-              <a:t>Linux Command / Linux Command </a:t>
-            </a:r>
-            <a:r>
-              <a:rPr lang="en-US" sz="2400" b="0" strike="noStrike" cap="all" spc="-1" dirty="0" smtClean="0">
+              <a:t>Online Tu</a:t>
+            </a:r>
+            <a:r>
+              <a:rPr lang="en-US" sz="2400" cap="all" spc="-1" dirty="0">
                 <a:solidFill>
                   <a:srgbClr val="0070C0"/>
                 </a:solidFill>
                 <a:latin typeface="Gill Sans MT"/>
               </a:rPr>
-              <a:t>Help</a:t>
-            </a:r>
-            <a:br>
-              <a:rPr lang="en-US" sz="2400" b="0" strike="noStrike" cap="all" spc="-1" dirty="0" smtClean="0">
-                <a:solidFill>
-                  <a:srgbClr val="0070C0"/>
-                </a:solidFill>
-                <a:latin typeface="Gill Sans MT"/>
-              </a:rPr>
-            </a:br>
-            <a:r>
-              <a:rPr lang="en-US" sz="2400" b="0" strike="noStrike" cap="all" spc="-1" dirty="0" smtClean="0">
-                <a:solidFill>
-                  <a:srgbClr val="0070C0"/>
-                </a:solidFill>
-                <a:latin typeface="Gill Sans MT"/>
-              </a:rPr>
-              <a:t>    Command </a:t>
-            </a:r>
-            <a:r>
-              <a:rPr lang="en-US" sz="2400" b="0" strike="noStrike" cap="all" spc="-1" dirty="0">
-                <a:solidFill>
-                  <a:srgbClr val="0070C0"/>
-                </a:solidFill>
-                <a:latin typeface="Gill Sans MT"/>
-              </a:rPr>
-              <a:t>LINE </a:t>
-            </a:r>
-            <a:r>
-              <a:rPr lang="en-US" sz="2400" b="0" strike="noStrike" cap="all" spc="-1" dirty="0" smtClean="0">
-                <a:solidFill>
-                  <a:srgbClr val="0070C0"/>
-                </a:solidFill>
-                <a:latin typeface="Gill Sans MT"/>
-              </a:rPr>
-              <a:t>EDITING / </a:t>
-            </a:r>
-            <a:r>
-              <a:rPr lang="en-CA" sz="2400" dirty="0" smtClean="0"/>
-              <a:t> </a:t>
-            </a:r>
-            <a:r>
-              <a:rPr lang="en-US" sz="2400" b="0" strike="noStrike" cap="all" spc="-1" dirty="0" smtClean="0">
-                <a:solidFill>
-                  <a:srgbClr val="0070C0"/>
-                </a:solidFill>
-                <a:latin typeface="Gill Sans MT"/>
-              </a:rPr>
-              <a:t>Online </a:t>
-            </a:r>
-            <a:r>
-              <a:rPr lang="en-US" sz="2400" b="0" strike="noStrike" cap="all" spc="-1" dirty="0">
-                <a:solidFill>
-                  <a:srgbClr val="0070C0"/>
-                </a:solidFill>
-                <a:latin typeface="Gill Sans MT"/>
-              </a:rPr>
-              <a:t>Tu</a:t>
-            </a:r>
-            <a:r>
-              <a:rPr lang="en-US" sz="2400" cap="all" spc="-1" dirty="0">
-                <a:solidFill>
-                  <a:srgbClr val="0070C0"/>
-                </a:solidFill>
-                <a:latin typeface="Gill Sans MT"/>
-              </a:rPr>
-              <a:t>torials  / </a:t>
-            </a:r>
-            <a:r>
-              <a:rPr lang="en-US" sz="2400" cap="all" spc="-1" dirty="0" smtClean="0">
-                <a:solidFill>
-                  <a:srgbClr val="0070C0"/>
-                </a:solidFill>
-                <a:latin typeface="Gill Sans MT"/>
-              </a:rPr>
-              <a:t>SLGs</a:t>
-            </a:r>
-            <a:br>
-              <a:rPr lang="en-US" sz="2400" cap="all" spc="-1" dirty="0" smtClean="0">
-                <a:solidFill>
-                  <a:srgbClr val="0070C0"/>
-                </a:solidFill>
-                <a:latin typeface="Gill Sans MT"/>
-              </a:rPr>
-            </a:br>
-            <a:r>
-              <a:rPr lang="en-US" cap="all" spc="-1" dirty="0" smtClean="0">
-                <a:solidFill>
-                  <a:srgbClr val="0070C0"/>
-                </a:solidFill>
-                <a:latin typeface="Gill Sans MT"/>
-              </a:rPr>
-              <a:t/>
-            </a:r>
-            <a:br>
-              <a:rPr lang="en-US" cap="all" spc="-1" dirty="0" smtClean="0">
-                <a:solidFill>
-                  <a:srgbClr val="0070C0"/>
-                </a:solidFill>
-                <a:latin typeface="Gill Sans MT"/>
-              </a:rPr>
-            </a:br>
+              <a:t>torials  / SLGs</a:t>
+            </a:r>
             <a:endParaRPr lang="en-US" cap="all" spc="-1" dirty="0">
               <a:solidFill>
                 <a:srgbClr val="0070C0"/>
@@ -4723,22 +4797,13 @@
               </a:tabLst>
             </a:pPr>
             <a:r>
-              <a:rPr lang="en-CA" sz="1800" b="0" strike="noStrike" cap="all" spc="-1" dirty="0" smtClean="0">
-                <a:solidFill>
-                  <a:srgbClr val="000000"/>
-                </a:solidFill>
-                <a:latin typeface="Gill Sans MT"/>
-              </a:rPr>
-              <a:t>    Photos </a:t>
-            </a:r>
-            <a:r>
               <a:rPr lang="en-CA" sz="1800" b="0" strike="noStrike" cap="all" spc="-1" dirty="0">
                 <a:solidFill>
                   <a:srgbClr val="000000"/>
                 </a:solidFill>
                 <a:latin typeface="Gill Sans MT"/>
               </a:rPr>
-              <a:t>and icons used in this slide show are licensed under </a:t>
+              <a:t>    Photos and icons used in this slide show are licensed under </a:t>
             </a:r>
             <a:r>
               <a:rPr lang="en-CA" sz="1800" b="0" u="sng" strike="noStrike" cap="all" spc="-1" dirty="0">
@@ -4783,13 +4848,6 @@
   <p:clrMapOvr>
     <a:masterClrMapping/>
   </p:clrMapOvr>
-  <p:timing>
-    <p:tnLst>
-      <p:par>
-        <p:cTn id="1" dur="indefinite" restart="never" nodeType="tmRoot"/>
-      </p:par>
-    </p:tnLst>
-  </p:timing>
 </p:sld>
 </file>
 
@@ -4947,16 +5005,7 @@
                 </a:solidFill>
                 <a:latin typeface="Gill Sans MT"/>
               </a:rPr>
-              <a:t>Your instructor will demonstrate how </a:t>
-            </a:r>
-            <a:r>
-              <a:rPr lang="en-CA" sz="1600" b="0" strike="noStrike" spc="-1" dirty="0" smtClean="0">
-                <a:solidFill>
-                  <a:srgbClr val="000000"/>
-                </a:solidFill>
-                <a:latin typeface="Gill Sans MT"/>
-              </a:rPr>
-              <a:t>to perform </a:t>
+              <a:t>Your instructor will demonstrate how to perform </a:t>
             </a:r>
             <a:r>
               <a:rPr lang="en-CA" sz="1600" b="1" strike="noStrike" spc="-1" dirty="0">
@@ -4965,7 +5014,7 @@
                 </a:solidFill>
                 <a:latin typeface="Gill Sans MT"/>
               </a:rPr>
-              <a:t>command line editing</a:t>
+              <a:t>command line editing.</a:t>
             </a:r>
             <a:endParaRPr lang="en-CA" sz="1600" b="0" strike="noStrike" spc="-1" dirty="0">
               <a:latin typeface="Arial"/>
@@ -5001,13 +5050,6 @@
   <p:clrMapOvr>
     <a:masterClrMapping/>
   </p:clrMapOvr>
-  <p:timing>
-    <p:tnLst>
-      <p:par>
-        <p:cTn id="1" dur="indefinite" restart="never" nodeType="tmRoot"/>
-      </p:par>
-    </p:tnLst>
-  </p:timing>
 </p:sld>
 </file>
 
@@ -5094,7 +5136,7 @@
         <p:spPr>
           <a:xfrm>
             <a:off x="1451520" y="1873440"/>
-            <a:ext cx="7631640" cy="3905923"/>
+            <a:ext cx="7145942" cy="3905923"/>
           </a:xfrm>
           <a:prstGeom prst="rect">
             <a:avLst/>
@@ -5118,7 +5160,7 @@
         </p:style>
         <p:txBody>
           <a:bodyPr lIns="90000" tIns="45000" rIns="90000" bIns="45000">
-            <a:normAutofit fontScale="67500" lnSpcReduction="20000"/>
+            <a:normAutofit fontScale="90000" lnSpcReduction="10000"/>
           </a:bodyPr>
           <a:lstStyle/>
           <a:p>
@@ -5134,58 +5176,15 @@
               </a:tabLst>
             </a:pPr>
             <a:r>
-              <a:rPr lang="en-US" sz="2700" b="1" strike="noStrike" spc="-1" dirty="0" smtClean="0">
-                <a:solidFill>
-                  <a:srgbClr val="000000"/>
-                </a:solidFill>
-                <a:latin typeface="Gill Sans MT"/>
-              </a:rPr>
-              <a:t/>
-            </a:r>
-            <a:br>
-              <a:rPr lang="en-US" sz="2700" b="1" strike="noStrike" spc="-1" dirty="0" smtClean="0">
-                <a:solidFill>
-                  <a:srgbClr val="000000"/>
-                </a:solidFill>
-                <a:latin typeface="Gill Sans MT"/>
-              </a:rPr>
-            </a:br>
-            <a:r>
-              <a:rPr lang="en-US" sz="2700" b="1" strike="noStrike" spc="-1" dirty="0" smtClean="0">
-                <a:solidFill>
-                  <a:srgbClr val="000000"/>
-                </a:solidFill>
-                <a:latin typeface="Gill Sans MT"/>
-              </a:rPr>
-              <a:t>Weekly Tutorials </a:t>
-            </a:r>
-            <a:r>
               <a:rPr lang="en-US" sz="2700" b="1" strike="noStrike" spc="-1" dirty="0">
                 <a:solidFill>
                   <a:srgbClr val="000000"/>
                 </a:solidFill>
                 <a:latin typeface="Gill Sans MT"/>
               </a:rPr>
-              <a:t>/ Linux Practice </a:t>
-            </a:r>
-            <a:r>
-              <a:rPr lang="en-US" sz="2700" b="1" strike="noStrike" spc="-1" dirty="0" smtClean="0">
-                <a:solidFill>
-                  <a:srgbClr val="000000"/>
-                </a:solidFill>
-                <a:latin typeface="Gill Sans MT"/>
-              </a:rPr>
-              <a:t>Questions</a:t>
-            </a:r>
-            <a:br>
-              <a:rPr lang="en-US" sz="2700" b="1" strike="noStrike" spc="-1" dirty="0" smtClean="0">
-                <a:solidFill>
-                  <a:srgbClr val="000000"/>
-                </a:solidFill>
-                <a:latin typeface="Gill Sans MT"/>
-              </a:rPr>
-            </a:br>
-            <a:endParaRPr lang="en-US" sz="2700" b="1" strike="noStrike" spc="-1" dirty="0">
+              <a:t>Weekly Tutorials / Linux Practice Questions</a:t>
+            </a:r>
+            <a:endParaRPr lang="en-US" sz="2700" b="1" spc="-1" dirty="0">
               <a:solidFill>
                 <a:srgbClr val="000000"/>
               </a:solidFill>
@@ -5214,7 +5213,7 @@
               <a:t>There are </a:t>
             </a:r>
             <a:r>
-              <a:rPr lang="en-US" sz="1800" b="1" strike="noStrike" spc="-1" dirty="0" smtClean="0">
+              <a:rPr lang="en-US" sz="1800" b="1" strike="noStrike" spc="-1" dirty="0">
                 <a:solidFill>
                   <a:srgbClr val="000000"/>
                 </a:solidFill>
@@ -5223,7 +5222,7 @@
               <a:t>Weekly</a:t>
             </a:r>
             <a:r>
-              <a:rPr lang="en-US" sz="1800" b="0" strike="noStrike" spc="-1" dirty="0" smtClean="0">
+              <a:rPr lang="en-US" sz="1800" b="0" strike="noStrike" spc="-1" dirty="0">
                 <a:solidFill>
                   <a:srgbClr val="000000"/>
                 </a:solidFill>
@@ -5232,7 +5231,7 @@
               <a:t> </a:t>
             </a:r>
             <a:r>
-              <a:rPr lang="en-US" sz="1800" b="1" strike="noStrike" spc="-1" dirty="0" smtClean="0">
+              <a:rPr lang="en-US" sz="1800" b="1" strike="noStrike" spc="-1" dirty="0">
                 <a:solidFill>
                   <a:srgbClr val="000000"/>
                 </a:solidFill>
@@ -5241,7 +5240,34 @@
               <a:t>tutorials</a:t>
             </a:r>
             <a:r>
-              <a:rPr lang="en-US" sz="1800" b="0" strike="noStrike" spc="-1" dirty="0" smtClean="0">
+              <a:rPr lang="en-US" sz="1800" b="0" strike="noStrike" spc="-1" dirty="0">
+                <a:solidFill>
+                  <a:srgbClr val="000000"/>
+                </a:solidFill>
+                <a:latin typeface="Gill Sans MT"/>
+              </a:rPr>
+              <a:t> that are required to be completed by students for a </a:t>
+            </a:r>
+            <a:r>
+              <a:rPr lang="en-US" sz="1800" b="1" strike="noStrike" spc="-1" dirty="0">
+                <a:solidFill>
+                  <a:srgbClr val="000000"/>
+                </a:solidFill>
+                <a:latin typeface="Gill Sans MT"/>
+              </a:rPr>
+              <a:t>2%</a:t>
+            </a:r>
+            <a:r>
+              <a:rPr lang="en-US" sz="1800" b="0" strike="noStrike" spc="-1" dirty="0">
+                <a:solidFill>
+                  <a:srgbClr val="000000"/>
+                </a:solidFill>
+                <a:latin typeface="Gill Sans MT"/>
+              </a:rPr>
+              <a:t> grade</a:t>
+            </a:r>
+            <a:r>
+              <a:rPr lang="en-US" spc="-1" dirty="0">
                 <a:solidFill>
                   <a:srgbClr val="000000"/>
                 </a:solidFill>
@@ -5256,54 +5282,10 @@
                 </a:solidFill>
                 <a:latin typeface="Gill Sans MT"/>
               </a:rPr>
-              <a:t>that </a:t>
-            </a:r>
-            <a:r>
-              <a:rPr lang="en-US" sz="1800" b="0" strike="noStrike" spc="-1" dirty="0" smtClean="0">
-                <a:solidFill>
-                  <a:srgbClr val="000000"/>
-                </a:solidFill>
-                <a:latin typeface="Gill Sans MT"/>
-              </a:rPr>
-              <a:t>are required to be completed by students for a </a:t>
-            </a:r>
-            <a:r>
-              <a:rPr lang="en-US" sz="1800" b="1" strike="noStrike" spc="-1" dirty="0" smtClean="0">
-                <a:solidFill>
-                  <a:srgbClr val="000000"/>
-                </a:solidFill>
-                <a:latin typeface="Gill Sans MT"/>
-              </a:rPr>
-              <a:t>2%</a:t>
-            </a:r>
-            <a:r>
-              <a:rPr lang="en-US" sz="1800" b="0" strike="noStrike" spc="-1" dirty="0" smtClean="0">
-                <a:solidFill>
-                  <a:srgbClr val="000000"/>
-                </a:solidFill>
-                <a:latin typeface="Gill Sans MT"/>
-              </a:rPr>
-              <a:t> grade</a:t>
-            </a:r>
-            <a:br>
-              <a:rPr lang="en-US" sz="1800" b="0" strike="noStrike" spc="-1" dirty="0" smtClean="0">
-                <a:solidFill>
-                  <a:srgbClr val="000000"/>
-                </a:solidFill>
-                <a:latin typeface="Gill Sans MT"/>
-              </a:rPr>
-            </a:br>
-            <a:r>
-              <a:rPr lang="en-US" sz="1800" b="0" strike="noStrike" spc="-1" dirty="0" smtClean="0">
-                <a:solidFill>
-                  <a:srgbClr val="000000"/>
-                </a:solidFill>
-                <a:latin typeface="Gill Sans MT"/>
-              </a:rPr>
-              <a:t> for </a:t>
-            </a:r>
-            <a:r>
-              <a:rPr lang="en-US" sz="1800" b="0" u="sng" strike="noStrike" spc="-1" dirty="0" smtClean="0">
+              <a:t>for </a:t>
+            </a:r>
+            <a:r>
+              <a:rPr lang="en-US" sz="1800" b="0" u="sng" strike="noStrike" spc="-1" dirty="0">
                 <a:solidFill>
                   <a:srgbClr val="000000"/>
                 </a:solidFill>
@@ -5312,7 +5294,7 @@
               <a:t>each</a:t>
             </a:r>
             <a:r>
-              <a:rPr lang="en-US" sz="1800" b="0" strike="noStrike" spc="-1" dirty="0" smtClean="0">
+              <a:rPr lang="en-US" sz="1800" b="0" strike="noStrike" spc="-1" dirty="0">
                 <a:solidFill>
                   <a:srgbClr val="000000"/>
                 </a:solidFill>
@@ -5320,24 +5302,7 @@
               </a:rPr>
               <a:t> tutorial. These tutorials are usually due by the following week by Friday @ midnight. </a:t>
             </a:r>
-            <a:r>
-              <a:rPr lang="en-US" spc="-1" dirty="0">
-                <a:solidFill>
-                  <a:srgbClr val="000000"/>
-                </a:solidFill>
-                <a:latin typeface="Gill Sans MT"/>
-              </a:rPr>
-              <a:t/>
-            </a:r>
-            <a:br>
-              <a:rPr lang="en-US" spc="-1" dirty="0">
-                <a:solidFill>
-                  <a:srgbClr val="000000"/>
-                </a:solidFill>
-                <a:latin typeface="Gill Sans MT"/>
-              </a:rPr>
-            </a:br>
-            <a:endParaRPr lang="en-US" spc="-1" dirty="0" smtClean="0">
+            <a:endParaRPr lang="en-US" spc="-1" dirty="0">
               <a:solidFill>
                 <a:srgbClr val="000000"/>
               </a:solidFill>
@@ -5357,22 +5322,13 @@
               </a:tabLst>
             </a:pPr>
             <a:r>
-              <a:rPr lang="en-CA" spc="-1" dirty="0" smtClean="0">
-                <a:solidFill>
-                  <a:srgbClr val="000000"/>
-                </a:solidFill>
-                <a:latin typeface="Gill Sans MT"/>
-              </a:rPr>
-              <a:t>These </a:t>
-            </a:r>
-            <a:r>
               <a:rPr lang="en-CA" spc="-1" dirty="0">
                 <a:solidFill>
                   <a:srgbClr val="000000"/>
                 </a:solidFill>
                 <a:latin typeface="Gill Sans MT"/>
               </a:rPr>
-              <a:t>tutorials are designed to provide you </a:t>
+              <a:t>These tutorials are designed to provide you </a:t>
             </a:r>
             <a:r>
               <a:rPr lang="en-CA" b="1" spc="-1" dirty="0">
@@ -5390,33 +5346,16 @@
                 </a:solidFill>
                 <a:latin typeface="Gill Sans MT"/>
               </a:rPr>
-              <a:t> </a:t>
-            </a:r>
-            <a:r>
-              <a:rPr lang="en-CA" spc="-1" dirty="0" smtClean="0">
-                <a:solidFill>
-                  <a:srgbClr val="000000"/>
-                </a:solidFill>
-                <a:latin typeface="Gill Sans MT"/>
-              </a:rPr>
-              <a:t/>
-            </a:r>
-            <a:br>
-              <a:rPr lang="en-CA" spc="-1" dirty="0" smtClean="0">
-                <a:solidFill>
-                  <a:srgbClr val="000000"/>
-                </a:solidFill>
-                <a:latin typeface="Gill Sans MT"/>
-              </a:rPr>
-            </a:br>
-            <a:r>
-              <a:rPr lang="en-CA" spc="-1" dirty="0" smtClean="0">
-                <a:solidFill>
-                  <a:srgbClr val="000000"/>
-                </a:solidFill>
-                <a:latin typeface="Gill Sans MT"/>
-              </a:rPr>
-              <a:t>with </a:t>
+              <a:t> with Linux commands and operations that will help you get </a:t>
+            </a:r>
+            <a:r>
+              <a:rPr lang="en-CA" b="1" spc="-1" dirty="0">
+                <a:solidFill>
+                  <a:srgbClr val="000000"/>
+                </a:solidFill>
+                <a:latin typeface="Gill Sans MT"/>
+              </a:rPr>
+              <a:t>troubleshooting</a:t>
             </a:r>
             <a:r>
               <a:rPr lang="en-CA" spc="-1" dirty="0">
@@ -5425,53 +5364,9 @@
                 </a:solidFill>
                 <a:latin typeface="Gill Sans MT"/>
               </a:rPr>
-              <a:t>Linux commands and operations that will help you </a:t>
-            </a:r>
-            <a:r>
-              <a:rPr lang="en-CA" spc="-1" dirty="0" smtClean="0">
-                <a:solidFill>
-                  <a:srgbClr val="000000"/>
-                </a:solidFill>
-                <a:latin typeface="Gill Sans MT"/>
-              </a:rPr>
-              <a:t>get </a:t>
-            </a:r>
-            <a:r>
-              <a:rPr lang="en-CA" b="1" spc="-1" dirty="0" smtClean="0">
-                <a:solidFill>
-                  <a:srgbClr val="000000"/>
-                </a:solidFill>
-                <a:latin typeface="Gill Sans MT"/>
-              </a:rPr>
-              <a:t>troubleshooting</a:t>
-            </a:r>
-            <a:r>
-              <a:rPr lang="en-CA" spc="-1" dirty="0" smtClean="0">
-                <a:solidFill>
-                  <a:srgbClr val="000000"/>
-                </a:solidFill>
-                <a:latin typeface="Gill Sans MT"/>
-              </a:rPr>
               <a:t> practice.</a:t>
             </a:r>
-            <a:r>
-              <a:rPr lang="en-US" spc="-1" dirty="0">
-                <a:solidFill>
-                  <a:srgbClr val="000000"/>
-                </a:solidFill>
-                <a:latin typeface="Gill Sans MT"/>
-              </a:rPr>
-              <a:t/>
-            </a:r>
-            <a:br>
-              <a:rPr lang="en-US" spc="-1" dirty="0">
-                <a:solidFill>
-                  <a:srgbClr val="000000"/>
-                </a:solidFill>
-                <a:latin typeface="Gill Sans MT"/>
-              </a:rPr>
-            </a:br>
-            <a:endParaRPr lang="en-US" spc="-1" dirty="0" smtClean="0">
+            <a:endParaRPr lang="en-US" spc="-1" dirty="0">
               <a:solidFill>
                 <a:srgbClr val="000000"/>
               </a:solidFill>
@@ -5491,7 +5386,7 @@
               </a:tabLst>
             </a:pPr>
             <a:r>
-              <a:rPr lang="en-US" sz="1800" b="1" strike="noStrike" spc="-1" dirty="0" smtClean="0">
+              <a:rPr lang="en-US" sz="1800" b="1" strike="noStrike" spc="-1" dirty="0">
                 <a:solidFill>
                   <a:srgbClr val="000000"/>
                 </a:solidFill>
@@ -5500,7 +5395,7 @@
               <a:t>NOTE:  </a:t>
             </a:r>
             <a:r>
-              <a:rPr lang="en-US" sz="1800" b="0" strike="noStrike" spc="-1" dirty="0" smtClean="0">
+              <a:rPr lang="en-US" sz="1800" b="0" strike="noStrike" spc="-1" dirty="0">
                 <a:solidFill>
                   <a:srgbClr val="000000"/>
                 </a:solidFill>
@@ -5509,7 +5404,7 @@
               <a:t>Students that do NOT complete ALL parts of each weekly tutorial will </a:t>
             </a:r>
             <a:br>
-              <a:rPr lang="en-US" sz="1800" b="0" strike="noStrike" spc="-1" dirty="0" smtClean="0">
+              <a:rPr lang="en-US" sz="1800" b="0" strike="noStrike" spc="-1" dirty="0">
                 <a:solidFill>
                   <a:srgbClr val="000000"/>
                 </a:solidFill>
@@ -5517,7 +5412,7 @@
               </a:rPr>
             </a:br>
             <a:r>
-              <a:rPr lang="en-US" sz="1800" b="0" strike="noStrike" spc="-1" dirty="0" smtClean="0">
+              <a:rPr lang="en-US" sz="1800" b="0" strike="noStrike" spc="-1" dirty="0">
                 <a:solidFill>
                   <a:srgbClr val="000000"/>
                 </a:solidFill>
@@ -5525,14 +5420,6 @@
               </a:rPr>
               <a:t>NOT obtain the full 2% grade.</a:t>
             </a:r>
-            <a:br>
-              <a:rPr lang="en-US" sz="1800" b="0" strike="noStrike" spc="-1" dirty="0" smtClean="0">
-                <a:solidFill>
-                  <a:srgbClr val="000000"/>
-                </a:solidFill>
-                <a:latin typeface="Gill Sans MT"/>
-              </a:rPr>
-            </a:br>
             <a:endParaRPr lang="en-CA" spc="-1" dirty="0">
               <a:latin typeface="Arial"/>
             </a:endParaRPr>
@@ -5550,7 +5437,7 @@
               </a:tabLst>
             </a:pPr>
             <a:r>
-              <a:rPr lang="en-US" sz="1800" b="1" strike="noStrike" spc="-1" dirty="0" smtClean="0">
+              <a:rPr lang="en-US" sz="1800" b="1" strike="noStrike" spc="-1" dirty="0">
                 <a:solidFill>
                   <a:srgbClr val="000000"/>
                 </a:solidFill>
@@ -5559,47 +5446,22 @@
               <a:t>Linux Practice Questions </a:t>
             </a:r>
             <a:r>
-              <a:rPr lang="en-US" sz="1800" b="0" strike="noStrike" spc="-1" dirty="0" smtClean="0">
-                <a:solidFill>
-                  <a:srgbClr val="000000"/>
-                </a:solidFill>
-                <a:latin typeface="Gill Sans MT"/>
-              </a:rPr>
-              <a:t>are at the end of each weekly tutorial. </a:t>
-            </a:r>
-            <a:br>
-              <a:rPr lang="en-US" sz="1800" b="0" strike="noStrike" spc="-1" dirty="0" smtClean="0">
-                <a:solidFill>
-                  <a:srgbClr val="000000"/>
-                </a:solidFill>
-                <a:latin typeface="Gill Sans MT"/>
-              </a:rPr>
-            </a:br>
-            <a:r>
-              <a:rPr lang="en-US" spc="-1" dirty="0" smtClean="0">
-                <a:solidFill>
-                  <a:srgbClr val="000000"/>
-                </a:solidFill>
-                <a:latin typeface="Gill Sans MT"/>
-              </a:rPr>
-              <a:t>Although these practice Linux questions are NOT for marks, </a:t>
-            </a:r>
-            <a:br>
-              <a:rPr lang="en-US" spc="-1" dirty="0" smtClean="0">
-                <a:solidFill>
-                  <a:srgbClr val="000000"/>
-                </a:solidFill>
-                <a:latin typeface="Gill Sans MT"/>
-              </a:rPr>
-            </a:br>
-            <a:r>
-              <a:rPr lang="en-US" spc="-1" dirty="0" smtClean="0">
-                <a:solidFill>
-                  <a:srgbClr val="000000"/>
-                </a:solidFill>
-                <a:latin typeface="Gill Sans MT"/>
-              </a:rPr>
-              <a:t>they are useful for studying for quizzes and tests.</a:t>
+              <a:rPr lang="en-US" sz="1800" b="0" strike="noStrike" spc="-1" dirty="0">
+                <a:solidFill>
+                  <a:srgbClr val="000000"/>
+                </a:solidFill>
+                <a:latin typeface="Gill Sans MT"/>
+              </a:rPr>
+              <a:t>are at the end of each weekly tutorial.  </a:t>
+            </a:r>
+            <a:r>
+              <a:rPr lang="en-US" spc="-1" dirty="0">
+                <a:solidFill>
+                  <a:srgbClr val="000000"/>
+                </a:solidFill>
+                <a:latin typeface="Gill Sans MT"/>
+              </a:rPr>
+              <a:t>Although these practice Linux questions are NOT for marks, they are useful for studying for quizzes and tests.</a:t>
             </a:r>
             <a:endParaRPr lang="en-CA" sz="1800" b="0" strike="noStrike" spc="-1" dirty="0">
               <a:latin typeface="Arial"/>
@@ -5646,7 +5508,7 @@
         </p:blipFill>
         <p:spPr>
           <a:xfrm>
-            <a:off x="8730350" y="2427890"/>
+            <a:off x="8730350" y="2708788"/>
             <a:ext cx="3182936" cy="1440424"/>
           </a:xfrm>
           <a:prstGeom prst="rect">
@@ -5732,7 +5594,11 @@
                                           </p:stCondLst>
                                         </p:cTn>
                                         <p:tgtEl>
-                                          <p:spTgt spid="2"/>
+                                          <p:spTgt spid="214">
+                                            <p:txEl>
+                                              <p:pRg st="1" end="1"/>
+                                            </p:txEl>
+                                          </p:spTgt>
                                         </p:tgtEl>
                                         <p:attrNameLst>
                                           <p:attrName>style.visibility</p:attrName>
@@ -5759,11 +5625,7 @@
                                           </p:stCondLst>
                                         </p:cTn>
                                         <p:tgtEl>
-                                          <p:spTgt spid="214">
-                                            <p:txEl>
-                                              <p:pRg st="1" end="1"/>
-                                            </p:txEl>
-                                          </p:spTgt>
+                                          <p:spTgt spid="2"/>
                                         </p:tgtEl>
                                         <p:attrNameLst>
                                           <p:attrName>style.visibility</p:attrName>
@@ -6036,8 +5898,8 @@
         </p:nvSpPr>
         <p:spPr>
           <a:xfrm>
-            <a:off x="1451519" y="1873440"/>
-            <a:ext cx="7135433" cy="3905923"/>
+            <a:off x="1451520" y="1883950"/>
+            <a:ext cx="7135432" cy="3905923"/>
           </a:xfrm>
           <a:prstGeom prst="rect">
             <a:avLst/>
@@ -6065,25 +5927,19 @@
           </a:bodyPr>
           <a:lstStyle/>
           <a:p>
-            <a:r>
-              <a:rPr lang="en-US" sz="3000" b="1" strike="noStrike" spc="-1" dirty="0" smtClean="0">
-                <a:solidFill>
-                  <a:srgbClr val="000000"/>
-                </a:solidFill>
-                <a:latin typeface="Gill Sans MT"/>
-              </a:rPr>
-              <a:t/>
-            </a:r>
-            <a:br>
-              <a:rPr lang="en-US" sz="3000" b="1" strike="noStrike" spc="-1" dirty="0" smtClean="0">
-                <a:solidFill>
-                  <a:srgbClr val="000000"/>
-                </a:solidFill>
-                <a:latin typeface="Gill Sans MT"/>
-              </a:rPr>
-            </a:br>
-            <a:r>
-              <a:rPr lang="en-US" sz="3000" b="1" strike="noStrike" spc="-1" dirty="0" smtClean="0">
+            <a:pPr>
+              <a:lnSpc>
+                <a:spcPct val="120000"/>
+              </a:lnSpc>
+              <a:spcBef>
+                <a:spcPts val="1001"/>
+              </a:spcBef>
+              <a:tabLst>
+                <a:tab pos="0" algn="l"/>
+              </a:tabLst>
+            </a:pPr>
+            <a:r>
+              <a:rPr lang="en-US" sz="3200" b="1" spc="-1" dirty="0">
                 <a:solidFill>
                   <a:srgbClr val="000000"/>
                 </a:solidFill>
@@ -6091,294 +5947,162 @@
               </a:rPr>
               <a:t>Review Tutorials </a:t>
             </a:r>
-            <a:r>
-              <a:rPr lang="en-US" sz="2000" b="1" strike="noStrike" spc="-1" dirty="0" smtClean="0">
-                <a:solidFill>
-                  <a:srgbClr val="000000"/>
-                </a:solidFill>
-                <a:latin typeface="Gill Sans MT"/>
-              </a:rPr>
-              <a:t/>
-            </a:r>
-            <a:br>
-              <a:rPr lang="en-US" sz="2000" b="1" strike="noStrike" spc="-1" dirty="0" smtClean="0">
-                <a:solidFill>
-                  <a:srgbClr val="000000"/>
-                </a:solidFill>
-                <a:latin typeface="Gill Sans MT"/>
-              </a:rPr>
-            </a:br>
-            <a:r>
-              <a:rPr lang="en-US" sz="2000" b="1" strike="noStrike" spc="-1" dirty="0" smtClean="0">
-                <a:solidFill>
-                  <a:srgbClr val="000000"/>
-                </a:solidFill>
-                <a:latin typeface="Gill Sans MT"/>
-              </a:rPr>
-              <a:t/>
-            </a:r>
-            <a:br>
-              <a:rPr lang="en-US" sz="2000" b="1" strike="noStrike" spc="-1" dirty="0" smtClean="0">
-                <a:solidFill>
-                  <a:srgbClr val="000000"/>
-                </a:solidFill>
-                <a:latin typeface="Gill Sans MT"/>
-              </a:rPr>
-            </a:br>
-            <a:r>
-              <a:rPr lang="en-US" dirty="0" smtClean="0">
-                <a:latin typeface="Gill Sans MT" panose="020B0502020104020203" pitchFamily="34" charset="0"/>
+          </a:p>
+          <a:p>
+            <a:pPr>
+              <a:lnSpc>
+                <a:spcPct val="120000"/>
+              </a:lnSpc>
+              <a:spcBef>
+                <a:spcPts val="1001"/>
+              </a:spcBef>
+              <a:tabLst>
+                <a:tab pos="0" algn="l"/>
+              </a:tabLst>
+            </a:pPr>
+            <a:r>
+              <a:rPr lang="en-US" sz="2400" spc="-1" dirty="0">
+                <a:solidFill>
+                  <a:srgbClr val="000000"/>
+                </a:solidFill>
+                <a:latin typeface="Gill Sans MT"/>
               </a:rPr>
               <a:t>Is a </a:t>
             </a:r>
             <a:r>
-              <a:rPr lang="en-US" b="1" dirty="0" smtClean="0">
-                <a:latin typeface="Gill Sans MT" panose="020B0502020104020203" pitchFamily="34" charset="0"/>
+              <a:rPr lang="en-US" sz="2400" b="1" spc="-1" dirty="0">
+                <a:solidFill>
+                  <a:srgbClr val="000000"/>
+                </a:solidFill>
+                <a:latin typeface="Gill Sans MT"/>
               </a:rPr>
               <a:t>Review Tutorial module </a:t>
             </a:r>
             <a:r>
-              <a:rPr lang="en-US" dirty="0" smtClean="0">
-                <a:latin typeface="Gill Sans MT" panose="020B0502020104020203" pitchFamily="34" charset="0"/>
-              </a:rPr>
-              <a:t>that </a:t>
-            </a:r>
-            <a:r>
-              <a:rPr lang="en-US" dirty="0">
-                <a:latin typeface="Gill Sans MT" panose="020B0502020104020203" pitchFamily="34" charset="0"/>
-              </a:rPr>
-              <a:t>students perform to answer questions to </a:t>
-            </a:r>
-            <a:r>
-              <a:rPr lang="en-US" dirty="0" smtClean="0">
-                <a:latin typeface="Gill Sans MT" panose="020B0502020104020203" pitchFamily="34" charset="0"/>
-              </a:rPr>
-              <a:t/>
-            </a:r>
-            <a:br>
-              <a:rPr lang="en-US" dirty="0" smtClean="0">
-                <a:latin typeface="Gill Sans MT" panose="020B0502020104020203" pitchFamily="34" charset="0"/>
-              </a:rPr>
-            </a:br>
-            <a:r>
-              <a:rPr lang="en-US" dirty="0" smtClean="0">
-                <a:latin typeface="Gill Sans MT" panose="020B0502020104020203" pitchFamily="34" charset="0"/>
-              </a:rPr>
-              <a:t>test </a:t>
-            </a:r>
-            <a:r>
-              <a:rPr lang="en-US" dirty="0">
-                <a:latin typeface="Gill Sans MT" panose="020B0502020104020203" pitchFamily="34" charset="0"/>
-              </a:rPr>
-              <a:t>their Unix/Linux Knowledge</a:t>
-            </a:r>
-            <a:r>
-              <a:rPr lang="en-US" dirty="0" smtClean="0">
-                <a:latin typeface="Gill Sans MT" panose="020B0502020104020203" pitchFamily="34" charset="0"/>
-              </a:rPr>
-              <a:t>. The review tutorial is </a:t>
-            </a:r>
-            <a:r>
-              <a:rPr lang="en-US" b="1" dirty="0" smtClean="0">
-                <a:latin typeface="Gill Sans MT" panose="020B0502020104020203" pitchFamily="34" charset="0"/>
+              <a:rPr lang="en-US" sz="2400" spc="-1" dirty="0">
+                <a:solidFill>
+                  <a:srgbClr val="000000"/>
+                </a:solidFill>
+                <a:latin typeface="Gill Sans MT"/>
+              </a:rPr>
+              <a:t>that students perform to answer questions to test their Unix/Linux Knowledge. The review tutorial is </a:t>
+            </a:r>
+            <a:r>
+              <a:rPr lang="en-US" sz="2400" b="1" spc="-1" dirty="0">
+                <a:solidFill>
+                  <a:srgbClr val="000000"/>
+                </a:solidFill>
+                <a:latin typeface="Gill Sans MT"/>
               </a:rPr>
               <a:t>worth a total of 8%</a:t>
             </a:r>
-            <a:br>
-              <a:rPr lang="en-US" b="1" dirty="0" smtClean="0">
-                <a:latin typeface="Gill Sans MT" panose="020B0502020104020203" pitchFamily="34" charset="0"/>
-              </a:rPr>
-            </a:br>
-            <a:r>
-              <a:rPr lang="en-US" dirty="0" smtClean="0">
-                <a:latin typeface="Gill Sans MT" panose="020B0502020104020203" pitchFamily="34" charset="0"/>
-              </a:rPr>
-              <a:t>which is broken down into </a:t>
-            </a:r>
-            <a:r>
-              <a:rPr lang="en-US" b="1" dirty="0" smtClean="0">
-                <a:latin typeface="Gill Sans MT" panose="020B0502020104020203" pitchFamily="34" charset="0"/>
+            <a:r>
+              <a:rPr lang="en-US" sz="2400" spc="-1" dirty="0">
+                <a:solidFill>
+                  <a:srgbClr val="000000"/>
+                </a:solidFill>
+                <a:latin typeface="Gill Sans MT"/>
+              </a:rPr>
+              <a:t> which is broken down into </a:t>
+            </a:r>
+            <a:r>
+              <a:rPr lang="en-US" sz="2400" b="1" spc="-1" dirty="0">
+                <a:solidFill>
+                  <a:srgbClr val="000000"/>
+                </a:solidFill>
+                <a:latin typeface="Gill Sans MT"/>
               </a:rPr>
               <a:t>2 general sections </a:t>
             </a:r>
             <a:r>
-              <a:rPr lang="en-US" dirty="0" smtClean="0">
-                <a:latin typeface="Gill Sans MT" panose="020B0502020104020203" pitchFamily="34" charset="0"/>
+              <a:rPr lang="en-US" sz="2400" spc="-1" dirty="0">
+                <a:solidFill>
+                  <a:srgbClr val="000000"/>
+                </a:solidFill>
+                <a:latin typeface="Gill Sans MT"/>
               </a:rPr>
               <a:t>worth </a:t>
             </a:r>
             <a:r>
-              <a:rPr lang="en-US" b="1" dirty="0" smtClean="0">
-                <a:latin typeface="Gill Sans MT" panose="020B0502020104020203" pitchFamily="34" charset="0"/>
+              <a:rPr lang="en-US" sz="2400" b="1" spc="-1" dirty="0">
+                <a:solidFill>
+                  <a:srgbClr val="000000"/>
+                </a:solidFill>
+                <a:latin typeface="Gill Sans MT"/>
               </a:rPr>
               <a:t>4%</a:t>
             </a:r>
             <a:r>
-              <a:rPr lang="en-US" dirty="0" smtClean="0">
-                <a:latin typeface="Gill Sans MT" panose="020B0502020104020203" pitchFamily="34" charset="0"/>
+              <a:rPr lang="en-US" sz="2400" spc="-1" dirty="0">
+                <a:solidFill>
+                  <a:srgbClr val="000000"/>
+                </a:solidFill>
+                <a:latin typeface="Gill Sans MT"/>
               </a:rPr>
               <a:t>.</a:t>
             </a:r>
-            <a:r>
-              <a:rPr lang="en-US" dirty="0" smtClean="0">
-                <a:latin typeface="Gill Sans MT" panose="020B0502020104020203" pitchFamily="34" charset="0"/>
-              </a:rPr>
-              <a:t/>
-            </a:r>
-            <a:br>
-              <a:rPr lang="en-US" dirty="0" smtClean="0">
-                <a:latin typeface="Gill Sans MT" panose="020B0502020104020203" pitchFamily="34" charset="0"/>
-              </a:rPr>
-            </a:br>
-            <a:endParaRPr lang="en-US" dirty="0">
-              <a:latin typeface="Gill Sans MT" panose="020B0502020104020203" pitchFamily="34" charset="0"/>
-            </a:endParaRPr>
-          </a:p>
-          <a:p>
-            <a:r>
-              <a:rPr lang="en-US" dirty="0" smtClean="0">
-                <a:latin typeface="Gill Sans MT" panose="020B0502020104020203" pitchFamily="34" charset="0"/>
-              </a:rPr>
-              <a:t>As </a:t>
-            </a:r>
-            <a:r>
-              <a:rPr lang="en-US" dirty="0">
-                <a:latin typeface="Gill Sans MT" panose="020B0502020104020203" pitchFamily="34" charset="0"/>
-              </a:rPr>
-              <a:t>students correctly answer </a:t>
-            </a:r>
-            <a:r>
-              <a:rPr lang="en-US" dirty="0" smtClean="0">
-                <a:latin typeface="Gill Sans MT" panose="020B0502020104020203" pitchFamily="34" charset="0"/>
-              </a:rPr>
-              <a:t>questions within a section, they can proceed to the</a:t>
-            </a:r>
-            <a:br>
-              <a:rPr lang="en-US" dirty="0" smtClean="0">
-                <a:latin typeface="Gill Sans MT" panose="020B0502020104020203" pitchFamily="34" charset="0"/>
-              </a:rPr>
-            </a:br>
-            <a:r>
-              <a:rPr lang="en-US" dirty="0" smtClean="0">
-                <a:latin typeface="Gill Sans MT" panose="020B0502020104020203" pitchFamily="34" charset="0"/>
-              </a:rPr>
-              <a:t>next section. If </a:t>
-            </a:r>
-            <a:r>
-              <a:rPr lang="en-US" dirty="0">
-                <a:latin typeface="Gill Sans MT" panose="020B0502020104020203" pitchFamily="34" charset="0"/>
-              </a:rPr>
-              <a:t>the student cannot answer a question, they cannot proceed to the next question</a:t>
-            </a:r>
-            <a:r>
-              <a:rPr lang="en-US" dirty="0" smtClean="0">
-                <a:latin typeface="Gill Sans MT" panose="020B0502020104020203" pitchFamily="34" charset="0"/>
-              </a:rPr>
-              <a:t>.</a:t>
-            </a:r>
-            <a:br>
-              <a:rPr lang="en-US" dirty="0" smtClean="0">
-                <a:latin typeface="Gill Sans MT" panose="020B0502020104020203" pitchFamily="34" charset="0"/>
-              </a:rPr>
-            </a:br>
-            <a:endParaRPr lang="en-US" dirty="0">
-              <a:latin typeface="Gill Sans MT" panose="020B0502020104020203" pitchFamily="34" charset="0"/>
-            </a:endParaRPr>
-          </a:p>
-          <a:p>
-            <a:r>
-              <a:rPr lang="en-US" dirty="0" smtClean="0">
-                <a:latin typeface="Gill Sans MT" panose="020B0502020104020203" pitchFamily="34" charset="0"/>
-              </a:rPr>
-              <a:t>Students will need to successfully complete ALL sections in order to receive</a:t>
-            </a:r>
-            <a:br>
-              <a:rPr lang="en-US" dirty="0" smtClean="0">
-                <a:latin typeface="Gill Sans MT" panose="020B0502020104020203" pitchFamily="34" charset="0"/>
-              </a:rPr>
-            </a:br>
-            <a:r>
-              <a:rPr lang="en-US" dirty="0" smtClean="0">
-                <a:latin typeface="Gill Sans MT" panose="020B0502020104020203" pitchFamily="34" charset="0"/>
-              </a:rPr>
-              <a:t>the 8% grade. This review tutorial module is </a:t>
-            </a:r>
-            <a:r>
-              <a:rPr lang="en-US" b="1" dirty="0" smtClean="0">
-                <a:latin typeface="Gill Sans MT" panose="020B0502020104020203" pitchFamily="34" charset="0"/>
-              </a:rPr>
-              <a:t>due at the end of the semester</a:t>
-            </a:r>
-            <a:r>
-              <a:rPr lang="en-US" dirty="0" smtClean="0">
-                <a:latin typeface="Gill Sans MT" panose="020B0502020104020203" pitchFamily="34" charset="0"/>
-              </a:rPr>
-              <a:t/>
-            </a:r>
-            <a:br>
-              <a:rPr lang="en-US" dirty="0" smtClean="0">
-                <a:latin typeface="Gill Sans MT" panose="020B0502020104020203" pitchFamily="34" charset="0"/>
-              </a:rPr>
-            </a:br>
-            <a:r>
-              <a:rPr lang="en-US" dirty="0" smtClean="0">
-                <a:latin typeface="Gill Sans MT" panose="020B0502020104020203" pitchFamily="34" charset="0"/>
+          </a:p>
+          <a:p>
+            <a:pPr>
+              <a:lnSpc>
+                <a:spcPct val="120000"/>
+              </a:lnSpc>
+              <a:spcBef>
+                <a:spcPts val="1001"/>
+              </a:spcBef>
+              <a:tabLst>
+                <a:tab pos="0" algn="l"/>
+              </a:tabLst>
+            </a:pPr>
+            <a:r>
+              <a:rPr lang="en-US" sz="2400" spc="-1" dirty="0">
+                <a:solidFill>
+                  <a:srgbClr val="000000"/>
+                </a:solidFill>
+                <a:latin typeface="Gill Sans MT"/>
+              </a:rPr>
+              <a:t>As students correctly answer questions within a section, they can proceed to the next section. If the student cannot answer a question, they cannot proceed to the next question.</a:t>
+            </a:r>
+          </a:p>
+          <a:p>
+            <a:pPr>
+              <a:lnSpc>
+                <a:spcPct val="120000"/>
+              </a:lnSpc>
+              <a:spcBef>
+                <a:spcPts val="1001"/>
+              </a:spcBef>
+              <a:tabLst>
+                <a:tab pos="0" algn="l"/>
+              </a:tabLst>
+            </a:pPr>
+            <a:r>
+              <a:rPr lang="en-US" sz="2400" spc="-1" dirty="0">
+                <a:solidFill>
+                  <a:srgbClr val="000000"/>
+                </a:solidFill>
+                <a:latin typeface="Gill Sans MT"/>
+              </a:rPr>
+              <a:t>Students will need to successfully complete ALL sections in order to receive the 8% grade. This review tutorial module is </a:t>
+            </a:r>
+            <a:r>
+              <a:rPr lang="en-US" sz="2400" b="1" spc="-1" dirty="0">
+                <a:solidFill>
+                  <a:srgbClr val="000000"/>
+                </a:solidFill>
+                <a:latin typeface="Gill Sans MT"/>
+              </a:rPr>
+              <a:t>due at the end of the semester </a:t>
+            </a:r>
+            <a:r>
+              <a:rPr lang="en-US" sz="2400" spc="-1" dirty="0">
+                <a:solidFill>
+                  <a:srgbClr val="000000"/>
+                </a:solidFill>
+                <a:latin typeface="Gill Sans MT"/>
               </a:rPr>
               <a:t>(refer to the Weekly Schedule for the due date).</a:t>
             </a:r>
-            <a:br>
-              <a:rPr lang="en-US" dirty="0" smtClean="0">
-                <a:latin typeface="Gill Sans MT" panose="020B0502020104020203" pitchFamily="34" charset="0"/>
-              </a:rPr>
-            </a:br>
-            <a:r>
-              <a:rPr lang="en-US" dirty="0" smtClean="0">
-                <a:latin typeface="Gill Sans MT" panose="020B0502020104020203" pitchFamily="34" charset="0"/>
-              </a:rPr>
-              <a:t/>
-            </a:r>
-            <a:br>
-              <a:rPr lang="en-US" dirty="0" smtClean="0">
-                <a:latin typeface="Gill Sans MT" panose="020B0502020104020203" pitchFamily="34" charset="0"/>
-              </a:rPr>
-            </a:br>
-            <a:r>
-              <a:rPr lang="en-US" dirty="0" smtClean="0">
-                <a:latin typeface="Gill Sans MT" panose="020B0502020104020203" pitchFamily="34" charset="0"/>
-              </a:rPr>
-              <a:t/>
-            </a:r>
-            <a:br>
-              <a:rPr lang="en-US" dirty="0" smtClean="0">
-                <a:latin typeface="Gill Sans MT" panose="020B0502020104020203" pitchFamily="34" charset="0"/>
-              </a:rPr>
-            </a:br>
-            <a:r>
-              <a:rPr lang="en-US" dirty="0" smtClean="0">
-                <a:latin typeface="Gill Sans MT" panose="020B0502020104020203" pitchFamily="34" charset="0"/>
-              </a:rPr>
-              <a:t/>
-            </a:r>
-            <a:br>
-              <a:rPr lang="en-US" dirty="0" smtClean="0">
-                <a:latin typeface="Gill Sans MT" panose="020B0502020104020203" pitchFamily="34" charset="0"/>
-              </a:rPr>
-            </a:br>
-            <a:r>
-              <a:rPr lang="en-US" dirty="0" smtClean="0"/>
-              <a:t/>
-            </a:r>
-            <a:br>
-              <a:rPr lang="en-US" dirty="0" smtClean="0"/>
-            </a:br>
-            <a:r>
-              <a:rPr lang="en-US" dirty="0" smtClean="0"/>
-              <a:t/>
-            </a:r>
-            <a:br>
-              <a:rPr lang="en-US" dirty="0" smtClean="0"/>
-            </a:br>
-            <a:endParaRPr lang="en-US" dirty="0"/>
           </a:p>
         </p:txBody>
       </p:sp>
@@ -6407,7 +6131,13 @@
       </p:pic>
       <p:pic>
         <p:nvPicPr>
-          <p:cNvPr id="3" name="Picture 2"/>
+          <p:cNvPr id="3" name="Picture 2">
+            <a:extLst>
+              <a:ext uri="{FF2B5EF4-FFF2-40B4-BE49-F238E27FC236}">
+                <a16:creationId xmlns:a16="http://schemas.microsoft.com/office/drawing/2014/main" id="{D09D5675-6131-A5A8-893C-BF6E8F3A21A2}"/>
+              </a:ext>
+            </a:extLst>
+          </p:cNvPr>
           <p:cNvPicPr>
             <a:picLocks noChangeAspect="1"/>
           </p:cNvPicPr>
@@ -6432,7 +6162,7 @@
     </p:spTree>
     <p:extLst>
       <p:ext uri="{BB962C8B-B14F-4D97-AF65-F5344CB8AC3E}">
-        <p14:creationId xmlns:p14="http://schemas.microsoft.com/office/powerpoint/2010/main" val="1066817219"/>
+        <p14:creationId xmlns:p14="http://schemas.microsoft.com/office/powerpoint/2010/main" val="553931379"/>
       </p:ext>
     </p:extLst>
   </p:cSld>
@@ -6507,51 +6237,6 @@
                                           </p:stCondLst>
                                         </p:cTn>
                                         <p:tgtEl>
-                                          <p:spTgt spid="3"/>
-                                        </p:tgtEl>
-                                        <p:attrNameLst>
-                                          <p:attrName>style.visibility</p:attrName>
-                                        </p:attrNameLst>
-                                      </p:cBhvr>
-                                      <p:to>
-                                        <p:strVal val="visible"/>
-                                      </p:to>
-                                    </p:set>
-                                  </p:childTnLst>
-                                </p:cTn>
-                              </p:par>
-                            </p:childTnLst>
-                          </p:cTn>
-                        </p:par>
-                      </p:childTnLst>
-                    </p:cTn>
-                  </p:par>
-                  <p:par>
-                    <p:cTn id="9" fill="hold">
-                      <p:stCondLst>
-                        <p:cond delay="indefinite"/>
-                      </p:stCondLst>
-                      <p:childTnLst>
-                        <p:par>
-                          <p:cTn id="10" fill="hold">
-                            <p:stCondLst>
-                              <p:cond delay="0"/>
-                            </p:stCondLst>
-                            <p:childTnLst>
-                              <p:par>
-                                <p:cTn id="11" presetID="1" presetClass="entr" presetSubtype="0" fill="hold" nodeType="clickEffect">
-                                  <p:stCondLst>
-                                    <p:cond delay="0"/>
-                                  </p:stCondLst>
-                                  <p:childTnLst>
-                                    <p:set>
-                                      <p:cBhvr>
-                                        <p:cTn id="12" dur="1" fill="hold">
-                                          <p:stCondLst>
-                                            <p:cond delay="0"/>
-                                          </p:stCondLst>
-                                        </p:cTn>
-                                        <p:tgtEl>
                                           <p:spTgt spid="214">
                                             <p:txEl>
                                               <p:pRg st="1" end="1"/>
@@ -6569,33 +6254,15 @@
                                   </p:childTnLst>
                                 </p:cTn>
                               </p:par>
-                            </p:childTnLst>
-                          </p:cTn>
-                        </p:par>
-                      </p:childTnLst>
-                    </p:cTn>
-                  </p:par>
-                  <p:par>
-                    <p:cTn id="13" fill="hold">
-                      <p:stCondLst>
-                        <p:cond delay="indefinite"/>
-                      </p:stCondLst>
-                      <p:childTnLst>
-                        <p:par>
-                          <p:cTn id="14" fill="hold">
-                            <p:stCondLst>
-                              <p:cond delay="0"/>
-                            </p:stCondLst>
-                            <p:childTnLst>
                               <p:par>
-                                <p:cTn id="15" presetID="1" presetClass="entr" presetSubtype="0" fill="hold" nodeType="clickEffect">
+                                <p:cTn id="9" presetID="1" presetClass="entr" presetSubtype="0" fill="hold" nodeType="withEffect">
                                   <p:stCondLst>
                                     <p:cond delay="0"/>
                                   </p:stCondLst>
                                   <p:childTnLst>
                                     <p:set>
                                       <p:cBhvr>
-                                        <p:cTn id="16" dur="1" fill="hold">
+                                        <p:cTn id="10" dur="1" fill="hold">
                                           <p:stCondLst>
                                             <p:cond delay="0"/>
                                           </p:stCondLst>
@@ -6606,6 +6273,64 @@
                                               <p:pRg st="2" end="2"/>
                                             </p:txEl>
                                           </p:spTgt>
+                                        </p:tgtEl>
+                                        <p:attrNameLst>
+                                          <p:attrName>style.visibility</p:attrName>
+                                        </p:attrNameLst>
+                                      </p:cBhvr>
+                                      <p:to>
+                                        <p:strVal val="visible"/>
+                                      </p:to>
+                                    </p:set>
+                                  </p:childTnLst>
+                                </p:cTn>
+                              </p:par>
+                              <p:par>
+                                <p:cTn id="11" presetID="1" presetClass="entr" presetSubtype="0" fill="hold" nodeType="withEffect">
+                                  <p:stCondLst>
+                                    <p:cond delay="0"/>
+                                  </p:stCondLst>
+                                  <p:childTnLst>
+                                    <p:set>
+                                      <p:cBhvr>
+                                        <p:cTn id="12" dur="1" fill="hold">
+                                          <p:stCondLst>
+                                            <p:cond delay="0"/>
+                                          </p:stCondLst>
+                                        </p:cTn>
+                                        <p:tgtEl>
+                                          <p:spTgt spid="214">
+                                            <p:txEl>
+                                              <p:pRg st="3" end="3"/>
+                                            </p:txEl>
+                                          </p:spTgt>
+                                        </p:tgtEl>
+                                        <p:attrNameLst>
+                                          <p:attrName>style.visibility</p:attrName>
+                                        </p:attrNameLst>
+                                      </p:cBhvr>
+                                      <p:to>
+                                        <p:strVal val="visible"/>
+                                      </p:to>
+                                    </p:set>
+                                  </p:childTnLst>
+                                </p:cTn>
+                              </p:par>
+                              <p:par>
+                                <p:cTn id="13" presetID="1" presetClass="entr" presetSubtype="0" fill="hold" nodeType="withEffect">
+                                  <p:stCondLst>
+                                    <p:cond delay="0"/>
+                                  </p:stCondLst>
+                                  <p:childTnLst>
+                                    <p:set>
+                                      <p:cBhvr>
+                                        <p:cTn id="14" dur="1" fill="hold">
+                                          <p:stCondLst>
+                                            <p:cond delay="0"/>
+                                          </p:stCondLst>
+                                        </p:cTn>
+                                        <p:tgtEl>
+                                          <p:spTgt spid="3"/>
                                         </p:tgtEl>
                                         <p:attrNameLst>
                                           <p:attrName>style.visibility</p:attrName>
@@ -6732,7 +6457,7 @@
         <p:spPr>
           <a:xfrm>
             <a:off x="1451520" y="1961964"/>
-            <a:ext cx="9602640" cy="3906175"/>
+            <a:ext cx="6662466" cy="3906175"/>
           </a:xfrm>
           <a:prstGeom prst="rect">
             <a:avLst/>
@@ -6780,10 +6505,6 @@
               </a:rPr>
               <a:t>Need Additional Help?  Try the Learning Centre: </a:t>
             </a:r>
-            <a:r>
-              <a:rPr dirty="0"/>
-              <a:t/>
-            </a:r>
             <a:br>
               <a:rPr dirty="0"/>
             </a:br>
@@ -6795,73 +6516,32 @@
                 <a:latin typeface="Gill Sans MT"/>
                 <a:hlinkClick r:id="rId2"/>
               </a:rPr>
-              <a:t>https://</a:t>
-            </a:r>
-            <a:r>
-              <a:rPr lang="en-CA" sz="1900" b="1" u="sng" spc="-1" dirty="0" smtClean="0">
+              <a:t>https://library.senecacollege.ca/learningcentre</a:t>
+            </a:r>
+            <a:br>
+              <a:rPr lang="en-CA" sz="1900" b="1" u="sng" spc="-1" dirty="0">
                 <a:solidFill>
                   <a:srgbClr val="FA2B5C"/>
                 </a:solidFill>
                 <a:latin typeface="Gill Sans MT"/>
-                <a:hlinkClick r:id="rId2"/>
-              </a:rPr>
-              <a:t>library.senecacollege.ca/learningcentre</a:t>
-            </a:r>
-            <a:r>
-              <a:rPr lang="en-CA" sz="1900" b="1" u="sng" spc="-1" dirty="0" smtClean="0">
+              </a:rPr>
+            </a:br>
+            <a:br>
+              <a:rPr lang="en-CA" sz="1900" b="1" u="sng" spc="-1" dirty="0">
                 <a:solidFill>
                   <a:srgbClr val="FA2B5C"/>
                 </a:solidFill>
                 <a:latin typeface="Gill Sans MT"/>
               </a:rPr>
-              <a:t/>
-            </a:r>
-            <a:br>
-              <a:rPr lang="en-CA" sz="1900" b="1" u="sng" spc="-1" dirty="0" smtClean="0">
-                <a:solidFill>
-                  <a:srgbClr val="FA2B5C"/>
-                </a:solidFill>
-                <a:latin typeface="Gill Sans MT"/>
-              </a:rPr>
             </a:br>
             <a:r>
-              <a:rPr lang="en-CA" sz="1900" b="1" u="sng" spc="-1" dirty="0" smtClean="0">
-                <a:solidFill>
-                  <a:srgbClr val="FA2B5C"/>
-                </a:solidFill>
-                <a:latin typeface="Gill Sans MT"/>
-              </a:rPr>
-              <a:t/>
-            </a:r>
-            <a:br>
-              <a:rPr lang="en-CA" sz="1900" b="1" u="sng" spc="-1" dirty="0" smtClean="0">
-                <a:solidFill>
-                  <a:srgbClr val="FA2B5C"/>
-                </a:solidFill>
-                <a:latin typeface="Gill Sans MT"/>
-              </a:rPr>
-            </a:br>
-            <a:r>
-              <a:rPr lang="en-CA" sz="1700" b="1" strike="noStrike" spc="-1" dirty="0" smtClean="0">
-                <a:solidFill>
-                  <a:srgbClr val="000000"/>
-                </a:solidFill>
-                <a:latin typeface="Gill Sans MT"/>
-              </a:rPr>
-              <a:t>ONE-ON-ONE </a:t>
-            </a:r>
-            <a:r>
               <a:rPr lang="en-CA" sz="1700" b="1" strike="noStrike" spc="-1" dirty="0">
                 <a:solidFill>
                   <a:srgbClr val="000000"/>
                 </a:solidFill>
                 <a:latin typeface="Gill Sans MT"/>
               </a:rPr>
-              <a:t>TUTORING</a:t>
-            </a:r>
-            <a:r>
-              <a:rPr dirty="0"/>
-              <a:t/>
+              <a:t>ONE-ON-ONE TUTORING</a:t>
             </a:r>
             <a:br>
               <a:rPr dirty="0"/>
@@ -6900,10 +6580,6 @@
               </a:rPr>
               <a:t>SUPPORTED LEARNING GROUPS (SLG)</a:t>
             </a:r>
-            <a:r>
-              <a:rPr dirty="0"/>
-              <a:t/>
-            </a:r>
             <a:br>
               <a:rPr dirty="0"/>
             </a:br>
@@ -6915,10 +6591,6 @@
                 <a:latin typeface="Gill Sans MT"/>
               </a:rPr>
               <a:t>Student-led and collaborative study sessions that review practical examples based </a:t>
-            </a:r>
-            <a:r>
-              <a:rPr dirty="0"/>
-              <a:t/>
             </a:r>
             <a:br>
               <a:rPr dirty="0"/>
@@ -6968,10 +6640,6 @@
               </a:rPr>
               <a:t>ENGLISH LANGUAGE SUPPORT</a:t>
             </a:r>
-            <a:r>
-              <a:rPr dirty="0"/>
-              <a:t/>
-            </a:r>
             <a:br>
               <a:rPr dirty="0"/>
             </a:br>
@@ -6983,10 +6651,6 @@
                 <a:latin typeface="Gill Sans MT"/>
               </a:rPr>
               <a:t>Offered through individual appointments or group learning sessions to focus on grammar,</a:t>
-            </a:r>
-            <a:r>
-              <a:rPr dirty="0"/>
-              <a:t/>
             </a:r>
             <a:br>
               <a:rPr dirty="0"/>
@@ -7025,10 +6689,6 @@
               </a:rPr>
               <a:t>STUDY SKILLS</a:t>
             </a:r>
-            <a:r>
-              <a:rPr dirty="0"/>
-              <a:t/>
-            </a:r>
             <a:br>
               <a:rPr dirty="0"/>
             </a:br>
@@ -7039,36 +6699,18 @@
                 </a:solidFill>
                 <a:latin typeface="Gill Sans MT"/>
               </a:rPr>
-              <a:t>Learn time management, exam preparation, critical thinking, note-taking, and reading</a:t>
-            </a:r>
-            <a:r>
-              <a:rPr lang="en-CA" sz="1700" b="0" strike="noStrike" spc="-1" dirty="0" smtClean="0">
-                <a:solidFill>
-                  <a:srgbClr val="000000"/>
-                </a:solidFill>
-                <a:latin typeface="Gill Sans MT"/>
-              </a:rPr>
-              <a:t>.</a:t>
+              <a:t>Learn time management, exam preparation, critical thinking, note-taking, and reading.</a:t>
             </a:r>
             <a:br>
-              <a:rPr lang="en-CA" sz="1700" b="0" strike="noStrike" spc="-1" dirty="0" smtClean="0">
+              <a:rPr lang="en-CA" sz="1700" b="0" strike="noStrike" spc="-1" dirty="0">
                 <a:solidFill>
                   <a:srgbClr val="000000"/>
                 </a:solidFill>
                 <a:latin typeface="Gill Sans MT"/>
               </a:rPr>
             </a:br>
-            <a:r>
-              <a:rPr lang="en-CA" sz="1700" b="0" strike="noStrike" spc="-1" dirty="0" smtClean="0">
-                <a:solidFill>
-                  <a:srgbClr val="000000"/>
-                </a:solidFill>
-                <a:latin typeface="Gill Sans MT"/>
-              </a:rPr>
-              <a:t/>
-            </a:r>
             <a:br>
-              <a:rPr lang="en-CA" sz="1700" b="0" strike="noStrike" spc="-1" dirty="0" smtClean="0">
+              <a:rPr lang="en-CA" sz="1700" b="0" strike="noStrike" spc="-1" dirty="0">
                 <a:solidFill>
                   <a:srgbClr val="000000"/>
                 </a:solidFill>
@@ -7105,6 +6747,42 @@
           <a:xfrm>
             <a:off x="10938545" y="695916"/>
             <a:ext cx="927633" cy="778433"/>
+          </a:xfrm>
+          <a:prstGeom prst="rect">
+            <a:avLst/>
+          </a:prstGeom>
+        </p:spPr>
+      </p:pic>
+      <p:pic>
+        <p:nvPicPr>
+          <p:cNvPr id="4" name="Picture 3" descr="Graphical user interface&#10;&#10;Description automatically generated">
+            <a:extLst>
+              <a:ext uri="{FF2B5EF4-FFF2-40B4-BE49-F238E27FC236}">
+                <a16:creationId xmlns:a16="http://schemas.microsoft.com/office/drawing/2014/main" id="{F64B1970-74F4-1562-47F1-348DF6045873}"/>
+              </a:ext>
+            </a:extLst>
+          </p:cNvPr>
+          <p:cNvPicPr>
+            <a:picLocks noChangeAspect="1"/>
+          </p:cNvPicPr>
+          <p:nvPr/>
+        </p:nvPicPr>
+        <p:blipFill>
+          <a:blip r:embed="rId5">
+            <a:extLst>
+              <a:ext uri="{28A0092B-C50C-407E-A947-70E740481C1C}">
+                <a14:useLocalDpi xmlns:a14="http://schemas.microsoft.com/office/drawing/2010/main" val="0"/>
+              </a:ext>
+            </a:extLst>
+          </a:blip>
+          <a:stretch>
+            <a:fillRect/>
+          </a:stretch>
+        </p:blipFill>
+        <p:spPr>
+          <a:xfrm>
+            <a:off x="8256345" y="2385796"/>
+            <a:ext cx="2797815" cy="3058510"/>
           </a:xfrm>
           <a:prstGeom prst="rect">
             <a:avLst/>
@@ -7408,7 +7086,7 @@
               </a:lnSpc>
             </a:pPr>
             <a:r>
-              <a:rPr lang="en-US" sz="3200" b="0" strike="noStrike" cap="all" spc="-1" dirty="0" smtClean="0">
+              <a:rPr lang="en-US" sz="3200" b="0" strike="noStrike" cap="all" spc="-1" dirty="0">
                 <a:solidFill>
                   <a:srgbClr val="000000"/>
                 </a:solidFill>
@@ -7455,7 +7133,7 @@
         </p:style>
         <p:txBody>
           <a:bodyPr lIns="90000" tIns="45000" rIns="90000" bIns="45000">
-            <a:normAutofit fontScale="66500" lnSpcReduction="20000"/>
+            <a:normAutofit fontScale="96500"/>
           </a:bodyPr>
           <a:lstStyle/>
           <a:p>
@@ -7587,25 +7265,7 @@
                 </a:solidFill>
                 <a:latin typeface="Gill Sans MT"/>
               </a:rPr>
-              <a:t>Tutorial </a:t>
-            </a:r>
-            <a:r>
-              <a:rPr lang="en-US" sz="2400" b="1" strike="noStrike" spc="-1" dirty="0" smtClean="0">
-                <a:solidFill>
-                  <a:srgbClr val="000000"/>
-                </a:solidFill>
-                <a:latin typeface="Gill Sans MT"/>
-              </a:rPr>
-              <a:t>1</a:t>
-            </a:r>
-            <a:r>
-              <a:rPr lang="en-US" sz="2400" spc="-1" dirty="0">
-                <a:solidFill>
-                  <a:srgbClr val="000000"/>
-                </a:solidFill>
-                <a:latin typeface="Gill Sans MT"/>
-              </a:rPr>
-              <a:t/>
+              <a:t>Tutorial 1</a:t>
             </a:r>
             <a:br>
               <a:rPr lang="en-US" sz="2400" spc="-1" dirty="0">
@@ -7622,19 +7282,19 @@
                 </a:solidFill>
                 <a:latin typeface="Gill Sans MT"/>
               </a:rPr>
-              <a:t>(Due: Friday Week 2 @ midnight for a 2% grade</a:t>
-            </a:r>
-            <a:r>
-              <a:rPr lang="en-US" sz="2400" b="1" spc="-1" dirty="0" smtClean="0">
-                <a:solidFill>
-                  <a:srgbClr val="000000"/>
-                </a:solidFill>
-                <a:latin typeface="Gill Sans MT"/>
-              </a:rPr>
-              <a:t>)</a:t>
-            </a:r>
-            <a:r>
-              <a:rPr lang="en-US" sz="2400" spc="-1" dirty="0" smtClean="0">
+              <a:t>(Due: Friday Week 2 @ midnight for a 2% </a:t>
+            </a:r>
+            <a:r>
+              <a:rPr lang="en-US" sz="2400" b="1" spc="-1">
+                <a:solidFill>
+                  <a:srgbClr val="000000"/>
+                </a:solidFill>
+                <a:latin typeface="Gill Sans MT"/>
+              </a:rPr>
+              <a:t>grade)</a:t>
+            </a:r>
+            <a:r>
+              <a:rPr lang="en-US" sz="2400" spc="-1">
                 <a:solidFill>
                   <a:srgbClr val="000000"/>
                 </a:solidFill>
@@ -7642,14 +7302,6 @@
               </a:rPr>
               <a:t>:</a:t>
             </a:r>
-            <a:br>
-              <a:rPr lang="en-US" sz="2400" spc="-1" dirty="0" smtClean="0">
-                <a:solidFill>
-                  <a:srgbClr val="000000"/>
-                </a:solidFill>
-                <a:latin typeface="Gill Sans MT"/>
-              </a:rPr>
-            </a:br>
             <a:endParaRPr lang="en-CA" sz="2400" spc="-1" dirty="0"/>
           </a:p>
           <a:p>
@@ -7714,142 +7366,14 @@
               <a:t> </a:t>
             </a:r>
             <a:r>
-              <a:rPr lang="en-US" sz="2400" strike="noStrike" spc="-1" dirty="0" smtClean="0">
-                <a:solidFill>
-                  <a:srgbClr val="000000"/>
-                </a:solidFill>
-                <a:latin typeface="Gill Sans MT"/>
-              </a:rPr>
-              <a:t>(Questions 1 </a:t>
-            </a:r>
-            <a:r>
               <a:rPr lang="en-US" sz="2400" strike="noStrike" spc="-1" dirty="0">
                 <a:solidFill>
                   <a:srgbClr val="000000"/>
                 </a:solidFill>
                 <a:latin typeface="Gill Sans MT"/>
               </a:rPr>
-              <a:t>– </a:t>
-            </a:r>
-            <a:r>
-              <a:rPr lang="en-US" sz="2400" strike="noStrike" spc="-1" dirty="0" smtClean="0">
-                <a:solidFill>
-                  <a:srgbClr val="000000"/>
-                </a:solidFill>
-                <a:latin typeface="Gill Sans MT"/>
-              </a:rPr>
-              <a:t>9)</a:t>
-            </a:r>
-            <a:br>
-              <a:rPr lang="en-US" sz="2400" strike="noStrike" spc="-1" dirty="0" smtClean="0">
-                <a:solidFill>
-                  <a:srgbClr val="000000"/>
-                </a:solidFill>
-                <a:latin typeface="Gill Sans MT"/>
-              </a:rPr>
-            </a:br>
-            <a:r>
-              <a:rPr lang="en-US" sz="2400" b="1" strike="noStrike" spc="-1" dirty="0" smtClean="0">
-                <a:solidFill>
-                  <a:srgbClr val="000000"/>
-                </a:solidFill>
-                <a:latin typeface="Gill Sans MT"/>
-              </a:rPr>
-              <a:t/>
-            </a:r>
-            <a:br>
-              <a:rPr lang="en-US" sz="2400" b="1" strike="noStrike" spc="-1" dirty="0" smtClean="0">
-                <a:solidFill>
-                  <a:srgbClr val="000000"/>
-                </a:solidFill>
-                <a:latin typeface="Gill Sans MT"/>
-              </a:rPr>
-            </a:br>
-            <a:r>
-              <a:rPr lang="en-US" sz="2400" b="0" strike="noStrike" spc="-1" dirty="0" smtClean="0">
-                <a:solidFill>
-                  <a:srgbClr val="000000"/>
-                </a:solidFill>
-                <a:latin typeface="Gill Sans MT"/>
-              </a:rPr>
-              <a:t/>
-            </a:r>
-            <a:br>
-              <a:rPr lang="en-US" sz="2400" b="0" strike="noStrike" spc="-1" dirty="0" smtClean="0">
-                <a:solidFill>
-                  <a:srgbClr val="000000"/>
-                </a:solidFill>
-                <a:latin typeface="Gill Sans MT"/>
-              </a:rPr>
-            </a:br>
-            <a:r>
-              <a:rPr lang="en-US" sz="2400" b="0" strike="noStrike" spc="-1" dirty="0" smtClean="0">
-                <a:solidFill>
-                  <a:srgbClr val="000000"/>
-                </a:solidFill>
-                <a:latin typeface="Gill Sans MT"/>
-              </a:rPr>
-              <a:t/>
-            </a:r>
-            <a:br>
-              <a:rPr lang="en-US" sz="2400" b="0" strike="noStrike" spc="-1" dirty="0" smtClean="0">
-                <a:solidFill>
-                  <a:srgbClr val="000000"/>
-                </a:solidFill>
-                <a:latin typeface="Gill Sans MT"/>
-              </a:rPr>
-            </a:br>
-            <a:r>
-              <a:rPr lang="en-US" sz="2400" b="0" strike="noStrike" spc="-1" dirty="0" smtClean="0">
-                <a:solidFill>
-                  <a:srgbClr val="000000"/>
-                </a:solidFill>
-                <a:latin typeface="Gill Sans MT"/>
-              </a:rPr>
-              <a:t/>
-            </a:r>
-            <a:br>
-              <a:rPr lang="en-US" sz="2400" b="0" strike="noStrike" spc="-1" dirty="0" smtClean="0">
-                <a:solidFill>
-                  <a:srgbClr val="000000"/>
-                </a:solidFill>
-                <a:latin typeface="Gill Sans MT"/>
-              </a:rPr>
-            </a:br>
-            <a:r>
-              <a:rPr lang="en-US" sz="2400" b="0" strike="noStrike" spc="-1" dirty="0" smtClean="0">
-                <a:solidFill>
-                  <a:srgbClr val="000000"/>
-                </a:solidFill>
-                <a:latin typeface="Gill Sans MT"/>
-              </a:rPr>
-              <a:t/>
-            </a:r>
-            <a:br>
-              <a:rPr lang="en-US" sz="2400" b="0" strike="noStrike" spc="-1" dirty="0" smtClean="0">
-                <a:solidFill>
-                  <a:srgbClr val="000000"/>
-                </a:solidFill>
-                <a:latin typeface="Gill Sans MT"/>
-              </a:rPr>
-            </a:br>
-            <a:r>
-              <a:rPr lang="en-US" sz="2400" b="0" strike="noStrike" spc="-1" dirty="0" smtClean="0">
-                <a:solidFill>
-                  <a:srgbClr val="000000"/>
-                </a:solidFill>
-                <a:latin typeface="Gill Sans MT"/>
-              </a:rPr>
-              <a:t/>
-            </a:r>
-            <a:br>
-              <a:rPr lang="en-US" sz="2400" b="0" strike="noStrike" spc="-1" dirty="0" smtClean="0">
-                <a:solidFill>
-                  <a:srgbClr val="000000"/>
-                </a:solidFill>
-                <a:latin typeface="Gill Sans MT"/>
-              </a:rPr>
-            </a:br>
+              <a:t>(Questions 1 – 9)</a:t>
+            </a:r>
             <a:endParaRPr lang="en-CA" sz="2400" b="0" strike="noStrike" spc="-1" dirty="0">
               <a:latin typeface="Arial"/>
             </a:endParaRPr>
@@ -7861,13 +7385,6 @@
   <p:clrMapOvr>
     <a:masterClrMapping/>
   </p:clrMapOvr>
-  <p:timing>
-    <p:tnLst>
-      <p:par>
-        <p:cTn id="1" dur="indefinite" restart="never" nodeType="tmRoot"/>
-      </p:par>
-    </p:tnLst>
-  </p:timing>
 </p:sld>
 </file>
 
@@ -7978,7 +7495,7 @@
         </p:style>
         <p:txBody>
           <a:bodyPr lIns="90000" tIns="45000" rIns="90000" bIns="45000">
-            <a:normAutofit fontScale="77500" lnSpcReduction="20000"/>
+            <a:normAutofit lnSpcReduction="10000"/>
           </a:bodyPr>
           <a:lstStyle/>
           <a:p>
@@ -8139,7 +7656,7 @@
               </a:tabLst>
             </a:pPr>
             <a:r>
-              <a:rPr lang="en-US" sz="1800" b="0" strike="noStrike" spc="-1" dirty="0" smtClean="0">
+              <a:rPr lang="en-US" sz="1800" b="0" strike="noStrike" spc="-1" dirty="0">
                 <a:solidFill>
                   <a:srgbClr val="000000"/>
                 </a:solidFill>
@@ -8166,22 +7683,13 @@
               </a:tabLst>
             </a:pPr>
             <a:r>
-              <a:rPr lang="en-US" sz="1800" b="0" strike="noStrike" spc="-1" dirty="0" smtClean="0">
-                <a:solidFill>
-                  <a:srgbClr val="000000"/>
-                </a:solidFill>
-                <a:latin typeface="Gill Sans MT"/>
-              </a:rPr>
-              <a:t>Linux </a:t>
-            </a:r>
-            <a:r>
               <a:rPr lang="en-US" sz="1800" b="0" strike="noStrike" spc="-1" dirty="0">
                 <a:solidFill>
                   <a:srgbClr val="000000"/>
                 </a:solidFill>
                 <a:latin typeface="Gill Sans MT"/>
               </a:rPr>
-              <a:t>Practice Questions </a:t>
+              <a:t>Linux Practice Questions </a:t>
             </a:r>
             <a:endParaRPr lang="en-CA" sz="1800" b="0" strike="noStrike" spc="-1" dirty="0">
               <a:latin typeface="Arial"/>
@@ -8205,31 +7713,13 @@
               </a:tabLst>
             </a:pPr>
             <a:r>
-              <a:rPr lang="en-US" sz="1800" b="0" strike="noStrike" spc="-1" dirty="0" smtClean="0">
-                <a:solidFill>
-                  <a:srgbClr val="000000"/>
-                </a:solidFill>
-                <a:latin typeface="Gill Sans MT"/>
-              </a:rPr>
-              <a:t>Getting Help / SLGs (Student </a:t>
-            </a:r>
-            <a:r>
               <a:rPr lang="en-US" sz="1800" b="0" strike="noStrike" spc="-1" dirty="0">
                 <a:solidFill>
                   <a:srgbClr val="000000"/>
                 </a:solidFill>
                 <a:latin typeface="Gill Sans MT"/>
               </a:rPr>
-              <a:t>Learning </a:t>
-            </a:r>
-            <a:r>
-              <a:rPr lang="en-US" sz="1800" b="0" strike="noStrike" spc="-1" dirty="0" smtClean="0">
-                <a:solidFill>
-                  <a:srgbClr val="000000"/>
-                </a:solidFill>
-                <a:latin typeface="Gill Sans MT"/>
-              </a:rPr>
-              <a:t>Groups)</a:t>
+              <a:t>Getting Help / SLGs (Student Learning Groups)</a:t>
             </a:r>
             <a:endParaRPr lang="en-CA" sz="1800" b="0" strike="noStrike" spc="-1" dirty="0">
               <a:latin typeface="Arial"/>
@@ -8248,7 +7738,7 @@
               </a:tabLst>
             </a:pPr>
             <a:r>
-              <a:rPr lang="en-US" sz="2000" b="1" strike="noStrike" spc="-1" dirty="0" smtClean="0">
+              <a:rPr lang="en-US" sz="2000" b="1" strike="noStrike" spc="-1" dirty="0">
                 <a:solidFill>
                   <a:srgbClr val="000000"/>
                 </a:solidFill>
@@ -8311,76 +7801,8 @@
                 </a:solidFill>
                 <a:latin typeface="Gill Sans MT"/>
               </a:rPr>
-              <a:t>Investigation #</a:t>
-            </a:r>
-            <a:r>
-              <a:rPr lang="en-US" sz="1800" b="1" strike="noStrike" spc="-1" dirty="0" smtClean="0">
-                <a:solidFill>
-                  <a:srgbClr val="000000"/>
-                </a:solidFill>
-                <a:latin typeface="Gill Sans MT"/>
-              </a:rPr>
-              <a:t>2</a:t>
-            </a:r>
-            <a:br>
-              <a:rPr lang="en-US" sz="1800" b="1" strike="noStrike" spc="-1" dirty="0" smtClean="0">
-                <a:solidFill>
-                  <a:srgbClr val="000000"/>
-                </a:solidFill>
-                <a:latin typeface="Gill Sans MT"/>
-              </a:rPr>
-            </a:br>
-            <a:r>
-              <a:rPr lang="en-US" sz="1800" b="1" strike="noStrike" spc="-1" dirty="0" smtClean="0">
-                <a:solidFill>
-                  <a:srgbClr val="000000"/>
-                </a:solidFill>
-                <a:latin typeface="Gill Sans MT"/>
-              </a:rPr>
-              <a:t/>
-            </a:r>
-            <a:br>
-              <a:rPr lang="en-US" sz="1800" b="1" strike="noStrike" spc="-1" dirty="0" smtClean="0">
-                <a:solidFill>
-                  <a:srgbClr val="000000"/>
-                </a:solidFill>
-                <a:latin typeface="Gill Sans MT"/>
-              </a:rPr>
-            </a:br>
-            <a:r>
-              <a:rPr lang="en-US" sz="1800" b="1" strike="noStrike" spc="-1" dirty="0" smtClean="0">
-                <a:solidFill>
-                  <a:srgbClr val="000000"/>
-                </a:solidFill>
-                <a:latin typeface="Gill Sans MT"/>
-              </a:rPr>
-              <a:t/>
-            </a:r>
-            <a:br>
-              <a:rPr lang="en-US" sz="1800" b="1" strike="noStrike" spc="-1" dirty="0" smtClean="0">
-                <a:solidFill>
-                  <a:srgbClr val="000000"/>
-                </a:solidFill>
-                <a:latin typeface="Gill Sans MT"/>
-              </a:rPr>
-            </a:br>
-            <a:r>
-              <a:rPr lang="en-US" sz="1800" b="1" strike="noStrike" spc="-1" dirty="0" smtClean="0">
-                <a:solidFill>
-                  <a:srgbClr val="000000"/>
-                </a:solidFill>
-                <a:latin typeface="Gill Sans MT"/>
-              </a:rPr>
-              <a:t/>
-            </a:r>
-            <a:br>
-              <a:rPr lang="en-US" sz="1800" b="1" strike="noStrike" spc="-1" dirty="0" smtClean="0">
-                <a:solidFill>
-                  <a:srgbClr val="000000"/>
-                </a:solidFill>
-                <a:latin typeface="Gill Sans MT"/>
-              </a:rPr>
-            </a:br>
+              <a:t>Investigation #2</a:t>
+            </a:r>
             <a:endParaRPr lang="en-CA" sz="1800" b="0" strike="noStrike" spc="-1" dirty="0">
               <a:latin typeface="Arial"/>
             </a:endParaRPr>
@@ -9395,10 +8817,6 @@
               </a:rPr>
               <a:t>directory </a:t>
             </a:r>
-            <a:r>
-              <a:rPr dirty="0"/>
-              <a:t/>
-            </a:r>
             <a:br>
               <a:rPr dirty="0"/>
             </a:br>
@@ -10338,17 +9756,9 @@
               </a:rPr>
               <a:t>”.</a:t>
             </a:r>
-            <a:r>
-              <a:rPr dirty="0"/>
-              <a:t/>
-            </a:r>
             <a:br>
               <a:rPr dirty="0"/>
             </a:br>
-            <a:r>
-              <a:rPr dirty="0"/>
-              <a:t/>
-            </a:r>
             <a:br>
               <a:rPr dirty="0"/>
             </a:br>
@@ -10360,10 +9770,6 @@
                 <a:latin typeface="Gill Sans MT"/>
               </a:rPr>
               <a:t>Example:</a:t>
-            </a:r>
-            <a:r>
-              <a:rPr dirty="0"/>
-              <a:t/>
             </a:r>
             <a:br>
               <a:rPr dirty="0"/>
@@ -10438,17 +9844,9 @@
               </a:rPr>
               <a:t> option to help list Linux commands that match a text pattern that is contained within the help screen for a Linux command.</a:t>
             </a:r>
-            <a:r>
-              <a:rPr dirty="0"/>
-              <a:t/>
-            </a:r>
             <a:br>
               <a:rPr dirty="0"/>
             </a:br>
-            <a:r>
-              <a:rPr dirty="0"/>
-              <a:t/>
-            </a:r>
             <a:br>
               <a:rPr dirty="0"/>
             </a:br>
@@ -10460,10 +9858,6 @@
                 <a:latin typeface="Gill Sans MT"/>
               </a:rPr>
               <a:t>Example:</a:t>
-            </a:r>
-            <a:r>
-              <a:rPr dirty="0"/>
-              <a:t/>
             </a:r>
             <a:br>
               <a:rPr dirty="0"/>
@@ -11636,13 +11030,6 @@
   <p:clrMapOvr>
     <a:masterClrMapping/>
   </p:clrMapOvr>
-  <p:timing>
-    <p:tnLst>
-      <p:par>
-        <p:cTn id="1" dur="indefinite" restart="never" nodeType="tmRoot"/>
-      </p:par>
-    </p:tnLst>
-  </p:timing>
 </p:sld>
 </file>
 
@@ -11818,15 +11205,8 @@
                 </a:solidFill>
                 <a:latin typeface="Gill Sans MT"/>
               </a:rPr>
-              <a:t> pages</a:t>
-            </a:r>
-            <a:r>
-              <a:rPr dirty="0"/>
-              <a:t/>
-            </a:r>
-            <a:br>
-              <a:rPr dirty="0"/>
-            </a:br>
+              <a:t> pages.</a:t>
+            </a:r>
             <a:endParaRPr lang="en-CA" sz="1600" b="0" strike="noStrike" spc="-1" dirty="0">
               <a:latin typeface="Arial"/>
             </a:endParaRPr>
@@ -11861,13 +11241,6 @@
   <p:clrMapOvr>
     <a:masterClrMapping/>
   </p:clrMapOvr>
-  <p:timing>
-    <p:tnLst>
-      <p:par>
-        <p:cTn id="1" dur="indefinite" restart="never" nodeType="tmRoot"/>
-      </p:par>
-    </p:tnLst>
-  </p:timing>
 </p:sld>
 </file>
 
@@ -12035,10 +11408,6 @@
                 <a:latin typeface="Gill Sans MT"/>
               </a:rPr>
               <a:t>Linux commands</a:t>
-            </a:r>
-            <a:r>
-              <a:rPr dirty="0"/>
-              <a:t/>
             </a:r>
             <a:br>
               <a:rPr dirty="0"/>
@@ -13680,13 +13049,6 @@
   <p:clrMapOvr>
     <a:masterClrMapping/>
   </p:clrMapOvr>
-  <p:timing>
-    <p:tnLst>
-      <p:par>
-        <p:cTn id="1" dur="indefinite" restart="never" nodeType="tmRoot"/>
-      </p:par>
-    </p:tnLst>
-  </p:timing>
 </p:sld>
 </file>
 
@@ -13853,16 +13215,7 @@
                 </a:solidFill>
                 <a:latin typeface="Gill Sans MT"/>
               </a:rPr>
-              <a:t>issue general Linux </a:t>
-            </a:r>
-            <a:r>
-              <a:rPr lang="en-CA" sz="1600" b="1" strike="noStrike" spc="-1" dirty="0" smtClean="0">
-                <a:solidFill>
-                  <a:srgbClr val="000000"/>
-                </a:solidFill>
-                <a:latin typeface="Gill Sans MT"/>
-              </a:rPr>
-              <a:t>commands</a:t>
+              <a:t>issue general Linux commands.</a:t>
             </a:r>
             <a:endParaRPr lang="en-CA" sz="1600" b="0" strike="noStrike" spc="-1" dirty="0">
               <a:latin typeface="Arial"/>
@@ -13903,13 +13256,6 @@
   <p:clrMapOvr>
     <a:masterClrMapping/>
   </p:clrMapOvr>
-  <p:timing>
-    <p:tnLst>
-      <p:par>
-        <p:cTn id="1" dur="indefinite" restart="never" nodeType="tmRoot"/>
-      </p:par>
-    </p:tnLst>
-  </p:timing>
 </p:sld>
 </file>
 
@@ -13995,7 +13341,7 @@
         </p:nvSpPr>
         <p:spPr>
           <a:xfrm>
-            <a:off x="1451520" y="1862158"/>
+            <a:off x="1451520" y="1883178"/>
             <a:ext cx="9602640" cy="1049718"/>
           </a:xfrm>
           <a:prstGeom prst="rect">
@@ -14086,10 +13432,6 @@
                 <a:latin typeface="Gill Sans MT"/>
               </a:rPr>
               <a:t> in any OS terminal will allow you to be more productive as a sysadmin. </a:t>
-            </a:r>
-            <a:r>
-              <a:rPr dirty="0"/>
-              <a:t/>
             </a:r>
             <a:br>
               <a:rPr dirty="0"/>
@@ -15082,10 +14424,6 @@
                           <a:latin typeface="Courier New"/>
                         </a:rPr>
                         <a:t>&lt;alt&gt;f/&lt;alt&gt;b</a:t>
-                      </a:r>
-                      <a:r>
-                        <a:rPr sz="1500"/>
-                        <a:t/>
                       </a:r>
                       <a:br>
                         <a:rPr sz="1500"/>
@@ -15276,17 +14614,9 @@
               </a:rPr>
               <a:t>NOTE:</a:t>
             </a:r>
-            <a:r>
-              <a:rPr dirty="0"/>
-              <a:t/>
-            </a:r>
             <a:br>
               <a:rPr dirty="0"/>
             </a:br>
-            <a:r>
-              <a:rPr dirty="0"/>
-              <a:t/>
-            </a:r>
             <a:br>
               <a:rPr dirty="0"/>
             </a:br>
@@ -15318,27 +14648,7 @@
                 <a:latin typeface="Gill Sans MT"/>
                 <a:ea typeface="DejaVu Sans"/>
               </a:rPr>
-              <a:t>, you </a:t>
-            </a:r>
-            <a:r>
-              <a:rPr lang="en-US" sz="1200" b="0" strike="noStrike" spc="-1" dirty="0" smtClean="0">
-                <a:solidFill>
-                  <a:srgbClr val="000000"/>
-                </a:solidFill>
-                <a:latin typeface="Gill Sans MT"/>
-                <a:ea typeface="DejaVu Sans"/>
-              </a:rPr>
-              <a:t>may </a:t>
-            </a:r>
-            <a:r>
-              <a:rPr lang="en-US" sz="1200" b="0" strike="noStrike" spc="-1" dirty="0">
-                <a:solidFill>
-                  <a:srgbClr val="000000"/>
-                </a:solidFill>
-                <a:latin typeface="Gill Sans MT"/>
-                <a:ea typeface="DejaVu Sans"/>
-              </a:rPr>
-              <a:t>need to configure the application (META settings) to NOT bring up menus by mistake when you issue some of these shortcuts.</a:t>
+              <a:t>, you may need to configure the application (META settings) to NOT bring up menus by mistake when you issue some of these shortcuts.</a:t>
             </a:r>
             <a:endParaRPr lang="en-CA" sz="1200" b="0" strike="noStrike" spc="-1" dirty="0">
               <a:latin typeface="Arial"/>
@@ -15351,13 +14661,6 @@
   <p:clrMapOvr>
     <a:masterClrMapping/>
   </p:clrMapOvr>
-  <p:timing>
-    <p:tnLst>
-      <p:par>
-        <p:cTn id="1" dur="indefinite" restart="never" nodeType="tmRoot"/>
-      </p:par>
-    </p:tnLst>
-  </p:timing>
 </p:sld>
 </file>
 

</xml_diff>

<commit_message>
Revert "2234 draft (#1)"
This reverts commit ad81f3e1ce4ad6c5f5a534ca09c9026edf6281fc.
</commit_message>
<xml_diff>
--- a/ULI101-1.2.pptx
+++ b/ULI101-1.2.pptx
@@ -4698,7 +4698,7 @@
                 </a:solidFill>
                 <a:latin typeface="Gill Sans MT"/>
               </a:rPr>
-              <a:t>Issuing Linux Commands / Linux Command Help</a:t>
+              <a:t>Issuing Linux Command / Linux Command Help</a:t>
             </a:r>
             <a:br>
               <a:rPr lang="en-US" sz="2400" b="0" strike="noStrike" cap="all" spc="-1" dirty="0">
@@ -7157,7 +7157,7 @@
                 </a:solidFill>
                 <a:latin typeface="Gill Sans MT"/>
               </a:rPr>
-              <a:t>Get acquainted with the </a:t>
+              <a:t>Get Acquainted with the </a:t>
             </a:r>
             <a:r>
               <a:rPr lang="en-US" sz="2400" b="1" strike="noStrike" spc="-1" dirty="0">
@@ -7265,7 +7265,7 @@
                 </a:solidFill>
                 <a:latin typeface="Gill Sans MT"/>
               </a:rPr>
-              <a:t>Tutorial #1</a:t>
+              <a:t>Tutorial 1</a:t>
             </a:r>
             <a:br>
               <a:rPr lang="en-US" sz="2400" spc="-1" dirty="0">
@@ -7282,10 +7282,19 @@
                 </a:solidFill>
                 <a:latin typeface="Gill Sans MT"/>
               </a:rPr>
-              <a:t>(Due: Friday Week 2 @ midnight for a 2% grade)</a:t>
-            </a:r>
-            <a:r>
-              <a:rPr lang="en-US" sz="2400" spc="-1" dirty="0">
+              <a:t>(Due: Friday Week 2 @ midnight for a 2% </a:t>
+            </a:r>
+            <a:r>
+              <a:rPr lang="en-US" sz="2400" b="1" spc="-1">
+                <a:solidFill>
+                  <a:srgbClr val="000000"/>
+                </a:solidFill>
+                <a:latin typeface="Gill Sans MT"/>
+              </a:rPr>
+              <a:t>grade)</a:t>
+            </a:r>
+            <a:r>
+              <a:rPr lang="en-US" sz="2400" spc="-1">
                 <a:solidFill>
                   <a:srgbClr val="000000"/>
                 </a:solidFill>
@@ -8285,7 +8294,7 @@
         <p:spPr>
           <a:xfrm>
             <a:off x="1451520" y="1862158"/>
-            <a:ext cx="9602640" cy="4005982"/>
+            <a:ext cx="7412040" cy="4005982"/>
           </a:xfrm>
           <a:prstGeom prst="rect">
             <a:avLst/>
@@ -8309,7 +8318,7 @@
         </p:style>
         <p:txBody>
           <a:bodyPr lIns="90000" tIns="45000" rIns="90000" bIns="45000">
-            <a:normAutofit fontScale="82000" lnSpcReduction="20000"/>
+            <a:normAutofit fontScale="74500" lnSpcReduction="20000"/>
           </a:bodyPr>
           <a:lstStyle/>
           <a:p>
@@ -9492,7 +9501,7 @@
         <p:spPr>
           <a:xfrm>
             <a:off x="1451520" y="1875440"/>
-            <a:ext cx="9602640" cy="3983822"/>
+            <a:ext cx="7886520" cy="3983822"/>
           </a:xfrm>
           <a:prstGeom prst="rect">
             <a:avLst/>
@@ -9516,7 +9525,7 @@
         </p:style>
         <p:txBody>
           <a:bodyPr lIns="90000" tIns="45000" rIns="90000" bIns="45000">
-            <a:normAutofit fontScale="81000" lnSpcReduction="10000"/>
+            <a:normAutofit fontScale="81000" lnSpcReduction="20000"/>
           </a:bodyPr>
           <a:lstStyle/>
           <a:p>
@@ -9768,16 +9777,13 @@
             <a:r>
               <a:rPr lang="en-CA" sz="1900" b="1" strike="noStrike" spc="-1" dirty="0">
                 <a:solidFill>
-                  <a:srgbClr val="0070C0"/>
+                  <a:srgbClr val="000000"/>
                 </a:solidFill>
                 <a:latin typeface="Gill Sans MT"/>
               </a:rPr>
               <a:t>man ls</a:t>
             </a:r>
             <a:endParaRPr lang="en-CA" sz="1900" b="0" strike="noStrike" spc="-1" dirty="0">
-              <a:solidFill>
-                <a:srgbClr val="0070C0"/>
-              </a:solidFill>
               <a:latin typeface="Arial"/>
             </a:endParaRPr>
           </a:p>
@@ -9859,16 +9865,13 @@
             <a:r>
               <a:rPr lang="en-CA" sz="1900" b="1" strike="noStrike" spc="-1" dirty="0">
                 <a:solidFill>
-                  <a:srgbClr val="0070C0"/>
+                  <a:srgbClr val="000000"/>
                 </a:solidFill>
                 <a:latin typeface="Gill Sans MT"/>
               </a:rPr>
               <a:t>man –k copy</a:t>
             </a:r>
             <a:endParaRPr lang="en-CA" sz="1900" b="0" strike="noStrike" spc="-1" dirty="0">
-              <a:solidFill>
-                <a:srgbClr val="0070C0"/>
-              </a:solidFill>
               <a:latin typeface="Arial"/>
             </a:endParaRPr>
           </a:p>
@@ -10199,7 +10202,7 @@
         <p:spPr>
           <a:xfrm>
             <a:off x="1451520" y="1871036"/>
-            <a:ext cx="9602640" cy="1227271"/>
+            <a:ext cx="7412040" cy="1227271"/>
           </a:xfrm>
           <a:prstGeom prst="rect">
             <a:avLst/>
@@ -10316,13 +10319,13 @@
           <p:nvPr>
             <p:extLst>
               <p:ext uri="{D42A27DB-BD31-4B8C-83A1-F6EECF244321}">
-                <p14:modId xmlns:p14="http://schemas.microsoft.com/office/powerpoint/2010/main" val="3588312695"/>
+                <p14:modId xmlns:p14="http://schemas.microsoft.com/office/powerpoint/2010/main" val="3424897345"/>
               </p:ext>
             </p:extLst>
           </p:nvPr>
         </p:nvGraphicFramePr>
         <p:xfrm>
-          <a:off x="2884080" y="3326356"/>
+          <a:off x="1561334" y="3315470"/>
           <a:ext cx="6423840" cy="2224800"/>
         </p:xfrm>
         <a:graphic>
@@ -11467,13 +11470,13 @@
           <p:nvPr>
             <p:extLst>
               <p:ext uri="{D42A27DB-BD31-4B8C-83A1-F6EECF244321}">
-                <p14:modId xmlns:p14="http://schemas.microsoft.com/office/powerpoint/2010/main" val="1018720564"/>
+                <p14:modId xmlns:p14="http://schemas.microsoft.com/office/powerpoint/2010/main" val="2323223250"/>
               </p:ext>
             </p:extLst>
           </p:nvPr>
         </p:nvGraphicFramePr>
         <p:xfrm>
-          <a:off x="2459242" y="3043080"/>
+          <a:off x="1576373" y="3174794"/>
           <a:ext cx="7273515" cy="2817360"/>
         </p:xfrm>
         <a:graphic>
@@ -12530,7 +12533,7 @@
                         </a:lnSpc>
                       </a:pPr>
                       <a:r>
-                        <a:rPr lang="en-US" sz="1100" b="0" strike="noStrike" spc="-1" dirty="0">
+                        <a:rPr lang="en-US" sz="1100" b="0" strike="noStrike" spc="-1">
                           <a:solidFill>
                             <a:srgbClr val="000000"/>
                           </a:solidFill>
@@ -12538,7 +12541,7 @@
                         </a:rPr>
                         <a:t>List users logged into server</a:t>
                       </a:r>
-                      <a:endParaRPr lang="en-CA" sz="1100" b="0" strike="noStrike" spc="-1" dirty="0">
+                      <a:endParaRPr lang="en-CA" sz="1100" b="0" strike="noStrike" spc="-1">
                         <a:latin typeface="Arial"/>
                       </a:endParaRPr>
                     </a:p>
@@ -14566,7 +14569,7 @@
         <p:spPr>
           <a:xfrm>
             <a:off x="8723880" y="3233695"/>
-            <a:ext cx="2161800" cy="1568206"/>
+            <a:ext cx="2161800" cy="1845205"/>
           </a:xfrm>
           <a:prstGeom prst="rect">
             <a:avLst/>
@@ -14611,6 +14614,9 @@
               </a:rPr>
               <a:t>NOTE:</a:t>
             </a:r>
+            <a:br>
+              <a:rPr dirty="0"/>
+            </a:br>
             <a:br>
               <a:rPr dirty="0"/>
             </a:br>

</xml_diff>

<commit_message>
Removes animations and replaces /bin with /etc.
/bin is replaced with /etc due to the use of ls -l in the example, as /bin is now a symlink and the example breaks.
</commit_message>
<xml_diff>
--- a/ULI101-1.2.pptx
+++ b/ULI101-1.2.pptx
@@ -129,13 +129,72 @@
 <file path=ppt/revisionInfo.xml><?xml version="1.0" encoding="utf-8"?>
 <p1510:revInfo xmlns:a="http://schemas.openxmlformats.org/drawingml/2006/main" xmlns:r="http://schemas.openxmlformats.org/officeDocument/2006/relationships" xmlns:p1510="http://schemas.microsoft.com/office/powerpoint/2015/10/main">
   <p1510:revLst>
-    <p1510:client id="{2E54DEDF-9CD1-0447-9868-6C7006017591}" v="94" dt="2022-09-10T18:20:38.672"/>
+    <p1510:client id="{5E12F8A7-3D5E-F649-9DC9-A5842418C743}" v="6" dt="2023-05-10T17:22:22.036"/>
   </p1510:revLst>
 </p1510:revInfo>
 </file>
 
 <file path=ppt/changesInfos/changesInfo1.xml><?xml version="1.0" encoding="utf-8"?>
 <pc:chgInfo xmlns:a="http://schemas.openxmlformats.org/drawingml/2006/main" xmlns:r="http://schemas.openxmlformats.org/officeDocument/2006/relationships" xmlns:ac="http://schemas.microsoft.com/office/drawing/2013/main/command" xmlns:pc="http://schemas.microsoft.com/office/powerpoint/2013/main/command">
+  <pc:docChgLst>
+    <pc:chgData name="Chris Johnson" userId="ff589efc-7bdb-4c2a-ab65-6fce12576f74" providerId="ADAL" clId="{5E12F8A7-3D5E-F649-9DC9-A5842418C743}"/>
+    <pc:docChg chg="modSld">
+      <pc:chgData name="Chris Johnson" userId="ff589efc-7bdb-4c2a-ab65-6fce12576f74" providerId="ADAL" clId="{5E12F8A7-3D5E-F649-9DC9-A5842418C743}" dt="2023-05-12T16:06:12.347" v="30" actId="20577"/>
+      <pc:docMkLst>
+        <pc:docMk/>
+      </pc:docMkLst>
+      <pc:sldChg chg="modAnim">
+        <pc:chgData name="Chris Johnson" userId="ff589efc-7bdb-4c2a-ab65-6fce12576f74" providerId="ADAL" clId="{5E12F8A7-3D5E-F649-9DC9-A5842418C743}" dt="2023-05-10T17:21:59.655" v="0"/>
+        <pc:sldMkLst>
+          <pc:docMk/>
+          <pc:sldMk cId="0" sldId="287"/>
+        </pc:sldMkLst>
+      </pc:sldChg>
+      <pc:sldChg chg="modSp mod modAnim">
+        <pc:chgData name="Chris Johnson" userId="ff589efc-7bdb-4c2a-ab65-6fce12576f74" providerId="ADAL" clId="{5E12F8A7-3D5E-F649-9DC9-A5842418C743}" dt="2023-05-12T16:06:12.347" v="30" actId="20577"/>
+        <pc:sldMkLst>
+          <pc:docMk/>
+          <pc:sldMk cId="0" sldId="288"/>
+        </pc:sldMkLst>
+        <pc:spChg chg="mod">
+          <ac:chgData name="Chris Johnson" userId="ff589efc-7bdb-4c2a-ab65-6fce12576f74" providerId="ADAL" clId="{5E12F8A7-3D5E-F649-9DC9-A5842418C743}" dt="2023-05-12T16:06:12.347" v="30" actId="20577"/>
+          <ac:spMkLst>
+            <pc:docMk/>
+            <pc:sldMk cId="0" sldId="288"/>
+            <ac:spMk id="189" creationId="{00000000-0000-0000-0000-000000000000}"/>
+          </ac:spMkLst>
+        </pc:spChg>
+      </pc:sldChg>
+      <pc:sldChg chg="modAnim">
+        <pc:chgData name="Chris Johnson" userId="ff589efc-7bdb-4c2a-ab65-6fce12576f74" providerId="ADAL" clId="{5E12F8A7-3D5E-F649-9DC9-A5842418C743}" dt="2023-05-10T17:22:05.480" v="2"/>
+        <pc:sldMkLst>
+          <pc:docMk/>
+          <pc:sldMk cId="0" sldId="289"/>
+        </pc:sldMkLst>
+      </pc:sldChg>
+      <pc:sldChg chg="modAnim">
+        <pc:chgData name="Chris Johnson" userId="ff589efc-7bdb-4c2a-ab65-6fce12576f74" providerId="ADAL" clId="{5E12F8A7-3D5E-F649-9DC9-A5842418C743}" dt="2023-05-10T17:22:15.070" v="3"/>
+        <pc:sldMkLst>
+          <pc:docMk/>
+          <pc:sldMk cId="0" sldId="295"/>
+        </pc:sldMkLst>
+      </pc:sldChg>
+      <pc:sldChg chg="modAnim">
+        <pc:chgData name="Chris Johnson" userId="ff589efc-7bdb-4c2a-ab65-6fce12576f74" providerId="ADAL" clId="{5E12F8A7-3D5E-F649-9DC9-A5842418C743}" dt="2023-05-10T17:22:22.036" v="5"/>
+        <pc:sldMkLst>
+          <pc:docMk/>
+          <pc:sldMk cId="0" sldId="302"/>
+        </pc:sldMkLst>
+      </pc:sldChg>
+      <pc:sldChg chg="modAnim">
+        <pc:chgData name="Chris Johnson" userId="ff589efc-7bdb-4c2a-ab65-6fce12576f74" providerId="ADAL" clId="{5E12F8A7-3D5E-F649-9DC9-A5842418C743}" dt="2023-05-10T17:22:18.820" v="4"/>
+        <pc:sldMkLst>
+          <pc:docMk/>
+          <pc:sldMk cId="553931379" sldId="308"/>
+        </pc:sldMkLst>
+      </pc:sldChg>
+    </pc:docChg>
+  </pc:docChgLst>
   <pc:docChgLst>
     <pc:chgData name="Chris Johnson" userId="ff589efc-7bdb-4c2a-ab65-6fce12576f74" providerId="ADAL" clId="{2E54DEDF-9CD1-0447-9868-6C7006017591}"/>
     <pc:docChg chg="undo custSel addSld delSld modSld">
@@ -5526,293 +5585,6 @@
   <p:clrMapOvr>
     <a:masterClrMapping/>
   </p:clrMapOvr>
-  <p:timing>
-    <p:tnLst>
-      <p:par>
-        <p:cTn id="1" dur="indefinite" restart="never" nodeType="tmRoot">
-          <p:childTnLst>
-            <p:seq concurrent="1" nextAc="seek">
-              <p:cTn id="2" dur="indefinite" nodeType="mainSeq">
-                <p:childTnLst>
-                  <p:par>
-                    <p:cTn id="3" fill="hold">
-                      <p:stCondLst>
-                        <p:cond delay="indefinite"/>
-                        <p:cond evt="onBegin" delay="0">
-                          <p:tn val="2"/>
-                        </p:cond>
-                      </p:stCondLst>
-                      <p:childTnLst>
-                        <p:par>
-                          <p:cTn id="4" fill="hold">
-                            <p:stCondLst>
-                              <p:cond delay="0"/>
-                            </p:stCondLst>
-                            <p:childTnLst>
-                              <p:par>
-                                <p:cTn id="5" presetID="1" presetClass="entr" presetSubtype="0" fill="hold" nodeType="withEffect">
-                                  <p:stCondLst>
-                                    <p:cond delay="0"/>
-                                  </p:stCondLst>
-                                  <p:childTnLst>
-                                    <p:set>
-                                      <p:cBhvr>
-                                        <p:cTn id="6" dur="1" fill="hold">
-                                          <p:stCondLst>
-                                            <p:cond delay="0"/>
-                                          </p:stCondLst>
-                                        </p:cTn>
-                                        <p:tgtEl>
-                                          <p:spTgt spid="214">
-                                            <p:txEl>
-                                              <p:pRg st="0" end="0"/>
-                                            </p:txEl>
-                                          </p:spTgt>
-                                        </p:tgtEl>
-                                        <p:attrNameLst>
-                                          <p:attrName>style.visibility</p:attrName>
-                                        </p:attrNameLst>
-                                      </p:cBhvr>
-                                      <p:to>
-                                        <p:strVal val="visible"/>
-                                      </p:to>
-                                    </p:set>
-                                  </p:childTnLst>
-                                </p:cTn>
-                              </p:par>
-                              <p:par>
-                                <p:cTn id="7" presetID="1" presetClass="entr" presetSubtype="0" fill="hold" nodeType="withEffect">
-                                  <p:stCondLst>
-                                    <p:cond delay="0"/>
-                                  </p:stCondLst>
-                                  <p:childTnLst>
-                                    <p:set>
-                                      <p:cBhvr>
-                                        <p:cTn id="8" dur="1" fill="hold">
-                                          <p:stCondLst>
-                                            <p:cond delay="0"/>
-                                          </p:stCondLst>
-                                        </p:cTn>
-                                        <p:tgtEl>
-                                          <p:spTgt spid="214">
-                                            <p:txEl>
-                                              <p:pRg st="1" end="1"/>
-                                            </p:txEl>
-                                          </p:spTgt>
-                                        </p:tgtEl>
-                                        <p:attrNameLst>
-                                          <p:attrName>style.visibility</p:attrName>
-                                        </p:attrNameLst>
-                                      </p:cBhvr>
-                                      <p:to>
-                                        <p:strVal val="visible"/>
-                                      </p:to>
-                                    </p:set>
-                                  </p:childTnLst>
-                                </p:cTn>
-                              </p:par>
-                              <p:par>
-                                <p:cTn id="9" presetID="1" presetClass="entr" presetSubtype="0" fill="hold" nodeType="withEffect">
-                                  <p:stCondLst>
-                                    <p:cond delay="0"/>
-                                  </p:stCondLst>
-                                  <p:childTnLst>
-                                    <p:set>
-                                      <p:cBhvr>
-                                        <p:cTn id="10" dur="1" fill="hold">
-                                          <p:stCondLst>
-                                            <p:cond delay="0"/>
-                                          </p:stCondLst>
-                                        </p:cTn>
-                                        <p:tgtEl>
-                                          <p:spTgt spid="2"/>
-                                        </p:tgtEl>
-                                        <p:attrNameLst>
-                                          <p:attrName>style.visibility</p:attrName>
-                                        </p:attrNameLst>
-                                      </p:cBhvr>
-                                      <p:to>
-                                        <p:strVal val="visible"/>
-                                      </p:to>
-                                    </p:set>
-                                  </p:childTnLst>
-                                </p:cTn>
-                              </p:par>
-                            </p:childTnLst>
-                          </p:cTn>
-                        </p:par>
-                      </p:childTnLst>
-                    </p:cTn>
-                  </p:par>
-                  <p:par>
-                    <p:cTn id="11" fill="hold">
-                      <p:stCondLst>
-                        <p:cond delay="indefinite"/>
-                      </p:stCondLst>
-                      <p:childTnLst>
-                        <p:par>
-                          <p:cTn id="12" fill="hold">
-                            <p:stCondLst>
-                              <p:cond delay="0"/>
-                            </p:stCondLst>
-                            <p:childTnLst>
-                              <p:par>
-                                <p:cTn id="13" presetID="1" presetClass="entr" presetSubtype="0" fill="hold" nodeType="clickEffect">
-                                  <p:stCondLst>
-                                    <p:cond delay="0"/>
-                                  </p:stCondLst>
-                                  <p:childTnLst>
-                                    <p:set>
-                                      <p:cBhvr>
-                                        <p:cTn id="14" dur="1" fill="hold">
-                                          <p:stCondLst>
-                                            <p:cond delay="0"/>
-                                          </p:stCondLst>
-                                        </p:cTn>
-                                        <p:tgtEl>
-                                          <p:spTgt spid="214">
-                                            <p:txEl>
-                                              <p:pRg st="2" end="2"/>
-                                            </p:txEl>
-                                          </p:spTgt>
-                                        </p:tgtEl>
-                                        <p:attrNameLst>
-                                          <p:attrName>style.visibility</p:attrName>
-                                        </p:attrNameLst>
-                                      </p:cBhvr>
-                                      <p:to>
-                                        <p:strVal val="visible"/>
-                                      </p:to>
-                                    </p:set>
-                                  </p:childTnLst>
-                                </p:cTn>
-                              </p:par>
-                            </p:childTnLst>
-                          </p:cTn>
-                        </p:par>
-                      </p:childTnLst>
-                    </p:cTn>
-                  </p:par>
-                  <p:par>
-                    <p:cTn id="15" fill="hold">
-                      <p:stCondLst>
-                        <p:cond delay="indefinite"/>
-                      </p:stCondLst>
-                      <p:childTnLst>
-                        <p:par>
-                          <p:cTn id="16" fill="hold">
-                            <p:stCondLst>
-                              <p:cond delay="0"/>
-                            </p:stCondLst>
-                            <p:childTnLst>
-                              <p:par>
-                                <p:cTn id="17" presetID="1" presetClass="entr" presetSubtype="0" fill="hold" nodeType="clickEffect">
-                                  <p:stCondLst>
-                                    <p:cond delay="0"/>
-                                  </p:stCondLst>
-                                  <p:childTnLst>
-                                    <p:set>
-                                      <p:cBhvr>
-                                        <p:cTn id="18" dur="1" fill="hold">
-                                          <p:stCondLst>
-                                            <p:cond delay="0"/>
-                                          </p:stCondLst>
-                                        </p:cTn>
-                                        <p:tgtEl>
-                                          <p:spTgt spid="214">
-                                            <p:txEl>
-                                              <p:pRg st="3" end="3"/>
-                                            </p:txEl>
-                                          </p:spTgt>
-                                        </p:tgtEl>
-                                        <p:attrNameLst>
-                                          <p:attrName>style.visibility</p:attrName>
-                                        </p:attrNameLst>
-                                      </p:cBhvr>
-                                      <p:to>
-                                        <p:strVal val="visible"/>
-                                      </p:to>
-                                    </p:set>
-                                  </p:childTnLst>
-                                </p:cTn>
-                              </p:par>
-                            </p:childTnLst>
-                          </p:cTn>
-                        </p:par>
-                      </p:childTnLst>
-                    </p:cTn>
-                  </p:par>
-                  <p:par>
-                    <p:cTn id="19" fill="hold">
-                      <p:stCondLst>
-                        <p:cond delay="indefinite"/>
-                      </p:stCondLst>
-                      <p:childTnLst>
-                        <p:par>
-                          <p:cTn id="20" fill="hold">
-                            <p:stCondLst>
-                              <p:cond delay="0"/>
-                            </p:stCondLst>
-                            <p:childTnLst>
-                              <p:par>
-                                <p:cTn id="21" presetID="1" presetClass="entr" presetSubtype="0" fill="hold" nodeType="clickEffect">
-                                  <p:stCondLst>
-                                    <p:cond delay="0"/>
-                                  </p:stCondLst>
-                                  <p:childTnLst>
-                                    <p:set>
-                                      <p:cBhvr>
-                                        <p:cTn id="22" dur="1" fill="hold">
-                                          <p:stCondLst>
-                                            <p:cond delay="0"/>
-                                          </p:stCondLst>
-                                        </p:cTn>
-                                        <p:tgtEl>
-                                          <p:spTgt spid="214">
-                                            <p:txEl>
-                                              <p:pRg st="4" end="4"/>
-                                            </p:txEl>
-                                          </p:spTgt>
-                                        </p:tgtEl>
-                                        <p:attrNameLst>
-                                          <p:attrName>style.visibility</p:attrName>
-                                        </p:attrNameLst>
-                                      </p:cBhvr>
-                                      <p:to>
-                                        <p:strVal val="visible"/>
-                                      </p:to>
-                                    </p:set>
-                                  </p:childTnLst>
-                                </p:cTn>
-                              </p:par>
-                            </p:childTnLst>
-                          </p:cTn>
-                        </p:par>
-                      </p:childTnLst>
-                    </p:cTn>
-                  </p:par>
-                </p:childTnLst>
-              </p:cTn>
-              <p:prevCondLst>
-                <p:cond evt="onPrev" delay="0">
-                  <p:tgtEl>
-                    <p:sldTgt/>
-                  </p:tgtEl>
-                </p:cond>
-              </p:prevCondLst>
-              <p:nextCondLst>
-                <p:cond evt="onNext" delay="0">
-                  <p:tgtEl>
-                    <p:sldTgt/>
-                  </p:tgtEl>
-                </p:cond>
-              </p:nextCondLst>
-            </p:seq>
-          </p:childTnLst>
-        </p:cTn>
-      </p:par>
-    </p:tnLst>
-  </p:timing>
 </p:sld>
 </file>
 
@@ -6169,208 +5941,6 @@
   <p:clrMapOvr>
     <a:masterClrMapping/>
   </p:clrMapOvr>
-  <p:timing>
-    <p:tnLst>
-      <p:par>
-        <p:cTn id="1" dur="indefinite" restart="never" nodeType="tmRoot">
-          <p:childTnLst>
-            <p:seq concurrent="1" nextAc="seek">
-              <p:cTn id="2" dur="indefinite" nodeType="mainSeq">
-                <p:childTnLst>
-                  <p:par>
-                    <p:cTn id="3" fill="hold">
-                      <p:stCondLst>
-                        <p:cond delay="indefinite"/>
-                        <p:cond evt="onBegin" delay="0">
-                          <p:tn val="2"/>
-                        </p:cond>
-                      </p:stCondLst>
-                      <p:childTnLst>
-                        <p:par>
-                          <p:cTn id="4" fill="hold">
-                            <p:stCondLst>
-                              <p:cond delay="0"/>
-                            </p:stCondLst>
-                            <p:childTnLst>
-                              <p:par>
-                                <p:cTn id="5" presetID="1" presetClass="entr" presetSubtype="0" fill="hold" nodeType="withEffect">
-                                  <p:stCondLst>
-                                    <p:cond delay="0"/>
-                                  </p:stCondLst>
-                                  <p:childTnLst>
-                                    <p:set>
-                                      <p:cBhvr>
-                                        <p:cTn id="6" dur="1" fill="hold">
-                                          <p:stCondLst>
-                                            <p:cond delay="0"/>
-                                          </p:stCondLst>
-                                        </p:cTn>
-                                        <p:tgtEl>
-                                          <p:spTgt spid="214">
-                                            <p:txEl>
-                                              <p:pRg st="0" end="0"/>
-                                            </p:txEl>
-                                          </p:spTgt>
-                                        </p:tgtEl>
-                                        <p:attrNameLst>
-                                          <p:attrName>style.visibility</p:attrName>
-                                        </p:attrNameLst>
-                                      </p:cBhvr>
-                                      <p:to>
-                                        <p:strVal val="visible"/>
-                                      </p:to>
-                                    </p:set>
-                                  </p:childTnLst>
-                                </p:cTn>
-                              </p:par>
-                              <p:par>
-                                <p:cTn id="7" presetID="1" presetClass="entr" presetSubtype="0" fill="hold" nodeType="withEffect">
-                                  <p:stCondLst>
-                                    <p:cond delay="0"/>
-                                  </p:stCondLst>
-                                  <p:childTnLst>
-                                    <p:set>
-                                      <p:cBhvr>
-                                        <p:cTn id="8" dur="1" fill="hold">
-                                          <p:stCondLst>
-                                            <p:cond delay="0"/>
-                                          </p:stCondLst>
-                                        </p:cTn>
-                                        <p:tgtEl>
-                                          <p:spTgt spid="214">
-                                            <p:txEl>
-                                              <p:pRg st="1" end="1"/>
-                                            </p:txEl>
-                                          </p:spTgt>
-                                        </p:tgtEl>
-                                        <p:attrNameLst>
-                                          <p:attrName>style.visibility</p:attrName>
-                                        </p:attrNameLst>
-                                      </p:cBhvr>
-                                      <p:to>
-                                        <p:strVal val="visible"/>
-                                      </p:to>
-                                    </p:set>
-                                  </p:childTnLst>
-                                </p:cTn>
-                              </p:par>
-                              <p:par>
-                                <p:cTn id="9" presetID="1" presetClass="entr" presetSubtype="0" fill="hold" nodeType="withEffect">
-                                  <p:stCondLst>
-                                    <p:cond delay="0"/>
-                                  </p:stCondLst>
-                                  <p:childTnLst>
-                                    <p:set>
-                                      <p:cBhvr>
-                                        <p:cTn id="10" dur="1" fill="hold">
-                                          <p:stCondLst>
-                                            <p:cond delay="0"/>
-                                          </p:stCondLst>
-                                        </p:cTn>
-                                        <p:tgtEl>
-                                          <p:spTgt spid="214">
-                                            <p:txEl>
-                                              <p:pRg st="2" end="2"/>
-                                            </p:txEl>
-                                          </p:spTgt>
-                                        </p:tgtEl>
-                                        <p:attrNameLst>
-                                          <p:attrName>style.visibility</p:attrName>
-                                        </p:attrNameLst>
-                                      </p:cBhvr>
-                                      <p:to>
-                                        <p:strVal val="visible"/>
-                                      </p:to>
-                                    </p:set>
-                                  </p:childTnLst>
-                                </p:cTn>
-                              </p:par>
-                              <p:par>
-                                <p:cTn id="11" presetID="1" presetClass="entr" presetSubtype="0" fill="hold" nodeType="withEffect">
-                                  <p:stCondLst>
-                                    <p:cond delay="0"/>
-                                  </p:stCondLst>
-                                  <p:childTnLst>
-                                    <p:set>
-                                      <p:cBhvr>
-                                        <p:cTn id="12" dur="1" fill="hold">
-                                          <p:stCondLst>
-                                            <p:cond delay="0"/>
-                                          </p:stCondLst>
-                                        </p:cTn>
-                                        <p:tgtEl>
-                                          <p:spTgt spid="214">
-                                            <p:txEl>
-                                              <p:pRg st="3" end="3"/>
-                                            </p:txEl>
-                                          </p:spTgt>
-                                        </p:tgtEl>
-                                        <p:attrNameLst>
-                                          <p:attrName>style.visibility</p:attrName>
-                                        </p:attrNameLst>
-                                      </p:cBhvr>
-                                      <p:to>
-                                        <p:strVal val="visible"/>
-                                      </p:to>
-                                    </p:set>
-                                  </p:childTnLst>
-                                </p:cTn>
-                              </p:par>
-                              <p:par>
-                                <p:cTn id="13" presetID="1" presetClass="entr" presetSubtype="0" fill="hold" nodeType="withEffect">
-                                  <p:stCondLst>
-                                    <p:cond delay="0"/>
-                                  </p:stCondLst>
-                                  <p:childTnLst>
-                                    <p:set>
-                                      <p:cBhvr>
-                                        <p:cTn id="14" dur="1" fill="hold">
-                                          <p:stCondLst>
-                                            <p:cond delay="0"/>
-                                          </p:stCondLst>
-                                        </p:cTn>
-                                        <p:tgtEl>
-                                          <p:spTgt spid="3"/>
-                                        </p:tgtEl>
-                                        <p:attrNameLst>
-                                          <p:attrName>style.visibility</p:attrName>
-                                        </p:attrNameLst>
-                                      </p:cBhvr>
-                                      <p:to>
-                                        <p:strVal val="visible"/>
-                                      </p:to>
-                                    </p:set>
-                                  </p:childTnLst>
-                                </p:cTn>
-                              </p:par>
-                            </p:childTnLst>
-                          </p:cTn>
-                        </p:par>
-                      </p:childTnLst>
-                    </p:cTn>
-                  </p:par>
-                </p:childTnLst>
-              </p:cTn>
-              <p:prevCondLst>
-                <p:cond evt="onPrev" delay="0">
-                  <p:tgtEl>
-                    <p:sldTgt/>
-                  </p:tgtEl>
-                </p:cond>
-              </p:prevCondLst>
-              <p:nextCondLst>
-                <p:cond evt="onNext" delay="0">
-                  <p:tgtEl>
-                    <p:sldTgt/>
-                  </p:tgtEl>
-                </p:cond>
-              </p:nextCondLst>
-            </p:seq>
-          </p:childTnLst>
-        </p:cTn>
-      </p:par>
-    </p:tnLst>
-  </p:timing>
 </p:sld>
 </file>
 
@@ -6794,235 +6364,6 @@
   <p:clrMapOvr>
     <a:masterClrMapping/>
   </p:clrMapOvr>
-  <p:timing>
-    <p:tnLst>
-      <p:par>
-        <p:cTn id="1" dur="indefinite" restart="never" nodeType="tmRoot">
-          <p:childTnLst>
-            <p:seq concurrent="1" nextAc="seek">
-              <p:cTn id="2" dur="indefinite" nodeType="mainSeq">
-                <p:childTnLst>
-                  <p:par>
-                    <p:cTn id="3" fill="hold">
-                      <p:stCondLst>
-                        <p:cond delay="indefinite"/>
-                        <p:cond evt="onBegin" delay="0">
-                          <p:tn val="2"/>
-                        </p:cond>
-                      </p:stCondLst>
-                      <p:childTnLst>
-                        <p:par>
-                          <p:cTn id="4" fill="hold">
-                            <p:stCondLst>
-                              <p:cond delay="0"/>
-                            </p:stCondLst>
-                            <p:childTnLst>
-                              <p:par>
-                                <p:cTn id="5" presetID="1" presetClass="entr" presetSubtype="0" fill="hold" nodeType="withEffect">
-                                  <p:stCondLst>
-                                    <p:cond delay="0"/>
-                                  </p:stCondLst>
-                                  <p:childTnLst>
-                                    <p:set>
-                                      <p:cBhvr>
-                                        <p:cTn id="6" dur="1" fill="hold">
-                                          <p:stCondLst>
-                                            <p:cond delay="0"/>
-                                          </p:stCondLst>
-                                        </p:cTn>
-                                        <p:tgtEl>
-                                          <p:spTgt spid="235">
-                                            <p:txEl>
-                                              <p:pRg st="0" end="0"/>
-                                            </p:txEl>
-                                          </p:spTgt>
-                                        </p:tgtEl>
-                                        <p:attrNameLst>
-                                          <p:attrName>style.visibility</p:attrName>
-                                        </p:attrNameLst>
-                                      </p:cBhvr>
-                                      <p:to>
-                                        <p:strVal val="visible"/>
-                                      </p:to>
-                                    </p:set>
-                                  </p:childTnLst>
-                                </p:cTn>
-                              </p:par>
-                            </p:childTnLst>
-                          </p:cTn>
-                        </p:par>
-                      </p:childTnLst>
-                    </p:cTn>
-                  </p:par>
-                  <p:par>
-                    <p:cTn id="7" fill="hold">
-                      <p:stCondLst>
-                        <p:cond delay="indefinite"/>
-                      </p:stCondLst>
-                      <p:childTnLst>
-                        <p:par>
-                          <p:cTn id="8" fill="hold">
-                            <p:stCondLst>
-                              <p:cond delay="0"/>
-                            </p:stCondLst>
-                            <p:childTnLst>
-                              <p:par>
-                                <p:cTn id="9" presetID="1" presetClass="entr" presetSubtype="0" fill="hold" nodeType="clickEffect">
-                                  <p:stCondLst>
-                                    <p:cond delay="0"/>
-                                  </p:stCondLst>
-                                  <p:childTnLst>
-                                    <p:set>
-                                      <p:cBhvr>
-                                        <p:cTn id="10" dur="1" fill="hold">
-                                          <p:stCondLst>
-                                            <p:cond delay="0"/>
-                                          </p:stCondLst>
-                                        </p:cTn>
-                                        <p:tgtEl>
-                                          <p:spTgt spid="235">
-                                            <p:txEl>
-                                              <p:pRg st="1" end="1"/>
-                                            </p:txEl>
-                                          </p:spTgt>
-                                        </p:tgtEl>
-                                        <p:attrNameLst>
-                                          <p:attrName>style.visibility</p:attrName>
-                                        </p:attrNameLst>
-                                      </p:cBhvr>
-                                      <p:to>
-                                        <p:strVal val="visible"/>
-                                      </p:to>
-                                    </p:set>
-                                  </p:childTnLst>
-                                </p:cTn>
-                              </p:par>
-                            </p:childTnLst>
-                          </p:cTn>
-                        </p:par>
-                      </p:childTnLst>
-                    </p:cTn>
-                  </p:par>
-                  <p:par>
-                    <p:cTn id="11" fill="hold">
-                      <p:stCondLst>
-                        <p:cond delay="indefinite"/>
-                      </p:stCondLst>
-                      <p:childTnLst>
-                        <p:par>
-                          <p:cTn id="12" fill="hold">
-                            <p:stCondLst>
-                              <p:cond delay="0"/>
-                            </p:stCondLst>
-                            <p:childTnLst>
-                              <p:par>
-                                <p:cTn id="13" presetID="1" presetClass="entr" presetSubtype="0" fill="hold" nodeType="clickEffect">
-                                  <p:stCondLst>
-                                    <p:cond delay="0"/>
-                                  </p:stCondLst>
-                                  <p:childTnLst>
-                                    <p:set>
-                                      <p:cBhvr>
-                                        <p:cTn id="14" dur="1" fill="hold">
-                                          <p:stCondLst>
-                                            <p:cond delay="0"/>
-                                          </p:stCondLst>
-                                        </p:cTn>
-                                        <p:tgtEl>
-                                          <p:spTgt spid="235">
-                                            <p:txEl>
-                                              <p:pRg st="2" end="2"/>
-                                            </p:txEl>
-                                          </p:spTgt>
-                                        </p:tgtEl>
-                                        <p:attrNameLst>
-                                          <p:attrName>style.visibility</p:attrName>
-                                        </p:attrNameLst>
-                                      </p:cBhvr>
-                                      <p:to>
-                                        <p:strVal val="visible"/>
-                                      </p:to>
-                                    </p:set>
-                                  </p:childTnLst>
-                                </p:cTn>
-                              </p:par>
-                            </p:childTnLst>
-                          </p:cTn>
-                        </p:par>
-                      </p:childTnLst>
-                    </p:cTn>
-                  </p:par>
-                  <p:par>
-                    <p:cTn id="15" fill="hold">
-                      <p:stCondLst>
-                        <p:cond delay="indefinite"/>
-                      </p:stCondLst>
-                      <p:childTnLst>
-                        <p:par>
-                          <p:cTn id="16" fill="hold">
-                            <p:stCondLst>
-                              <p:cond delay="0"/>
-                            </p:stCondLst>
-                            <p:childTnLst>
-                              <p:par>
-                                <p:cTn id="17" presetID="1" presetClass="entr" presetSubtype="0" fill="hold" nodeType="clickEffect">
-                                  <p:stCondLst>
-                                    <p:cond delay="0"/>
-                                  </p:stCondLst>
-                                  <p:childTnLst>
-                                    <p:set>
-                                      <p:cBhvr>
-                                        <p:cTn id="18" dur="1" fill="hold">
-                                          <p:stCondLst>
-                                            <p:cond delay="0"/>
-                                          </p:stCondLst>
-                                        </p:cTn>
-                                        <p:tgtEl>
-                                          <p:spTgt spid="235">
-                                            <p:txEl>
-                                              <p:pRg st="3" end="3"/>
-                                            </p:txEl>
-                                          </p:spTgt>
-                                        </p:tgtEl>
-                                        <p:attrNameLst>
-                                          <p:attrName>style.visibility</p:attrName>
-                                        </p:attrNameLst>
-                                      </p:cBhvr>
-                                      <p:to>
-                                        <p:strVal val="visible"/>
-                                      </p:to>
-                                    </p:set>
-                                  </p:childTnLst>
-                                </p:cTn>
-                              </p:par>
-                            </p:childTnLst>
-                          </p:cTn>
-                        </p:par>
-                      </p:childTnLst>
-                    </p:cTn>
-                  </p:par>
-                </p:childTnLst>
-              </p:cTn>
-              <p:prevCondLst>
-                <p:cond evt="onPrev" delay="0">
-                  <p:tgtEl>
-                    <p:sldTgt/>
-                  </p:tgtEl>
-                </p:cond>
-              </p:prevCondLst>
-              <p:nextCondLst>
-                <p:cond evt="onNext" delay="0">
-                  <p:tgtEl>
-                    <p:sldTgt/>
-                  </p:tgtEl>
-                </p:cond>
-              </p:nextCondLst>
-            </p:seq>
-          </p:childTnLst>
-        </p:cTn>
-      </p:par>
-    </p:tnLst>
-  </p:timing>
 </p:sld>
 </file>
 
@@ -7805,400 +7146,6 @@
   <p:clrMapOvr>
     <a:masterClrMapping/>
   </p:clrMapOvr>
-  <p:timing>
-    <p:tnLst>
-      <p:par>
-        <p:cTn id="1" dur="indefinite" restart="never" nodeType="tmRoot">
-          <p:childTnLst>
-            <p:seq>
-              <p:cTn id="2" dur="indefinite" nodeType="mainSeq">
-                <p:childTnLst>
-                  <p:par>
-                    <p:cTn id="3" fill="hold">
-                      <p:stCondLst>
-                        <p:cond delay="indefinite"/>
-                      </p:stCondLst>
-                      <p:childTnLst>
-                        <p:par>
-                          <p:cTn id="4" fill="hold">
-                            <p:stCondLst>
-                              <p:cond delay="0"/>
-                            </p:stCondLst>
-                            <p:childTnLst>
-                              <p:par>
-                                <p:cTn id="5" presetID="1" presetClass="entr" fill="hold" nodeType="clickEffect">
-                                  <p:stCondLst>
-                                    <p:cond delay="0"/>
-                                  </p:stCondLst>
-                                  <p:childTnLst>
-                                    <p:set>
-                                      <p:cBhvr>
-                                        <p:cTn id="6" dur="1" fill="hold">
-                                          <p:stCondLst>
-                                            <p:cond delay="0"/>
-                                          </p:stCondLst>
-                                        </p:cTn>
-                                        <p:tgtEl>
-                                          <p:spTgt spid="187">
-                                            <p:txEl>
-                                              <p:pRg st="0" end="0"/>
-                                            </p:txEl>
-                                          </p:spTgt>
-                                        </p:tgtEl>
-                                        <p:attrNameLst>
-                                          <p:attrName>style.visibility</p:attrName>
-                                        </p:attrNameLst>
-                                      </p:cBhvr>
-                                      <p:to>
-                                        <p:strVal val="visible"/>
-                                      </p:to>
-                                    </p:set>
-                                  </p:childTnLst>
-                                </p:cTn>
-                              </p:par>
-                              <p:par>
-                                <p:cTn id="7" presetID="1" presetClass="entr" fill="hold" nodeType="withEffect">
-                                  <p:stCondLst>
-                                    <p:cond delay="0"/>
-                                  </p:stCondLst>
-                                  <p:childTnLst>
-                                    <p:set>
-                                      <p:cBhvr>
-                                        <p:cTn id="8" dur="1" fill="hold">
-                                          <p:stCondLst>
-                                            <p:cond delay="0"/>
-                                          </p:stCondLst>
-                                        </p:cTn>
-                                        <p:tgtEl>
-                                          <p:spTgt spid="187">
-                                            <p:txEl>
-                                              <p:pRg st="1" end="1"/>
-                                            </p:txEl>
-                                          </p:spTgt>
-                                        </p:tgtEl>
-                                        <p:attrNameLst>
-                                          <p:attrName>style.visibility</p:attrName>
-                                        </p:attrNameLst>
-                                      </p:cBhvr>
-                                      <p:to>
-                                        <p:strVal val="visible"/>
-                                      </p:to>
-                                    </p:set>
-                                  </p:childTnLst>
-                                </p:cTn>
-                              </p:par>
-                              <p:par>
-                                <p:cTn id="9" presetID="1" presetClass="entr" fill="hold" nodeType="withEffect">
-                                  <p:stCondLst>
-                                    <p:cond delay="0"/>
-                                  </p:stCondLst>
-                                  <p:childTnLst>
-                                    <p:set>
-                                      <p:cBhvr>
-                                        <p:cTn id="10" dur="1" fill="hold">
-                                          <p:stCondLst>
-                                            <p:cond delay="0"/>
-                                          </p:stCondLst>
-                                        </p:cTn>
-                                        <p:tgtEl>
-                                          <p:spTgt spid="187">
-                                            <p:txEl>
-                                              <p:pRg st="2" end="2"/>
-                                            </p:txEl>
-                                          </p:spTgt>
-                                        </p:tgtEl>
-                                        <p:attrNameLst>
-                                          <p:attrName>style.visibility</p:attrName>
-                                        </p:attrNameLst>
-                                      </p:cBhvr>
-                                      <p:to>
-                                        <p:strVal val="visible"/>
-                                      </p:to>
-                                    </p:set>
-                                  </p:childTnLst>
-                                </p:cTn>
-                              </p:par>
-                              <p:par>
-                                <p:cTn id="11" presetID="1" presetClass="entr" fill="hold" nodeType="withEffect">
-                                  <p:stCondLst>
-                                    <p:cond delay="0"/>
-                                  </p:stCondLst>
-                                  <p:childTnLst>
-                                    <p:set>
-                                      <p:cBhvr>
-                                        <p:cTn id="12" dur="1" fill="hold">
-                                          <p:stCondLst>
-                                            <p:cond delay="0"/>
-                                          </p:stCondLst>
-                                        </p:cTn>
-                                        <p:tgtEl>
-                                          <p:spTgt spid="187">
-                                            <p:txEl>
-                                              <p:pRg st="3" end="3"/>
-                                            </p:txEl>
-                                          </p:spTgt>
-                                        </p:tgtEl>
-                                        <p:attrNameLst>
-                                          <p:attrName>style.visibility</p:attrName>
-                                        </p:attrNameLst>
-                                      </p:cBhvr>
-                                      <p:to>
-                                        <p:strVal val="visible"/>
-                                      </p:to>
-                                    </p:set>
-                                  </p:childTnLst>
-                                </p:cTn>
-                              </p:par>
-                            </p:childTnLst>
-                          </p:cTn>
-                        </p:par>
-                      </p:childTnLst>
-                    </p:cTn>
-                  </p:par>
-                  <p:par>
-                    <p:cTn id="13" fill="hold">
-                      <p:stCondLst>
-                        <p:cond delay="indefinite"/>
-                      </p:stCondLst>
-                      <p:childTnLst>
-                        <p:par>
-                          <p:cTn id="14" fill="hold">
-                            <p:stCondLst>
-                              <p:cond delay="0"/>
-                            </p:stCondLst>
-                            <p:childTnLst>
-                              <p:par>
-                                <p:cTn id="15" presetID="1" presetClass="entr" fill="hold" nodeType="clickEffect">
-                                  <p:stCondLst>
-                                    <p:cond delay="0"/>
-                                  </p:stCondLst>
-                                  <p:childTnLst>
-                                    <p:set>
-                                      <p:cBhvr>
-                                        <p:cTn id="16" dur="1" fill="hold">
-                                          <p:stCondLst>
-                                            <p:cond delay="0"/>
-                                          </p:stCondLst>
-                                        </p:cTn>
-                                        <p:tgtEl>
-                                          <p:spTgt spid="187">
-                                            <p:txEl>
-                                              <p:pRg st="4" end="4"/>
-                                            </p:txEl>
-                                          </p:spTgt>
-                                        </p:tgtEl>
-                                        <p:attrNameLst>
-                                          <p:attrName>style.visibility</p:attrName>
-                                        </p:attrNameLst>
-                                      </p:cBhvr>
-                                      <p:to>
-                                        <p:strVal val="visible"/>
-                                      </p:to>
-                                    </p:set>
-                                  </p:childTnLst>
-                                </p:cTn>
-                              </p:par>
-                              <p:par>
-                                <p:cTn id="17" presetID="1" presetClass="entr" fill="hold" nodeType="withEffect">
-                                  <p:stCondLst>
-                                    <p:cond delay="0"/>
-                                  </p:stCondLst>
-                                  <p:childTnLst>
-                                    <p:set>
-                                      <p:cBhvr>
-                                        <p:cTn id="18" dur="1" fill="hold">
-                                          <p:stCondLst>
-                                            <p:cond delay="0"/>
-                                          </p:stCondLst>
-                                        </p:cTn>
-                                        <p:tgtEl>
-                                          <p:spTgt spid="187">
-                                            <p:txEl>
-                                              <p:pRg st="5" end="5"/>
-                                            </p:txEl>
-                                          </p:spTgt>
-                                        </p:tgtEl>
-                                        <p:attrNameLst>
-                                          <p:attrName>style.visibility</p:attrName>
-                                        </p:attrNameLst>
-                                      </p:cBhvr>
-                                      <p:to>
-                                        <p:strVal val="visible"/>
-                                      </p:to>
-                                    </p:set>
-                                  </p:childTnLst>
-                                </p:cTn>
-                              </p:par>
-                              <p:par>
-                                <p:cTn id="19" presetID="1" presetClass="entr" fill="hold" nodeType="withEffect">
-                                  <p:stCondLst>
-                                    <p:cond delay="0"/>
-                                  </p:stCondLst>
-                                  <p:childTnLst>
-                                    <p:set>
-                                      <p:cBhvr>
-                                        <p:cTn id="20" dur="1" fill="hold">
-                                          <p:stCondLst>
-                                            <p:cond delay="0"/>
-                                          </p:stCondLst>
-                                        </p:cTn>
-                                        <p:tgtEl>
-                                          <p:spTgt spid="187">
-                                            <p:txEl>
-                                              <p:pRg st="6" end="6"/>
-                                            </p:txEl>
-                                          </p:spTgt>
-                                        </p:tgtEl>
-                                        <p:attrNameLst>
-                                          <p:attrName>style.visibility</p:attrName>
-                                        </p:attrNameLst>
-                                      </p:cBhvr>
-                                      <p:to>
-                                        <p:strVal val="visible"/>
-                                      </p:to>
-                                    </p:set>
-                                  </p:childTnLst>
-                                </p:cTn>
-                              </p:par>
-                              <p:par>
-                                <p:cTn id="21" presetID="1" presetClass="entr" fill="hold" nodeType="withEffect">
-                                  <p:stCondLst>
-                                    <p:cond delay="0"/>
-                                  </p:stCondLst>
-                                  <p:childTnLst>
-                                    <p:set>
-                                      <p:cBhvr>
-                                        <p:cTn id="22" dur="1" fill="hold">
-                                          <p:stCondLst>
-                                            <p:cond delay="0"/>
-                                          </p:stCondLst>
-                                        </p:cTn>
-                                        <p:tgtEl>
-                                          <p:spTgt spid="187">
-                                            <p:txEl>
-                                              <p:pRg st="7" end="7"/>
-                                            </p:txEl>
-                                          </p:spTgt>
-                                        </p:tgtEl>
-                                        <p:attrNameLst>
-                                          <p:attrName>style.visibility</p:attrName>
-                                        </p:attrNameLst>
-                                      </p:cBhvr>
-                                      <p:to>
-                                        <p:strVal val="visible"/>
-                                      </p:to>
-                                    </p:set>
-                                  </p:childTnLst>
-                                </p:cTn>
-                              </p:par>
-                            </p:childTnLst>
-                          </p:cTn>
-                        </p:par>
-                      </p:childTnLst>
-                    </p:cTn>
-                  </p:par>
-                  <p:par>
-                    <p:cTn id="23" fill="hold">
-                      <p:stCondLst>
-                        <p:cond delay="indefinite"/>
-                      </p:stCondLst>
-                      <p:childTnLst>
-                        <p:par>
-                          <p:cTn id="24" fill="hold">
-                            <p:stCondLst>
-                              <p:cond delay="0"/>
-                            </p:stCondLst>
-                            <p:childTnLst>
-                              <p:par>
-                                <p:cTn id="25" presetID="1" presetClass="entr" fill="hold" nodeType="clickEffect">
-                                  <p:stCondLst>
-                                    <p:cond delay="0"/>
-                                  </p:stCondLst>
-                                  <p:childTnLst>
-                                    <p:set>
-                                      <p:cBhvr>
-                                        <p:cTn id="26" dur="1" fill="hold">
-                                          <p:stCondLst>
-                                            <p:cond delay="0"/>
-                                          </p:stCondLst>
-                                        </p:cTn>
-                                        <p:tgtEl>
-                                          <p:spTgt spid="187">
-                                            <p:txEl>
-                                              <p:pRg st="8" end="8"/>
-                                            </p:txEl>
-                                          </p:spTgt>
-                                        </p:tgtEl>
-                                        <p:attrNameLst>
-                                          <p:attrName>style.visibility</p:attrName>
-                                        </p:attrNameLst>
-                                      </p:cBhvr>
-                                      <p:to>
-                                        <p:strVal val="visible"/>
-                                      </p:to>
-                                    </p:set>
-                                  </p:childTnLst>
-                                </p:cTn>
-                              </p:par>
-                              <p:par>
-                                <p:cTn id="27" presetID="1" presetClass="entr" fill="hold" nodeType="withEffect">
-                                  <p:stCondLst>
-                                    <p:cond delay="0"/>
-                                  </p:stCondLst>
-                                  <p:childTnLst>
-                                    <p:set>
-                                      <p:cBhvr>
-                                        <p:cTn id="28" dur="1" fill="hold">
-                                          <p:stCondLst>
-                                            <p:cond delay="0"/>
-                                          </p:stCondLst>
-                                        </p:cTn>
-                                        <p:tgtEl>
-                                          <p:spTgt spid="187">
-                                            <p:txEl>
-                                              <p:pRg st="9" end="9"/>
-                                            </p:txEl>
-                                          </p:spTgt>
-                                        </p:tgtEl>
-                                        <p:attrNameLst>
-                                          <p:attrName>style.visibility</p:attrName>
-                                        </p:attrNameLst>
-                                      </p:cBhvr>
-                                      <p:to>
-                                        <p:strVal val="visible"/>
-                                      </p:to>
-                                    </p:set>
-                                  </p:childTnLst>
-                                </p:cTn>
-                              </p:par>
-                            </p:childTnLst>
-                          </p:cTn>
-                        </p:par>
-                      </p:childTnLst>
-                    </p:cTn>
-                  </p:par>
-                </p:childTnLst>
-              </p:cTn>
-              <p:prevCondLst>
-                <p:cond evt="onPrev" delay="0">
-                  <p:tgtEl>
-                    <p:sldTgt/>
-                  </p:tgtEl>
-                </p:cond>
-              </p:prevCondLst>
-              <p:nextCondLst>
-                <p:cond evt="onNext" delay="0">
-                  <p:tgtEl>
-                    <p:sldTgt/>
-                  </p:tgtEl>
-                </p:cond>
-              </p:nextCondLst>
-            </p:seq>
-          </p:childTnLst>
-        </p:cTn>
-      </p:par>
-    </p:tnLst>
-  </p:timing>
 </p:sld>
 </file>
 
@@ -8770,7 +7717,16 @@
                 </a:solidFill>
                 <a:latin typeface="Gill Sans MT"/>
               </a:rPr>
-              <a:t>ls /bin</a:t>
+              <a:t>ls /</a:t>
+            </a:r>
+            <a:r>
+              <a:rPr lang="en-CA" sz="2000" b="1" strike="noStrike" spc="-1" dirty="0" err="1">
+                <a:solidFill>
+                  <a:srgbClr val="0070C0"/>
+                </a:solidFill>
+                <a:latin typeface="Gill Sans MT"/>
+              </a:rPr>
+              <a:t>etc</a:t>
             </a:r>
             <a:r>
               <a:rPr lang="en-CA" sz="2000" b="0" strike="noStrike" spc="-1" dirty="0">
@@ -8797,7 +7753,25 @@
                 </a:solidFill>
                 <a:latin typeface="Gill Sans MT"/>
               </a:rPr>
-              <a:t>/bin </a:t>
+              <a:t>/</a:t>
+            </a:r>
+            <a:r>
+              <a:rPr lang="en-CA" sz="2000" b="1" strike="noStrike" spc="-1" dirty="0" err="1">
+                <a:solidFill>
+                  <a:srgbClr val="000000"/>
+                </a:solidFill>
+                <a:latin typeface="Gill Sans MT"/>
+              </a:rPr>
+              <a:t>etc</a:t>
+            </a:r>
+            <a:r>
+              <a:rPr lang="en-CA" sz="2000" b="1" strike="noStrike" spc="-1" dirty="0">
+                <a:solidFill>
+                  <a:srgbClr val="000000"/>
+                </a:solidFill>
+                <a:latin typeface="Gill Sans MT"/>
+              </a:rPr>
+              <a:t> </a:t>
             </a:r>
             <a:r>
               <a:rPr lang="en-CA" sz="2000" b="0" strike="noStrike" spc="-1" dirty="0">
@@ -8959,7 +7933,16 @@
                 </a:solidFill>
                 <a:latin typeface="Gill Sans MT"/>
               </a:rPr>
-              <a:t>ls -l /bin</a:t>
+              <a:t>ls -l /</a:t>
+            </a:r>
+            <a:r>
+              <a:rPr lang="en-CA" sz="2000" b="1" strike="noStrike" spc="-1" dirty="0" err="1">
+                <a:solidFill>
+                  <a:srgbClr val="0070C0"/>
+                </a:solidFill>
+                <a:latin typeface="Gill Sans MT"/>
+              </a:rPr>
+              <a:t>etc</a:t>
             </a:r>
             <a:r>
               <a:rPr lang="en-CA" sz="2000" b="0" strike="noStrike" spc="-1" dirty="0">
@@ -9004,7 +7987,34 @@
                 </a:solidFill>
                 <a:latin typeface="Gill Sans MT"/>
               </a:rPr>
-              <a:t>/bin</a:t>
+              <a:t>/</a:t>
+            </a:r>
+            <a:r>
+              <a:rPr lang="en-CA" sz="2000" b="1" spc="-1" dirty="0" err="1">
+                <a:solidFill>
+                  <a:srgbClr val="000000"/>
+                </a:solidFill>
+                <a:latin typeface="Gill Sans MT"/>
+              </a:rPr>
+              <a:t>etc</a:t>
+            </a:r>
+            <a:r>
+              <a:rPr lang="en-CA" sz="2000" b="1" spc="-1" dirty="0">
+                <a:solidFill>
+                  <a:srgbClr val="000000"/>
+                </a:solidFill>
+                <a:latin typeface="Gill Sans MT"/>
+              </a:rPr>
+              <a:t> </a:t>
+            </a:r>
+            <a:r>
+              <a:rPr lang="en-CA" sz="2000" spc="-1" dirty="0">
+                <a:solidFill>
+                  <a:srgbClr val="000000"/>
+                </a:solidFill>
+                <a:latin typeface="Gill Sans MT"/>
+              </a:rPr>
+              <a:t>directory</a:t>
             </a:r>
             <a:endParaRPr lang="en-CA" sz="2000" b="0" strike="noStrike" spc="-1" dirty="0">
               <a:latin typeface="Arial"/>
@@ -9040,372 +8050,6 @@
   <p:clrMapOvr>
     <a:masterClrMapping/>
   </p:clrMapOvr>
-  <p:timing>
-    <p:tnLst>
-      <p:par>
-        <p:cTn id="1" dur="indefinite" restart="never" nodeType="tmRoot">
-          <p:childTnLst>
-            <p:seq concurrent="1" nextAc="seek">
-              <p:cTn id="2" dur="indefinite" nodeType="mainSeq">
-                <p:childTnLst>
-                  <p:par>
-                    <p:cTn id="3" fill="hold">
-                      <p:stCondLst>
-                        <p:cond delay="indefinite"/>
-                        <p:cond evt="onBegin" delay="0">
-                          <p:tn val="2"/>
-                        </p:cond>
-                      </p:stCondLst>
-                      <p:childTnLst>
-                        <p:par>
-                          <p:cTn id="4" fill="hold">
-                            <p:stCondLst>
-                              <p:cond delay="0"/>
-                            </p:stCondLst>
-                            <p:childTnLst>
-                              <p:par>
-                                <p:cTn id="5" presetID="1" presetClass="entr" presetSubtype="0" fill="hold" nodeType="withEffect">
-                                  <p:stCondLst>
-                                    <p:cond delay="0"/>
-                                  </p:stCondLst>
-                                  <p:childTnLst>
-                                    <p:set>
-                                      <p:cBhvr>
-                                        <p:cTn id="6" dur="1" fill="hold">
-                                          <p:stCondLst>
-                                            <p:cond delay="0"/>
-                                          </p:stCondLst>
-                                        </p:cTn>
-                                        <p:tgtEl>
-                                          <p:spTgt spid="189">
-                                            <p:txEl>
-                                              <p:pRg st="0" end="0"/>
-                                            </p:txEl>
-                                          </p:spTgt>
-                                        </p:tgtEl>
-                                        <p:attrNameLst>
-                                          <p:attrName>style.visibility</p:attrName>
-                                        </p:attrNameLst>
-                                      </p:cBhvr>
-                                      <p:to>
-                                        <p:strVal val="visible"/>
-                                      </p:to>
-                                    </p:set>
-                                  </p:childTnLst>
-                                </p:cTn>
-                              </p:par>
-                              <p:par>
-                                <p:cTn id="7" presetID="1" presetClass="entr" presetSubtype="0" fill="hold" nodeType="withEffect">
-                                  <p:stCondLst>
-                                    <p:cond delay="0"/>
-                                  </p:stCondLst>
-                                  <p:childTnLst>
-                                    <p:set>
-                                      <p:cBhvr>
-                                        <p:cTn id="8" dur="1" fill="hold">
-                                          <p:stCondLst>
-                                            <p:cond delay="0"/>
-                                          </p:stCondLst>
-                                        </p:cTn>
-                                        <p:tgtEl>
-                                          <p:spTgt spid="189">
-                                            <p:txEl>
-                                              <p:pRg st="1" end="1"/>
-                                            </p:txEl>
-                                          </p:spTgt>
-                                        </p:tgtEl>
-                                        <p:attrNameLst>
-                                          <p:attrName>style.visibility</p:attrName>
-                                        </p:attrNameLst>
-                                      </p:cBhvr>
-                                      <p:to>
-                                        <p:strVal val="visible"/>
-                                      </p:to>
-                                    </p:set>
-                                  </p:childTnLst>
-                                </p:cTn>
-                              </p:par>
-                              <p:par>
-                                <p:cTn id="9" presetID="1" presetClass="entr" presetSubtype="0" fill="hold" nodeType="withEffect">
-                                  <p:stCondLst>
-                                    <p:cond delay="0"/>
-                                  </p:stCondLst>
-                                  <p:childTnLst>
-                                    <p:set>
-                                      <p:cBhvr>
-                                        <p:cTn id="10" dur="1" fill="hold">
-                                          <p:stCondLst>
-                                            <p:cond delay="0"/>
-                                          </p:stCondLst>
-                                        </p:cTn>
-                                        <p:tgtEl>
-                                          <p:spTgt spid="189">
-                                            <p:txEl>
-                                              <p:pRg st="2" end="2"/>
-                                            </p:txEl>
-                                          </p:spTgt>
-                                        </p:tgtEl>
-                                        <p:attrNameLst>
-                                          <p:attrName>style.visibility</p:attrName>
-                                        </p:attrNameLst>
-                                      </p:cBhvr>
-                                      <p:to>
-                                        <p:strVal val="visible"/>
-                                      </p:to>
-                                    </p:set>
-                                  </p:childTnLst>
-                                </p:cTn>
-                              </p:par>
-                            </p:childTnLst>
-                          </p:cTn>
-                        </p:par>
-                      </p:childTnLst>
-                    </p:cTn>
-                  </p:par>
-                  <p:par>
-                    <p:cTn id="11" fill="hold">
-                      <p:stCondLst>
-                        <p:cond delay="indefinite"/>
-                      </p:stCondLst>
-                      <p:childTnLst>
-                        <p:par>
-                          <p:cTn id="12" fill="hold">
-                            <p:stCondLst>
-                              <p:cond delay="0"/>
-                            </p:stCondLst>
-                            <p:childTnLst>
-                              <p:par>
-                                <p:cTn id="13" presetID="1" presetClass="entr" presetSubtype="0" fill="hold" nodeType="clickEffect">
-                                  <p:stCondLst>
-                                    <p:cond delay="0"/>
-                                  </p:stCondLst>
-                                  <p:childTnLst>
-                                    <p:set>
-                                      <p:cBhvr>
-                                        <p:cTn id="14" dur="1" fill="hold">
-                                          <p:stCondLst>
-                                            <p:cond delay="0"/>
-                                          </p:stCondLst>
-                                        </p:cTn>
-                                        <p:tgtEl>
-                                          <p:spTgt spid="189">
-                                            <p:txEl>
-                                              <p:pRg st="3" end="3"/>
-                                            </p:txEl>
-                                          </p:spTgt>
-                                        </p:tgtEl>
-                                        <p:attrNameLst>
-                                          <p:attrName>style.visibility</p:attrName>
-                                        </p:attrNameLst>
-                                      </p:cBhvr>
-                                      <p:to>
-                                        <p:strVal val="visible"/>
-                                      </p:to>
-                                    </p:set>
-                                  </p:childTnLst>
-                                </p:cTn>
-                              </p:par>
-                            </p:childTnLst>
-                          </p:cTn>
-                        </p:par>
-                      </p:childTnLst>
-                    </p:cTn>
-                  </p:par>
-                  <p:par>
-                    <p:cTn id="15" fill="hold">
-                      <p:stCondLst>
-                        <p:cond delay="indefinite"/>
-                      </p:stCondLst>
-                      <p:childTnLst>
-                        <p:par>
-                          <p:cTn id="16" fill="hold">
-                            <p:stCondLst>
-                              <p:cond delay="0"/>
-                            </p:stCondLst>
-                            <p:childTnLst>
-                              <p:par>
-                                <p:cTn id="17" presetID="1" presetClass="entr" presetSubtype="0" fill="hold" nodeType="clickEffect">
-                                  <p:stCondLst>
-                                    <p:cond delay="0"/>
-                                  </p:stCondLst>
-                                  <p:childTnLst>
-                                    <p:set>
-                                      <p:cBhvr>
-                                        <p:cTn id="18" dur="1" fill="hold">
-                                          <p:stCondLst>
-                                            <p:cond delay="0"/>
-                                          </p:stCondLst>
-                                        </p:cTn>
-                                        <p:tgtEl>
-                                          <p:spTgt spid="189">
-                                            <p:txEl>
-                                              <p:pRg st="4" end="4"/>
-                                            </p:txEl>
-                                          </p:spTgt>
-                                        </p:tgtEl>
-                                        <p:attrNameLst>
-                                          <p:attrName>style.visibility</p:attrName>
-                                        </p:attrNameLst>
-                                      </p:cBhvr>
-                                      <p:to>
-                                        <p:strVal val="visible"/>
-                                      </p:to>
-                                    </p:set>
-                                  </p:childTnLst>
-                                </p:cTn>
-                              </p:par>
-                              <p:par>
-                                <p:cTn id="19" presetID="1" presetClass="entr" presetSubtype="0" fill="hold" nodeType="withEffect">
-                                  <p:stCondLst>
-                                    <p:cond delay="0"/>
-                                  </p:stCondLst>
-                                  <p:childTnLst>
-                                    <p:set>
-                                      <p:cBhvr>
-                                        <p:cTn id="20" dur="1" fill="hold">
-                                          <p:stCondLst>
-                                            <p:cond delay="0"/>
-                                          </p:stCondLst>
-                                        </p:cTn>
-                                        <p:tgtEl>
-                                          <p:spTgt spid="189">
-                                            <p:txEl>
-                                              <p:pRg st="5" end="5"/>
-                                            </p:txEl>
-                                          </p:spTgt>
-                                        </p:tgtEl>
-                                        <p:attrNameLst>
-                                          <p:attrName>style.visibility</p:attrName>
-                                        </p:attrNameLst>
-                                      </p:cBhvr>
-                                      <p:to>
-                                        <p:strVal val="visible"/>
-                                      </p:to>
-                                    </p:set>
-                                  </p:childTnLst>
-                                </p:cTn>
-                              </p:par>
-                              <p:par>
-                                <p:cTn id="21" presetID="1" presetClass="entr" presetSubtype="0" fill="hold" nodeType="withEffect">
-                                  <p:stCondLst>
-                                    <p:cond delay="0"/>
-                                  </p:stCondLst>
-                                  <p:childTnLst>
-                                    <p:set>
-                                      <p:cBhvr>
-                                        <p:cTn id="22" dur="1" fill="hold">
-                                          <p:stCondLst>
-                                            <p:cond delay="0"/>
-                                          </p:stCondLst>
-                                        </p:cTn>
-                                        <p:tgtEl>
-                                          <p:spTgt spid="189">
-                                            <p:txEl>
-                                              <p:pRg st="6" end="6"/>
-                                            </p:txEl>
-                                          </p:spTgt>
-                                        </p:tgtEl>
-                                        <p:attrNameLst>
-                                          <p:attrName>style.visibility</p:attrName>
-                                        </p:attrNameLst>
-                                      </p:cBhvr>
-                                      <p:to>
-                                        <p:strVal val="visible"/>
-                                      </p:to>
-                                    </p:set>
-                                  </p:childTnLst>
-                                </p:cTn>
-                              </p:par>
-                              <p:par>
-                                <p:cTn id="23" presetID="1" presetClass="entr" presetSubtype="0" fill="hold" nodeType="withEffect">
-                                  <p:stCondLst>
-                                    <p:cond delay="0"/>
-                                  </p:stCondLst>
-                                  <p:childTnLst>
-                                    <p:set>
-                                      <p:cBhvr>
-                                        <p:cTn id="24" dur="1" fill="hold">
-                                          <p:stCondLst>
-                                            <p:cond delay="0"/>
-                                          </p:stCondLst>
-                                        </p:cTn>
-                                        <p:tgtEl>
-                                          <p:spTgt spid="189">
-                                            <p:txEl>
-                                              <p:pRg st="7" end="7"/>
-                                            </p:txEl>
-                                          </p:spTgt>
-                                        </p:tgtEl>
-                                        <p:attrNameLst>
-                                          <p:attrName>style.visibility</p:attrName>
-                                        </p:attrNameLst>
-                                      </p:cBhvr>
-                                      <p:to>
-                                        <p:strVal val="visible"/>
-                                      </p:to>
-                                    </p:set>
-                                  </p:childTnLst>
-                                </p:cTn>
-                              </p:par>
-                              <p:par>
-                                <p:cTn id="25" presetID="1" presetClass="entr" presetSubtype="0" fill="hold" nodeType="withEffect">
-                                  <p:stCondLst>
-                                    <p:cond delay="0"/>
-                                  </p:stCondLst>
-                                  <p:childTnLst>
-                                    <p:set>
-                                      <p:cBhvr>
-                                        <p:cTn id="26" dur="1" fill="hold">
-                                          <p:stCondLst>
-                                            <p:cond delay="0"/>
-                                          </p:stCondLst>
-                                        </p:cTn>
-                                        <p:tgtEl>
-                                          <p:spTgt spid="189">
-                                            <p:txEl>
-                                              <p:pRg st="8" end="8"/>
-                                            </p:txEl>
-                                          </p:spTgt>
-                                        </p:tgtEl>
-                                        <p:attrNameLst>
-                                          <p:attrName>style.visibility</p:attrName>
-                                        </p:attrNameLst>
-                                      </p:cBhvr>
-                                      <p:to>
-                                        <p:strVal val="visible"/>
-                                      </p:to>
-                                    </p:set>
-                                  </p:childTnLst>
-                                </p:cTn>
-                              </p:par>
-                            </p:childTnLst>
-                          </p:cTn>
-                        </p:par>
-                      </p:childTnLst>
-                    </p:cTn>
-                  </p:par>
-                </p:childTnLst>
-              </p:cTn>
-              <p:prevCondLst>
-                <p:cond evt="onPrev" delay="0">
-                  <p:tgtEl>
-                    <p:sldTgt/>
-                  </p:tgtEl>
-                </p:cond>
-              </p:prevCondLst>
-              <p:nextCondLst>
-                <p:cond evt="onNext" delay="0">
-                  <p:tgtEl>
-                    <p:sldTgt/>
-                  </p:tgtEl>
-                </p:cond>
-              </p:nextCondLst>
-            </p:seq>
-          </p:childTnLst>
-        </p:cTn>
-      </p:par>
-    </p:tnLst>
-  </p:timing>
 </p:sld>
 </file>
 
@@ -9902,217 +8546,6 @@
   <p:clrMapOvr>
     <a:masterClrMapping/>
   </p:clrMapOvr>
-  <p:timing>
-    <p:tnLst>
-      <p:par>
-        <p:cTn id="1" dur="indefinite" restart="never" nodeType="tmRoot">
-          <p:childTnLst>
-            <p:seq concurrent="1" nextAc="seek">
-              <p:cTn id="2" dur="indefinite" nodeType="mainSeq">
-                <p:childTnLst>
-                  <p:par>
-                    <p:cTn id="3" fill="hold">
-                      <p:stCondLst>
-                        <p:cond delay="indefinite"/>
-                        <p:cond evt="onBegin" delay="0">
-                          <p:tn val="2"/>
-                        </p:cond>
-                      </p:stCondLst>
-                      <p:childTnLst>
-                        <p:par>
-                          <p:cTn id="4" fill="hold">
-                            <p:stCondLst>
-                              <p:cond delay="0"/>
-                            </p:stCondLst>
-                            <p:childTnLst>
-                              <p:par>
-                                <p:cTn id="5" presetID="1" presetClass="entr" presetSubtype="0" fill="hold" nodeType="withEffect">
-                                  <p:stCondLst>
-                                    <p:cond delay="0"/>
-                                  </p:stCondLst>
-                                  <p:childTnLst>
-                                    <p:set>
-                                      <p:cBhvr>
-                                        <p:cTn id="6" dur="1" fill="hold">
-                                          <p:stCondLst>
-                                            <p:cond delay="0"/>
-                                          </p:stCondLst>
-                                        </p:cTn>
-                                        <p:tgtEl>
-                                          <p:spTgt spid="192">
-                                            <p:txEl>
-                                              <p:pRg st="0" end="0"/>
-                                            </p:txEl>
-                                          </p:spTgt>
-                                        </p:tgtEl>
-                                        <p:attrNameLst>
-                                          <p:attrName>style.visibility</p:attrName>
-                                        </p:attrNameLst>
-                                      </p:cBhvr>
-                                      <p:to>
-                                        <p:strVal val="visible"/>
-                                      </p:to>
-                                    </p:set>
-                                  </p:childTnLst>
-                                </p:cTn>
-                              </p:par>
-                              <p:par>
-                                <p:cTn id="7" presetID="1" presetClass="entr" presetSubtype="0" fill="hold" nodeType="withEffect">
-                                  <p:stCondLst>
-                                    <p:cond delay="0"/>
-                                  </p:stCondLst>
-                                  <p:childTnLst>
-                                    <p:set>
-                                      <p:cBhvr>
-                                        <p:cTn id="8" dur="1" fill="hold">
-                                          <p:stCondLst>
-                                            <p:cond delay="0"/>
-                                          </p:stCondLst>
-                                        </p:cTn>
-                                        <p:tgtEl>
-                                          <p:spTgt spid="192">
-                                            <p:txEl>
-                                              <p:pRg st="1" end="1"/>
-                                            </p:txEl>
-                                          </p:spTgt>
-                                        </p:tgtEl>
-                                        <p:attrNameLst>
-                                          <p:attrName>style.visibility</p:attrName>
-                                        </p:attrNameLst>
-                                      </p:cBhvr>
-                                      <p:to>
-                                        <p:strVal val="visible"/>
-                                      </p:to>
-                                    </p:set>
-                                  </p:childTnLst>
-                                </p:cTn>
-                              </p:par>
-                            </p:childTnLst>
-                          </p:cTn>
-                        </p:par>
-                      </p:childTnLst>
-                    </p:cTn>
-                  </p:par>
-                  <p:par>
-                    <p:cTn id="9" fill="hold">
-                      <p:stCondLst>
-                        <p:cond delay="indefinite"/>
-                      </p:stCondLst>
-                      <p:childTnLst>
-                        <p:par>
-                          <p:cTn id="10" fill="hold">
-                            <p:stCondLst>
-                              <p:cond delay="0"/>
-                            </p:stCondLst>
-                            <p:childTnLst>
-                              <p:par>
-                                <p:cTn id="11" presetID="1" presetClass="entr" presetSubtype="0" fill="hold" nodeType="clickEffect">
-                                  <p:stCondLst>
-                                    <p:cond delay="0"/>
-                                  </p:stCondLst>
-                                  <p:childTnLst>
-                                    <p:set>
-                                      <p:cBhvr>
-                                        <p:cTn id="12" dur="1" fill="hold">
-                                          <p:stCondLst>
-                                            <p:cond delay="0"/>
-                                          </p:stCondLst>
-                                        </p:cTn>
-                                        <p:tgtEl>
-                                          <p:spTgt spid="192">
-                                            <p:txEl>
-                                              <p:pRg st="2" end="2"/>
-                                            </p:txEl>
-                                          </p:spTgt>
-                                        </p:tgtEl>
-                                        <p:attrNameLst>
-                                          <p:attrName>style.visibility</p:attrName>
-                                        </p:attrNameLst>
-                                      </p:cBhvr>
-                                      <p:to>
-                                        <p:strVal val="visible"/>
-                                      </p:to>
-                                    </p:set>
-                                  </p:childTnLst>
-                                </p:cTn>
-                              </p:par>
-                            </p:childTnLst>
-                          </p:cTn>
-                        </p:par>
-                      </p:childTnLst>
-                    </p:cTn>
-                  </p:par>
-                  <p:par>
-                    <p:cTn id="13" fill="hold">
-                      <p:stCondLst>
-                        <p:cond delay="indefinite"/>
-                      </p:stCondLst>
-                      <p:childTnLst>
-                        <p:par>
-                          <p:cTn id="14" fill="hold">
-                            <p:stCondLst>
-                              <p:cond delay="0"/>
-                            </p:stCondLst>
-                            <p:childTnLst>
-                              <p:par>
-                                <p:cTn id="15" presetID="1" presetClass="entr" presetSubtype="0" fill="hold" nodeType="clickEffect">
-                                  <p:stCondLst>
-                                    <p:cond delay="0"/>
-                                  </p:stCondLst>
-                                  <p:childTnLst>
-                                    <p:set>
-                                      <p:cBhvr>
-                                        <p:cTn id="16" dur="1" fill="hold">
-                                          <p:stCondLst>
-                                            <p:cond delay="0"/>
-                                          </p:stCondLst>
-                                        </p:cTn>
-                                        <p:tgtEl>
-                                          <p:spTgt spid="192">
-                                            <p:txEl>
-                                              <p:pRg st="3" end="3"/>
-                                            </p:txEl>
-                                          </p:spTgt>
-                                        </p:tgtEl>
-                                        <p:attrNameLst>
-                                          <p:attrName>style.visibility</p:attrName>
-                                        </p:attrNameLst>
-                                      </p:cBhvr>
-                                      <p:to>
-                                        <p:strVal val="visible"/>
-                                      </p:to>
-                                    </p:set>
-                                  </p:childTnLst>
-                                </p:cTn>
-                              </p:par>
-                            </p:childTnLst>
-                          </p:cTn>
-                        </p:par>
-                      </p:childTnLst>
-                    </p:cTn>
-                  </p:par>
-                </p:childTnLst>
-              </p:cTn>
-              <p:prevCondLst>
-                <p:cond evt="onPrev" delay="0">
-                  <p:tgtEl>
-                    <p:sldTgt/>
-                  </p:tgtEl>
-                </p:cond>
-              </p:prevCondLst>
-              <p:nextCondLst>
-                <p:cond evt="onNext" delay="0">
-                  <p:tgtEl>
-                    <p:sldTgt/>
-                  </p:tgtEl>
-                </p:cond>
-              </p:nextCondLst>
-            </p:seq>
-          </p:childTnLst>
-        </p:cTn>
-      </p:par>
-    </p:tnLst>
-  </p:timing>
 </p:sld>
 </file>
 

</xml_diff>

<commit_message>
Fixes Weekly Tutorial case typo.
</commit_message>
<xml_diff>
--- a/ULI101-1.2.pptx
+++ b/ULI101-1.2.pptx
@@ -5272,7 +5272,7 @@
               <a:t>There are </a:t>
             </a:r>
             <a:r>
-              <a:rPr lang="en-US" sz="1800" b="1" strike="noStrike" spc="-1" dirty="0">
+              <a:rPr lang="en-US" sz="1800" b="1" strike="noStrike" spc="-1">
                 <a:solidFill>
                   <a:srgbClr val="000000"/>
                 </a:solidFill>
@@ -5281,31 +5281,40 @@
               <a:t>Weekly</a:t>
             </a:r>
             <a:r>
+              <a:rPr lang="en-US" sz="1800" b="0" strike="noStrike" spc="-1">
+                <a:solidFill>
+                  <a:srgbClr val="000000"/>
+                </a:solidFill>
+                <a:latin typeface="Gill Sans MT"/>
+              </a:rPr>
+              <a:t> </a:t>
+            </a:r>
+            <a:r>
+              <a:rPr lang="en-US" sz="1800" b="1" strike="noStrike" spc="-1">
+                <a:solidFill>
+                  <a:srgbClr val="000000"/>
+                </a:solidFill>
+                <a:latin typeface="Gill Sans MT"/>
+              </a:rPr>
+              <a:t>Tutorials</a:t>
+            </a:r>
+            <a:r>
+              <a:rPr lang="en-US" sz="1800" b="0" strike="noStrike" spc="-1">
+                <a:solidFill>
+                  <a:srgbClr val="000000"/>
+                </a:solidFill>
+                <a:latin typeface="Gill Sans MT"/>
+              </a:rPr>
+              <a:t> </a:t>
+            </a:r>
+            <a:r>
               <a:rPr lang="en-US" sz="1800" b="0" strike="noStrike" spc="-1" dirty="0">
                 <a:solidFill>
                   <a:srgbClr val="000000"/>
                 </a:solidFill>
                 <a:latin typeface="Gill Sans MT"/>
               </a:rPr>
-              <a:t> </a:t>
-            </a:r>
-            <a:r>
-              <a:rPr lang="en-US" sz="1800" b="1" strike="noStrike" spc="-1" dirty="0">
-                <a:solidFill>
-                  <a:srgbClr val="000000"/>
-                </a:solidFill>
-                <a:latin typeface="Gill Sans MT"/>
-              </a:rPr>
-              <a:t>tutorials</a:t>
-            </a:r>
-            <a:r>
-              <a:rPr lang="en-US" sz="1800" b="0" strike="noStrike" spc="-1" dirty="0">
-                <a:solidFill>
-                  <a:srgbClr val="000000"/>
-                </a:solidFill>
-                <a:latin typeface="Gill Sans MT"/>
-              </a:rPr>
-              <a:t> that are required to be completed by students for a </a:t>
+              <a:t>that are required to be completed by students for a </a:t>
             </a:r>
             <a:r>
               <a:rPr lang="en-US" sz="1800" b="1" strike="noStrike" spc="-1" dirty="0">

</xml_diff>